<commit_message>
Arreglo de informacion a la presentacion de Creacion d}e Roles
</commit_message>
<xml_diff>
--- a/Presentaciones/Creacion de Roles.pptx
+++ b/Presentaciones/Creacion de Roles.pptx
@@ -5,7 +5,7 @@
     <p:sldMasterId id="2147483660" r:id="rId1"/>
   </p:sldMasterIdLst>
   <p:notesMasterIdLst>
-    <p:notesMasterId r:id="rId17"/>
+    <p:notesMasterId r:id="rId18"/>
   </p:notesMasterIdLst>
   <p:sldIdLst>
     <p:sldId id="256" r:id="rId2"/>
@@ -16,13 +16,14 @@
     <p:sldId id="261" r:id="rId7"/>
     <p:sldId id="262" r:id="rId8"/>
     <p:sldId id="263" r:id="rId9"/>
-    <p:sldId id="264" r:id="rId10"/>
-    <p:sldId id="265" r:id="rId11"/>
-    <p:sldId id="266" r:id="rId12"/>
-    <p:sldId id="267" r:id="rId13"/>
-    <p:sldId id="268" r:id="rId14"/>
-    <p:sldId id="269" r:id="rId15"/>
-    <p:sldId id="270" r:id="rId16"/>
+    <p:sldId id="271" r:id="rId10"/>
+    <p:sldId id="264" r:id="rId11"/>
+    <p:sldId id="265" r:id="rId12"/>
+    <p:sldId id="266" r:id="rId13"/>
+    <p:sldId id="267" r:id="rId14"/>
+    <p:sldId id="268" r:id="rId15"/>
+    <p:sldId id="269" r:id="rId16"/>
+    <p:sldId id="270" r:id="rId17"/>
   </p:sldIdLst>
   <p:sldSz cx="12192000" cy="6858000"/>
   <p:notesSz cx="6858000" cy="9144000"/>
@@ -121,6 +122,11 @@
       </a:defRPr>
     </a:lvl9pPr>
   </p:defaultTextStyle>
+  <p:extLst>
+    <p:ext uri="{EFAFB233-063F-42B5-8137-9DF3F51BA10A}">
+      <p15:sldGuideLst xmlns:p15="http://schemas.microsoft.com/office/powerpoint/2012/main"/>
+    </p:ext>
+  </p:extLst>
 </p:presentation>
 </file>
 
@@ -206,7 +212,7 @@
           <a:p>
             <a:fld id="{0F684009-8968-43BD-962D-0E79FC35F153}" type="datetimeFigureOut">
               <a:rPr lang="es-MX" smtClean="0"/>
-              <a:t>18/02/2019</a:t>
+              <a:t>20/02/2019</a:t>
             </a:fld>
             <a:endParaRPr lang="es-MX"/>
           </a:p>
@@ -716,7 +722,7 @@
           <a:p>
             <a:fld id="{D3D461BD-8B21-4C94-A6EB-616F1D195CCE}" type="slidenum">
               <a:rPr lang="es-MX" smtClean="0"/>
-              <a:t>10</a:t>
+              <a:t>11</a:t>
             </a:fld>
             <a:endParaRPr lang="es-MX"/>
           </a:p>
@@ -803,7 +809,7 @@
           <a:p>
             <a:fld id="{D3D461BD-8B21-4C94-A6EB-616F1D195CCE}" type="slidenum">
               <a:rPr lang="es-MX" smtClean="0"/>
-              <a:t>11</a:t>
+              <a:t>12</a:t>
             </a:fld>
             <a:endParaRPr lang="es-MX"/>
           </a:p>
@@ -998,7 +1004,7 @@
           <a:p>
             <a:fld id="{5AC2033E-D627-4FBA-A878-476A4624D270}" type="datetimeFigureOut">
               <a:rPr lang="es-MX" smtClean="0"/>
-              <a:t>18/02/2019</a:t>
+              <a:t>20/02/2019</a:t>
             </a:fld>
             <a:endParaRPr lang="es-MX"/>
           </a:p>
@@ -1168,7 +1174,7 @@
           <a:p>
             <a:fld id="{5AC2033E-D627-4FBA-A878-476A4624D270}" type="datetimeFigureOut">
               <a:rPr lang="es-MX" smtClean="0"/>
-              <a:t>18/02/2019</a:t>
+              <a:t>20/02/2019</a:t>
             </a:fld>
             <a:endParaRPr lang="es-MX"/>
           </a:p>
@@ -1391,7 +1397,7 @@
           <a:p>
             <a:fld id="{5AC2033E-D627-4FBA-A878-476A4624D270}" type="datetimeFigureOut">
               <a:rPr lang="es-MX" smtClean="0"/>
-              <a:t>18/02/2019</a:t>
+              <a:t>20/02/2019</a:t>
             </a:fld>
             <a:endParaRPr lang="es-MX"/>
           </a:p>
@@ -1571,7 +1577,7 @@
           <a:p>
             <a:fld id="{5AC2033E-D627-4FBA-A878-476A4624D270}" type="datetimeFigureOut">
               <a:rPr lang="es-MX" smtClean="0"/>
-              <a:t>18/02/2019</a:t>
+              <a:t>20/02/2019</a:t>
             </a:fld>
             <a:endParaRPr lang="es-MX"/>
           </a:p>
@@ -1877,7 +1883,7 @@
           <a:p>
             <a:fld id="{5AC2033E-D627-4FBA-A878-476A4624D270}" type="datetimeFigureOut">
               <a:rPr lang="es-MX" smtClean="0"/>
-              <a:t>18/02/2019</a:t>
+              <a:t>20/02/2019</a:t>
             </a:fld>
             <a:endParaRPr lang="es-MX"/>
           </a:p>
@@ -2181,7 +2187,7 @@
           <a:p>
             <a:fld id="{5AC2033E-D627-4FBA-A878-476A4624D270}" type="datetimeFigureOut">
               <a:rPr lang="es-MX" smtClean="0"/>
-              <a:t>18/02/2019</a:t>
+              <a:t>20/02/2019</a:t>
             </a:fld>
             <a:endParaRPr lang="es-MX"/>
           </a:p>
@@ -2603,7 +2609,7 @@
           <a:p>
             <a:fld id="{5AC2033E-D627-4FBA-A878-476A4624D270}" type="datetimeFigureOut">
               <a:rPr lang="es-MX" smtClean="0"/>
-              <a:t>18/02/2019</a:t>
+              <a:t>20/02/2019</a:t>
             </a:fld>
             <a:endParaRPr lang="es-MX"/>
           </a:p>
@@ -2721,7 +2727,7 @@
           <a:p>
             <a:fld id="{5AC2033E-D627-4FBA-A878-476A4624D270}" type="datetimeFigureOut">
               <a:rPr lang="es-MX" smtClean="0"/>
-              <a:t>18/02/2019</a:t>
+              <a:t>20/02/2019</a:t>
             </a:fld>
             <a:endParaRPr lang="es-MX"/>
           </a:p>
@@ -2816,7 +2822,7 @@
           <a:p>
             <a:fld id="{5AC2033E-D627-4FBA-A878-476A4624D270}" type="datetimeFigureOut">
               <a:rPr lang="es-MX" smtClean="0"/>
-              <a:t>18/02/2019</a:t>
+              <a:t>20/02/2019</a:t>
             </a:fld>
             <a:endParaRPr lang="es-MX"/>
           </a:p>
@@ -3089,7 +3095,7 @@
           <a:p>
             <a:fld id="{5AC2033E-D627-4FBA-A878-476A4624D270}" type="datetimeFigureOut">
               <a:rPr lang="es-MX" smtClean="0"/>
-              <a:t>18/02/2019</a:t>
+              <a:t>20/02/2019</a:t>
             </a:fld>
             <a:endParaRPr lang="es-MX"/>
           </a:p>
@@ -3354,7 +3360,7 @@
           <a:p>
             <a:fld id="{5AC2033E-D627-4FBA-A878-476A4624D270}" type="datetimeFigureOut">
               <a:rPr lang="es-MX" smtClean="0"/>
-              <a:t>18/02/2019</a:t>
+              <a:t>20/02/2019</a:t>
             </a:fld>
             <a:endParaRPr lang="es-MX"/>
           </a:p>
@@ -3603,7 +3609,7 @@
           <a:p>
             <a:fld id="{5AC2033E-D627-4FBA-A878-476A4624D270}" type="datetimeFigureOut">
               <a:rPr lang="es-MX" smtClean="0"/>
-              <a:t>18/02/2019</a:t>
+              <a:t>20/02/2019</a:t>
             </a:fld>
             <a:endParaRPr lang="es-MX"/>
           </a:p>
@@ -4150,7 +4156,7 @@
           <p:cNvPr id="2" name="Title 1">
             <a:extLst>
               <a:ext uri="{FF2B5EF4-FFF2-40B4-BE49-F238E27FC236}">
-                <a16:creationId xmlns:a16="http://schemas.microsoft.com/office/drawing/2014/main" id="{D5B32CE9-9A10-45A4-90BF-FF3FAE14EC01}"/>
+                <a16:creationId xmlns:a16="http://schemas.microsoft.com/office/drawing/2014/main" id="{23550AB8-06AB-45C0-B46B-795247EBA72B}"/>
               </a:ext>
             </a:extLst>
           </p:cNvPr>
@@ -4168,15 +4174,11 @@
           <a:p>
             <a:r>
               <a:rPr lang="en-US" dirty="0" err="1"/>
-              <a:t>Crear</a:t>
-            </a:r>
-            <a:r>
-              <a:rPr lang="en-US" dirty="0"/>
-              <a:t> </a:t>
-            </a:r>
-            <a:r>
-              <a:rPr lang="en-US" dirty="0" err="1"/>
-              <a:t>logica</a:t>
+              <a:t>Rol</a:t>
+            </a:r>
+            <a:r>
+              <a:rPr lang="en-US" dirty="0"/>
+              <a:t> default</a:t>
             </a:r>
             <a:endParaRPr lang="es-MX" dirty="0"/>
           </a:p>
@@ -4187,7 +4189,7 @@
           <p:cNvPr id="3" name="Content Placeholder 2">
             <a:extLst>
               <a:ext uri="{FF2B5EF4-FFF2-40B4-BE49-F238E27FC236}">
-                <a16:creationId xmlns:a16="http://schemas.microsoft.com/office/drawing/2014/main" id="{DF29CD60-6524-4031-B4CE-97D162EFE429}"/>
+                <a16:creationId xmlns:a16="http://schemas.microsoft.com/office/drawing/2014/main" id="{D0E0FDC3-C7E3-49CD-847F-2A6B828BB8DC}"/>
               </a:ext>
             </a:extLst>
           </p:cNvPr>
@@ -4204,8 +4206,20 @@
           <a:lstStyle/>
           <a:p>
             <a:r>
-              <a:rPr lang="en-US" dirty="0" err="1"/>
-              <a:t>Ocuparemos</a:t>
+              <a:rPr lang="en-US" dirty="0"/>
+              <a:t>Una </a:t>
+            </a:r>
+            <a:r>
+              <a:rPr lang="en-US" dirty="0" err="1"/>
+              <a:t>vez</a:t>
+            </a:r>
+            <a:r>
+              <a:rPr lang="en-US" dirty="0"/>
+              <a:t> que temenos lo </a:t>
+            </a:r>
+            <a:r>
+              <a:rPr lang="en-US" dirty="0" err="1"/>
+              <a:t>demas</a:t>
             </a:r>
             <a:r>
               <a:rPr lang="en-US" dirty="0"/>
@@ -4213,15 +4227,7 @@
             </a:r>
             <a:r>
               <a:rPr lang="en-US" dirty="0" err="1"/>
-              <a:t>funciones</a:t>
-            </a:r>
-            <a:r>
-              <a:rPr lang="en-US" dirty="0"/>
-              <a:t> que </a:t>
-            </a:r>
-            <a:r>
-              <a:rPr lang="en-US" dirty="0" err="1"/>
-              <a:t>nos</a:t>
+              <a:t>podemos</a:t>
             </a:r>
             <a:r>
               <a:rPr lang="en-US" dirty="0"/>
@@ -4229,39 +4235,39 @@
             </a:r>
             <a:r>
               <a:rPr lang="en-US" dirty="0" err="1"/>
-              <a:t>permitan</a:t>
-            </a:r>
-            <a:r>
-              <a:rPr lang="en-US" dirty="0"/>
-              <a:t> saber </a:t>
-            </a:r>
-            <a:r>
-              <a:rPr lang="en-US" dirty="0" err="1"/>
-              <a:t>si</a:t>
-            </a:r>
-            <a:r>
-              <a:rPr lang="en-US" dirty="0"/>
-              <a:t> se </a:t>
-            </a:r>
-            <a:r>
-              <a:rPr lang="en-US" dirty="0" err="1"/>
-              <a:t>tiene</a:t>
+              <a:t>ir</a:t>
+            </a:r>
+            <a:r>
+              <a:rPr lang="en-US" dirty="0"/>
+              <a:t> a la </a:t>
+            </a:r>
+            <a:r>
+              <a:rPr lang="en-US" dirty="0" err="1"/>
+              <a:t>direccion</a:t>
             </a:r>
             <a:r>
               <a:rPr lang="en-US" dirty="0"/>
               <a:t> </a:t>
             </a:r>
             <a:r>
-              <a:rPr lang="en-US" dirty="0" err="1"/>
-              <a:t>algun</a:t>
-            </a:r>
-            <a:r>
-              <a:rPr lang="en-US" dirty="0"/>
+              <a:rPr lang="en-US" b="1" dirty="0"/>
+              <a:t>app/Http/Controllers/Auth/</a:t>
+            </a:r>
+            <a:r>
+              <a:rPr lang="en-US" b="1" dirty="0" err="1"/>
+              <a:t>RegisterController.php</a:t>
+            </a:r>
+            <a:r>
+              <a:rPr lang="en-US" b="1" dirty="0"/>
               <a:t> </a:t>
             </a:r>
             <a:r>
-              <a:rPr lang="en-US" dirty="0" err="1"/>
-              <a:t>rol</a:t>
+              <a:rPr lang="en-US" dirty="0"/>
+              <a:t>de </a:t>
+            </a:r>
+            <a:r>
+              <a:rPr lang="en-US" dirty="0" err="1"/>
+              <a:t>esta</a:t>
             </a:r>
             <a:r>
               <a:rPr lang="en-US" dirty="0"/>
@@ -4269,7 +4275,34 @@
             </a:r>
             <a:r>
               <a:rPr lang="en-US" dirty="0" err="1"/>
-              <a:t>en</a:t>
+              <a:t>manera</a:t>
+            </a:r>
+            <a:endParaRPr lang="en-US" dirty="0"/>
+          </a:p>
+          <a:p>
+            <a:r>
+              <a:rPr lang="en-US" dirty="0"/>
+              <a:t>Dentro de </a:t>
+            </a:r>
+            <a:r>
+              <a:rPr lang="en-US" dirty="0" err="1"/>
+              <a:t>su</a:t>
+            </a:r>
+            <a:r>
+              <a:rPr lang="en-US" dirty="0"/>
+              <a:t> function create </a:t>
+            </a:r>
+            <a:r>
+              <a:rPr lang="en-US" dirty="0" err="1"/>
+              <a:t>agregaremos</a:t>
+            </a:r>
+            <a:r>
+              <a:rPr lang="en-US" dirty="0"/>
+              <a:t> la </a:t>
+            </a:r>
+            <a:r>
+              <a:rPr lang="en-US" dirty="0" err="1"/>
+              <a:t>siguiente</a:t>
             </a:r>
             <a:r>
               <a:rPr lang="en-US" dirty="0"/>
@@ -4277,84 +4310,15 @@
             </a:r>
             <a:r>
               <a:rPr lang="en-US" dirty="0" err="1"/>
-              <a:t>especifico</a:t>
-            </a:r>
-            <a:r>
-              <a:rPr lang="en-US" dirty="0"/>
-              <a:t> o entre </a:t>
-            </a:r>
-            <a:r>
-              <a:rPr lang="en-US" dirty="0" err="1"/>
-              <a:t>varias</a:t>
-            </a:r>
-            <a:r>
-              <a:rPr lang="en-US" dirty="0"/>
-              <a:t> </a:t>
-            </a:r>
-            <a:r>
-              <a:rPr lang="en-US" dirty="0" err="1"/>
-              <a:t>opciones</a:t>
-            </a:r>
-            <a:r>
-              <a:rPr lang="en-US" dirty="0"/>
-              <a:t>.</a:t>
-            </a:r>
-          </a:p>
-          <a:p>
-            <a:r>
-              <a:rPr lang="en-US" dirty="0"/>
-              <a:t>Por </a:t>
-            </a:r>
-            <a:r>
-              <a:rPr lang="en-US" dirty="0" err="1"/>
-              <a:t>ejemplo</a:t>
-            </a:r>
-            <a:r>
-              <a:rPr lang="es-MX" dirty="0"/>
-              <a:t>:</a:t>
-            </a:r>
+              <a:t>linea</a:t>
+            </a:r>
+            <a:endParaRPr lang="en-US" dirty="0"/>
           </a:p>
           <a:p>
             <a:pPr lvl="1"/>
             <a:r>
-              <a:rPr lang="es-MX" b="1" dirty="0" err="1"/>
-              <a:t>public</a:t>
-            </a:r>
-            <a:r>
-              <a:rPr lang="es-MX" b="1" dirty="0"/>
-              <a:t> </a:t>
-            </a:r>
-            <a:r>
-              <a:rPr lang="es-MX" b="1" dirty="0" err="1"/>
-              <a:t>function</a:t>
-            </a:r>
-            <a:r>
-              <a:rPr lang="es-MX" b="1" dirty="0"/>
-              <a:t> </a:t>
-            </a:r>
-            <a:r>
-              <a:rPr lang="es-MX" b="1" dirty="0" err="1"/>
-              <a:t>hasRol</a:t>
-            </a:r>
-            <a:r>
-              <a:rPr lang="es-MX" b="1" dirty="0"/>
-              <a:t>($rol)</a:t>
-            </a:r>
-          </a:p>
-          <a:p>
-            <a:pPr marL="228600" lvl="1" indent="0">
-              <a:buNone/>
-            </a:pPr>
-            <a:r>
-              <a:rPr lang="en-US" b="1" dirty="0"/>
-              <a:t>{</a:t>
-            </a:r>
-            <a:br>
-              <a:rPr lang="en-US" b="1" dirty="0"/>
-            </a:br>
-            <a:r>
-              <a:rPr lang="en-US" b="1" dirty="0"/>
-              <a:t>	if($this-&gt;</a:t>
+              <a:rPr lang="en-US" b="1" dirty="0"/>
+              <a:t>$user-&gt;</a:t>
             </a:r>
             <a:r>
               <a:rPr lang="en-US" b="1" dirty="0" err="1"/>
@@ -4362,45 +4326,23 @@
             </a:r>
             <a:r>
               <a:rPr lang="en-US" b="1" dirty="0"/>
-              <a:t>()-&gt;where(‘name’, $</a:t>
+              <a:t>()-&gt;attach(</a:t>
             </a:r>
             <a:r>
               <a:rPr lang="en-US" b="1" dirty="0" err="1"/>
-              <a:t>rol</a:t>
-            </a:r>
-            <a:r>
-              <a:rPr lang="en-US" b="1" dirty="0"/>
-              <a:t>)-&gt;first()){</a:t>
-            </a:r>
-            <a:br>
-              <a:rPr lang="en-US" b="1" dirty="0"/>
-            </a:br>
-            <a:r>
-              <a:rPr lang="en-US" b="1" dirty="0"/>
-              <a:t>		return true;</a:t>
-            </a:r>
-            <a:br>
-              <a:rPr lang="en-US" b="1" dirty="0"/>
-            </a:br>
-            <a:r>
-              <a:rPr lang="en-US" b="1" dirty="0"/>
-              <a:t>	}</a:t>
-            </a:r>
-          </a:p>
-          <a:p>
-            <a:pPr marL="228600" lvl="1" indent="0">
-              <a:buNone/>
-            </a:pPr>
-            <a:r>
-              <a:rPr lang="en-US" b="1" dirty="0"/>
-              <a:t>	return false;</a:t>
-            </a:r>
-            <a:br>
-              <a:rPr lang="en-US" b="1" dirty="0"/>
-            </a:br>
-            <a:r>
-              <a:rPr lang="en-US" b="1" dirty="0"/>
-              <a:t>}</a:t>
+              <a:t>Rol</a:t>
+            </a:r>
+            <a:r>
+              <a:rPr lang="en-US" b="1" dirty="0"/>
+              <a:t>::where(‘</a:t>
+            </a:r>
+            <a:r>
+              <a:rPr lang="en-US" b="1" dirty="0" err="1"/>
+              <a:t>name’,’user</a:t>
+            </a:r>
+            <a:r>
+              <a:rPr lang="en-US" b="1" dirty="0"/>
+              <a:t>’)-&gt;first());</a:t>
             </a:r>
             <a:endParaRPr lang="es-MX" b="1" dirty="0"/>
           </a:p>
@@ -4409,7 +4351,7 @@
     </p:spTree>
     <p:extLst>
       <p:ext uri="{BB962C8B-B14F-4D97-AF65-F5344CB8AC3E}">
-        <p14:creationId xmlns:p14="http://schemas.microsoft.com/office/powerpoint/2010/main" val="1727338606"/>
+        <p14:creationId xmlns:p14="http://schemas.microsoft.com/office/powerpoint/2010/main" val="1633187605"/>
       </p:ext>
     </p:extLst>
   </p:cSld>
@@ -4441,7 +4383,7 @@
           <p:cNvPr id="2" name="Title 1">
             <a:extLst>
               <a:ext uri="{FF2B5EF4-FFF2-40B4-BE49-F238E27FC236}">
-                <a16:creationId xmlns:a16="http://schemas.microsoft.com/office/drawing/2014/main" id="{B6B290C7-14F9-4ED1-B7F4-0F0DC8F63491}"/>
+                <a16:creationId xmlns:a16="http://schemas.microsoft.com/office/drawing/2014/main" id="{D5B32CE9-9A10-45A4-90BF-FF3FAE14EC01}"/>
               </a:ext>
             </a:extLst>
           </p:cNvPr>
@@ -4457,7 +4399,19 @@
           <a:bodyPr/>
           <a:lstStyle/>
           <a:p>
-            <a:endParaRPr lang="es-MX"/>
+            <a:r>
+              <a:rPr lang="en-US" dirty="0" err="1"/>
+              <a:t>Crear</a:t>
+            </a:r>
+            <a:r>
+              <a:rPr lang="en-US" dirty="0"/>
+              <a:t> </a:t>
+            </a:r>
+            <a:r>
+              <a:rPr lang="en-US" dirty="0" err="1"/>
+              <a:t>logica</a:t>
+            </a:r>
+            <a:endParaRPr lang="es-MX" dirty="0"/>
           </a:p>
         </p:txBody>
       </p:sp>
@@ -4466,7 +4420,7 @@
           <p:cNvPr id="3" name="Content Placeholder 2">
             <a:extLst>
               <a:ext uri="{FF2B5EF4-FFF2-40B4-BE49-F238E27FC236}">
-                <a16:creationId xmlns:a16="http://schemas.microsoft.com/office/drawing/2014/main" id="{9C854629-B4B2-4909-AB6B-4EF799DFF6C0}"/>
+                <a16:creationId xmlns:a16="http://schemas.microsoft.com/office/drawing/2014/main" id="{DF29CD60-6524-4031-B4CE-97D162EFE429}"/>
               </a:ext>
             </a:extLst>
           </p:cNvPr>
@@ -4479,14 +4433,40 @@
         </p:nvSpPr>
         <p:spPr/>
         <p:txBody>
-          <a:bodyPr>
-            <a:normAutofit lnSpcReduction="10000"/>
-          </a:bodyPr>
-          <a:lstStyle/>
-          <a:p>
-            <a:r>
-              <a:rPr lang="en-US" dirty="0"/>
-              <a:t>Para saber </a:t>
+          <a:bodyPr/>
+          <a:lstStyle/>
+          <a:p>
+            <a:r>
+              <a:rPr lang="en-US" dirty="0" err="1"/>
+              <a:t>Ocuparemos</a:t>
+            </a:r>
+            <a:r>
+              <a:rPr lang="en-US" dirty="0"/>
+              <a:t> </a:t>
+            </a:r>
+            <a:r>
+              <a:rPr lang="en-US" dirty="0" err="1"/>
+              <a:t>funciones</a:t>
+            </a:r>
+            <a:r>
+              <a:rPr lang="en-US" dirty="0"/>
+              <a:t> que </a:t>
+            </a:r>
+            <a:r>
+              <a:rPr lang="en-US" dirty="0" err="1"/>
+              <a:t>nos</a:t>
+            </a:r>
+            <a:r>
+              <a:rPr lang="en-US" dirty="0"/>
+              <a:t> </a:t>
+            </a:r>
+            <a:r>
+              <a:rPr lang="en-US" dirty="0" err="1"/>
+              <a:t>permitan</a:t>
+            </a:r>
+            <a:r>
+              <a:rPr lang="en-US" dirty="0"/>
+              <a:t> saber </a:t>
             </a:r>
             <a:r>
               <a:rPr lang="en-US" dirty="0" err="1"/>
@@ -4494,11 +4474,19 @@
             </a:r>
             <a:r>
               <a:rPr lang="en-US" dirty="0"/>
+              <a:t> se </a:t>
+            </a:r>
+            <a:r>
+              <a:rPr lang="en-US" dirty="0" err="1"/>
+              <a:t>tiene</a:t>
+            </a:r>
+            <a:r>
+              <a:rPr lang="en-US" dirty="0"/>
               <a:t> </a:t>
             </a:r>
             <a:r>
               <a:rPr lang="en-US" dirty="0" err="1"/>
-              <a:t>tiene</a:t>
+              <a:t>algun</a:t>
             </a:r>
             <a:r>
               <a:rPr lang="en-US" dirty="0"/>
@@ -4506,7 +4494,7 @@
             </a:r>
             <a:r>
               <a:rPr lang="en-US" dirty="0" err="1"/>
-              <a:t>algun</a:t>
+              <a:t>rol</a:t>
             </a:r>
             <a:r>
               <a:rPr lang="en-US" dirty="0"/>
@@ -4514,31 +4502,7 @@
             </a:r>
             <a:r>
               <a:rPr lang="en-US" dirty="0" err="1"/>
-              <a:t>rol</a:t>
-            </a:r>
-            <a:r>
-              <a:rPr lang="en-US" dirty="0"/>
-              <a:t> entre </a:t>
-            </a:r>
-            <a:r>
-              <a:rPr lang="en-US" dirty="0" err="1"/>
-              <a:t>varios</a:t>
-            </a:r>
-            <a:r>
-              <a:rPr lang="en-US" dirty="0"/>
-              <a:t> se </a:t>
-            </a:r>
-            <a:r>
-              <a:rPr lang="en-US" dirty="0" err="1"/>
-              <a:t>puede</a:t>
-            </a:r>
-            <a:r>
-              <a:rPr lang="en-US" dirty="0"/>
-              <a:t> realizer de la </a:t>
-            </a:r>
-            <a:r>
-              <a:rPr lang="en-US" dirty="0" err="1"/>
-              <a:t>siguiente</a:t>
+              <a:t>en</a:t>
             </a:r>
             <a:r>
               <a:rPr lang="en-US" dirty="0"/>
@@ -4546,116 +4510,68 @@
             </a:r>
             <a:r>
               <a:rPr lang="en-US" dirty="0" err="1"/>
-              <a:t>manera</a:t>
-            </a:r>
-            <a:endParaRPr lang="en-US" dirty="0"/>
+              <a:t>especifico</a:t>
+            </a:r>
+            <a:r>
+              <a:rPr lang="en-US" dirty="0"/>
+              <a:t> o entre </a:t>
+            </a:r>
+            <a:r>
+              <a:rPr lang="en-US" dirty="0" err="1"/>
+              <a:t>varias</a:t>
+            </a:r>
+            <a:r>
+              <a:rPr lang="en-US" dirty="0"/>
+              <a:t> </a:t>
+            </a:r>
+            <a:r>
+              <a:rPr lang="en-US" dirty="0" err="1"/>
+              <a:t>opciones</a:t>
+            </a:r>
+            <a:r>
+              <a:rPr lang="en-US" dirty="0"/>
+              <a:t>.</a:t>
+            </a:r>
+          </a:p>
+          <a:p>
+            <a:r>
+              <a:rPr lang="en-US" dirty="0"/>
+              <a:t>Por </a:t>
+            </a:r>
+            <a:r>
+              <a:rPr lang="en-US" dirty="0" err="1"/>
+              <a:t>ejemplo</a:t>
+            </a:r>
+            <a:r>
+              <a:rPr lang="es-MX" dirty="0"/>
+              <a:t>:</a:t>
+            </a:r>
           </a:p>
           <a:p>
             <a:pPr lvl="1"/>
             <a:r>
-              <a:rPr lang="en-US" b="1" dirty="0"/>
-              <a:t>public function </a:t>
-            </a:r>
-            <a:r>
-              <a:rPr lang="en-US" b="1" dirty="0" err="1"/>
-              <a:t>hasAnyRol</a:t>
-            </a:r>
-            <a:r>
-              <a:rPr lang="en-US" b="1" dirty="0"/>
-              <a:t>($</a:t>
-            </a:r>
-            <a:r>
-              <a:rPr lang="en-US" b="1" dirty="0" err="1"/>
-              <a:t>rols</a:t>
-            </a:r>
-            <a:r>
-              <a:rPr lang="en-US" b="1" dirty="0"/>
-              <a:t>){</a:t>
-            </a:r>
-            <a:br>
-              <a:rPr lang="en-US" b="1" dirty="0"/>
-            </a:br>
-            <a:r>
-              <a:rPr lang="en-US" b="1" dirty="0"/>
-              <a:t>	if(</a:t>
-            </a:r>
-            <a:r>
-              <a:rPr lang="en-US" b="1" dirty="0" err="1"/>
-              <a:t>is_array</a:t>
-            </a:r>
-            <a:r>
-              <a:rPr lang="en-US" b="1" dirty="0"/>
-              <a:t>($</a:t>
-            </a:r>
-            <a:r>
-              <a:rPr lang="en-US" b="1" dirty="0" err="1"/>
-              <a:t>rols</a:t>
-            </a:r>
-            <a:r>
-              <a:rPr lang="en-US" b="1" dirty="0"/>
-              <a:t>)){</a:t>
-            </a:r>
-            <a:br>
-              <a:rPr lang="en-US" b="1" dirty="0"/>
-            </a:br>
-            <a:r>
-              <a:rPr lang="en-US" b="1" dirty="0"/>
-              <a:t>		foreach($</a:t>
-            </a:r>
-            <a:r>
-              <a:rPr lang="en-US" b="1" dirty="0" err="1"/>
-              <a:t>rols</a:t>
-            </a:r>
-            <a:r>
-              <a:rPr lang="en-US" b="1" dirty="0"/>
-              <a:t> as $</a:t>
-            </a:r>
-            <a:r>
-              <a:rPr lang="en-US" b="1" dirty="0" err="1"/>
-              <a:t>rol</a:t>
-            </a:r>
-            <a:r>
-              <a:rPr lang="en-US" b="1" dirty="0"/>
-              <a:t>){</a:t>
-            </a:r>
-            <a:br>
-              <a:rPr lang="en-US" b="1" dirty="0"/>
-            </a:br>
-            <a:r>
-              <a:rPr lang="en-US" b="1" dirty="0"/>
-              <a:t>			if($this-&gt;</a:t>
-            </a:r>
-            <a:r>
-              <a:rPr lang="en-US" b="1" dirty="0" err="1"/>
+              <a:rPr lang="es-MX" b="1" dirty="0" err="1"/>
+              <a:t>public</a:t>
+            </a:r>
+            <a:r>
+              <a:rPr lang="es-MX" b="1" dirty="0"/>
+              <a:t> </a:t>
+            </a:r>
+            <a:r>
+              <a:rPr lang="es-MX" b="1" dirty="0" err="1"/>
+              <a:t>function</a:t>
+            </a:r>
+            <a:r>
+              <a:rPr lang="es-MX" b="1" dirty="0"/>
+              <a:t> </a:t>
+            </a:r>
+            <a:r>
+              <a:rPr lang="es-MX" b="1" dirty="0" err="1"/>
               <a:t>hasRol</a:t>
             </a:r>
             <a:r>
-              <a:rPr lang="en-US" b="1" dirty="0"/>
-              <a:t>($</a:t>
-            </a:r>
-            <a:r>
-              <a:rPr lang="en-US" b="1" dirty="0" err="1"/>
-              <a:t>rol</a:t>
-            </a:r>
-            <a:r>
-              <a:rPr lang="en-US" b="1" dirty="0"/>
-              <a:t>)){</a:t>
-            </a:r>
-          </a:p>
-          <a:p>
-            <a:pPr marL="685800" lvl="3" indent="0">
-              <a:buNone/>
-            </a:pPr>
-            <a:r>
-              <a:rPr lang="en-US" b="1" dirty="0"/>
-              <a:t>				return true;</a:t>
-            </a:r>
-            <a:br>
-              <a:rPr lang="en-US" b="1" dirty="0"/>
-            </a:br>
-            <a:r>
-              <a:rPr lang="en-US" b="1" dirty="0"/>
-              <a:t>			}</a:t>
+              <a:rPr lang="es-MX" b="1" dirty="0"/>
+              <a:t>($rol)</a:t>
             </a:r>
           </a:p>
           <a:p>
@@ -4664,14 +4580,44 @@
             </a:pPr>
             <a:r>
               <a:rPr lang="en-US" b="1" dirty="0"/>
-              <a:t>		}</a:t>
+              <a:t>{</a:t>
             </a:r>
             <a:br>
               <a:rPr lang="en-US" b="1" dirty="0"/>
             </a:br>
             <a:r>
               <a:rPr lang="en-US" b="1" dirty="0"/>
-              <a:t>	}else{</a:t>
+              <a:t>	if($this-&gt;</a:t>
+            </a:r>
+            <a:r>
+              <a:rPr lang="en-US" b="1" dirty="0" err="1"/>
+              <a:t>rols</a:t>
+            </a:r>
+            <a:r>
+              <a:rPr lang="en-US" b="1" dirty="0"/>
+              <a:t>()-&gt;where(‘name’, $</a:t>
+            </a:r>
+            <a:r>
+              <a:rPr lang="en-US" b="1" dirty="0" err="1"/>
+              <a:t>rol</a:t>
+            </a:r>
+            <a:r>
+              <a:rPr lang="en-US" b="1" dirty="0"/>
+              <a:t>)-&gt;first()){</a:t>
+            </a:r>
+            <a:br>
+              <a:rPr lang="en-US" b="1" dirty="0"/>
+            </a:br>
+            <a:r>
+              <a:rPr lang="en-US" b="1" dirty="0"/>
+              <a:t>		return true;</a:t>
+            </a:r>
+            <a:br>
+              <a:rPr lang="en-US" b="1" dirty="0"/>
+            </a:br>
+            <a:r>
+              <a:rPr lang="en-US" b="1" dirty="0"/>
+              <a:t>	}</a:t>
             </a:r>
           </a:p>
           <a:p>
@@ -4680,54 +4626,6 @@
             </a:pPr>
             <a:r>
               <a:rPr lang="en-US" b="1" dirty="0"/>
-              <a:t>		if($this-&gt;</a:t>
-            </a:r>
-            <a:r>
-              <a:rPr lang="en-US" b="1" dirty="0" err="1"/>
-              <a:t>hasRol</a:t>
-            </a:r>
-            <a:r>
-              <a:rPr lang="en-US" b="1" dirty="0"/>
-              <a:t>($</a:t>
-            </a:r>
-            <a:r>
-              <a:rPr lang="en-US" b="1" dirty="0" err="1"/>
-              <a:t>rol</a:t>
-            </a:r>
-            <a:r>
-              <a:rPr lang="en-US" b="1" dirty="0"/>
-              <a:t>)){</a:t>
-            </a:r>
-          </a:p>
-          <a:p>
-            <a:pPr marL="228600" lvl="1" indent="0">
-              <a:buNone/>
-            </a:pPr>
-            <a:r>
-              <a:rPr lang="en-US" b="1" dirty="0"/>
-              <a:t>			return true;</a:t>
-            </a:r>
-            <a:br>
-              <a:rPr lang="en-US" b="1" dirty="0"/>
-            </a:br>
-            <a:r>
-              <a:rPr lang="en-US" b="1" dirty="0"/>
-              <a:t>		}</a:t>
-            </a:r>
-            <a:br>
-              <a:rPr lang="en-US" b="1" dirty="0"/>
-            </a:br>
-            <a:r>
-              <a:rPr lang="en-US" b="1" dirty="0"/>
-              <a:t>	}</a:t>
-            </a:r>
-          </a:p>
-          <a:p>
-            <a:pPr marL="228600" lvl="1" indent="0">
-              <a:buNone/>
-            </a:pPr>
-            <a:r>
-              <a:rPr lang="en-US" b="1" dirty="0"/>
               <a:t>	return false;</a:t>
             </a:r>
             <a:br>
@@ -4744,7 +4642,7 @@
     </p:spTree>
     <p:extLst>
       <p:ext uri="{BB962C8B-B14F-4D97-AF65-F5344CB8AC3E}">
-        <p14:creationId xmlns:p14="http://schemas.microsoft.com/office/powerpoint/2010/main" val="162151903"/>
+        <p14:creationId xmlns:p14="http://schemas.microsoft.com/office/powerpoint/2010/main" val="1727338606"/>
       </p:ext>
     </p:extLst>
   </p:cSld>
@@ -4776,7 +4674,7 @@
           <p:cNvPr id="2" name="Title 1">
             <a:extLst>
               <a:ext uri="{FF2B5EF4-FFF2-40B4-BE49-F238E27FC236}">
-                <a16:creationId xmlns:a16="http://schemas.microsoft.com/office/drawing/2014/main" id="{C5525EA4-AC0F-4C61-A5E5-7B2A8674736A}"/>
+                <a16:creationId xmlns:a16="http://schemas.microsoft.com/office/drawing/2014/main" id="{B6B290C7-14F9-4ED1-B7F4-0F0DC8F63491}"/>
               </a:ext>
             </a:extLst>
           </p:cNvPr>
@@ -4792,7 +4690,7 @@
           <a:bodyPr/>
           <a:lstStyle/>
           <a:p>
-            <a:endParaRPr lang="es-MX" dirty="0"/>
+            <a:endParaRPr lang="es-MX"/>
           </a:p>
         </p:txBody>
       </p:sp>
@@ -4801,7 +4699,7 @@
           <p:cNvPr id="3" name="Content Placeholder 2">
             <a:extLst>
               <a:ext uri="{FF2B5EF4-FFF2-40B4-BE49-F238E27FC236}">
-                <a16:creationId xmlns:a16="http://schemas.microsoft.com/office/drawing/2014/main" id="{3D7CC8E2-FD64-48B2-A98E-BEEAB00E918F}"/>
+                <a16:creationId xmlns:a16="http://schemas.microsoft.com/office/drawing/2014/main" id="{9C854629-B4B2-4909-AB6B-4EF799DFF6C0}"/>
               </a:ext>
             </a:extLst>
           </p:cNvPr>
@@ -4814,16 +4712,18 @@
         </p:nvSpPr>
         <p:spPr/>
         <p:txBody>
-          <a:bodyPr/>
-          <a:lstStyle/>
-          <a:p>
-            <a:r>
-              <a:rPr lang="en-US" dirty="0"/>
-              <a:t>Si </a:t>
-            </a:r>
-            <a:r>
-              <a:rPr lang="en-US" dirty="0" err="1"/>
-              <a:t>gustan</a:t>
+          <a:bodyPr>
+            <a:normAutofit lnSpcReduction="10000"/>
+          </a:bodyPr>
+          <a:lstStyle/>
+          <a:p>
+            <a:r>
+              <a:rPr lang="en-US" dirty="0"/>
+              <a:t>Para saber </a:t>
+            </a:r>
+            <a:r>
+              <a:rPr lang="en-US" dirty="0" err="1"/>
+              <a:t>si</a:t>
             </a:r>
             <a:r>
               <a:rPr lang="en-US" dirty="0"/>
@@ -4831,33 +4731,165 @@
             </a:r>
             <a:r>
               <a:rPr lang="en-US" dirty="0" err="1"/>
-              <a:t>agregar</a:t>
-            </a:r>
-            <a:r>
-              <a:rPr lang="en-US" dirty="0"/>
-              <a:t> una </a:t>
-            </a:r>
-            <a:r>
-              <a:rPr lang="en-US" dirty="0" err="1"/>
-              <a:t>pantalla</a:t>
-            </a:r>
-            <a:r>
-              <a:rPr lang="en-US" dirty="0"/>
-              <a:t> de error </a:t>
-            </a:r>
-            <a:r>
-              <a:rPr lang="en-US" dirty="0" err="1"/>
-              <a:t>pueden</a:t>
-            </a:r>
-            <a:r>
-              <a:rPr lang="en-US" dirty="0"/>
-              <a:t> realizer lo </a:t>
-            </a:r>
-            <a:r>
-              <a:rPr lang="en-US" dirty="0" err="1"/>
-              <a:t>sigueinte</a:t>
+              <a:t>tiene</a:t>
+            </a:r>
+            <a:r>
+              <a:rPr lang="en-US" dirty="0"/>
+              <a:t> </a:t>
+            </a:r>
+            <a:r>
+              <a:rPr lang="en-US" dirty="0" err="1"/>
+              <a:t>algun</a:t>
+            </a:r>
+            <a:r>
+              <a:rPr lang="en-US" dirty="0"/>
+              <a:t> </a:t>
+            </a:r>
+            <a:r>
+              <a:rPr lang="en-US" dirty="0" err="1"/>
+              <a:t>rol</a:t>
+            </a:r>
+            <a:r>
+              <a:rPr lang="en-US" dirty="0"/>
+              <a:t> entre </a:t>
+            </a:r>
+            <a:r>
+              <a:rPr lang="en-US" dirty="0" err="1"/>
+              <a:t>varios</a:t>
+            </a:r>
+            <a:r>
+              <a:rPr lang="en-US" dirty="0"/>
+              <a:t> se </a:t>
+            </a:r>
+            <a:r>
+              <a:rPr lang="en-US" dirty="0" err="1"/>
+              <a:t>puede</a:t>
+            </a:r>
+            <a:r>
+              <a:rPr lang="en-US" dirty="0"/>
+              <a:t> realizer de la </a:t>
+            </a:r>
+            <a:r>
+              <a:rPr lang="en-US" dirty="0" err="1"/>
+              <a:t>siguiente</a:t>
+            </a:r>
+            <a:r>
+              <a:rPr lang="en-US" dirty="0"/>
+              <a:t> </a:t>
+            </a:r>
+            <a:r>
+              <a:rPr lang="en-US" dirty="0" err="1"/>
+              <a:t>manera</a:t>
             </a:r>
             <a:endParaRPr lang="en-US" dirty="0"/>
+          </a:p>
+          <a:p>
+            <a:pPr lvl="1"/>
+            <a:r>
+              <a:rPr lang="en-US" b="1" dirty="0"/>
+              <a:t>public function </a:t>
+            </a:r>
+            <a:r>
+              <a:rPr lang="en-US" b="1" dirty="0" err="1"/>
+              <a:t>hasAnyRol</a:t>
+            </a:r>
+            <a:r>
+              <a:rPr lang="en-US" b="1" dirty="0"/>
+              <a:t>($</a:t>
+            </a:r>
+            <a:r>
+              <a:rPr lang="en-US" b="1" dirty="0" err="1"/>
+              <a:t>rols</a:t>
+            </a:r>
+            <a:r>
+              <a:rPr lang="en-US" b="1" dirty="0"/>
+              <a:t>){</a:t>
+            </a:r>
+            <a:br>
+              <a:rPr lang="en-US" b="1" dirty="0"/>
+            </a:br>
+            <a:r>
+              <a:rPr lang="en-US" b="1" dirty="0"/>
+              <a:t>	if(</a:t>
+            </a:r>
+            <a:r>
+              <a:rPr lang="en-US" b="1" dirty="0" err="1"/>
+              <a:t>is_array</a:t>
+            </a:r>
+            <a:r>
+              <a:rPr lang="en-US" b="1" dirty="0"/>
+              <a:t>($</a:t>
+            </a:r>
+            <a:r>
+              <a:rPr lang="en-US" b="1" dirty="0" err="1"/>
+              <a:t>rols</a:t>
+            </a:r>
+            <a:r>
+              <a:rPr lang="en-US" b="1" dirty="0"/>
+              <a:t>)){</a:t>
+            </a:r>
+            <a:br>
+              <a:rPr lang="en-US" b="1" dirty="0"/>
+            </a:br>
+            <a:r>
+              <a:rPr lang="en-US" b="1" dirty="0"/>
+              <a:t>		foreach($</a:t>
+            </a:r>
+            <a:r>
+              <a:rPr lang="en-US" b="1" dirty="0" err="1"/>
+              <a:t>rols</a:t>
+            </a:r>
+            <a:r>
+              <a:rPr lang="en-US" b="1" dirty="0"/>
+              <a:t> as $</a:t>
+            </a:r>
+            <a:r>
+              <a:rPr lang="en-US" b="1" dirty="0" err="1"/>
+              <a:t>rol</a:t>
+            </a:r>
+            <a:r>
+              <a:rPr lang="en-US" b="1" dirty="0"/>
+              <a:t>){</a:t>
+            </a:r>
+            <a:br>
+              <a:rPr lang="en-US" b="1" dirty="0"/>
+            </a:br>
+            <a:r>
+              <a:rPr lang="en-US" b="1" dirty="0"/>
+              <a:t>			if($this-&gt;</a:t>
+            </a:r>
+            <a:r>
+              <a:rPr lang="en-US" b="1" dirty="0" err="1"/>
+              <a:t>hasRol</a:t>
+            </a:r>
+            <a:r>
+              <a:rPr lang="en-US" b="1" dirty="0"/>
+              <a:t>($</a:t>
+            </a:r>
+            <a:r>
+              <a:rPr lang="en-US" b="1" dirty="0" err="1"/>
+              <a:t>rol</a:t>
+            </a:r>
+            <a:r>
+              <a:rPr lang="en-US" b="1" dirty="0"/>
+              <a:t>)){</a:t>
+            </a:r>
+          </a:p>
+          <a:p>
+            <a:pPr marL="685800" lvl="3" indent="0">
+              <a:buNone/>
+            </a:pPr>
+            <a:r>
+              <a:rPr lang="en-US" b="1" dirty="0"/>
+              <a:t>				return true;</a:t>
+            </a:r>
+            <a:br>
+              <a:rPr lang="en-US" b="1" dirty="0"/>
+            </a:br>
+            <a:r>
+              <a:rPr lang="en-US" b="1" dirty="0"/>
+              <a:t>			}</a:t>
+            </a:r>
           </a:p>
           <a:p>
             <a:pPr marL="228600" lvl="1" indent="0">
@@ -4865,11 +4897,27 @@
             </a:pPr>
             <a:r>
               <a:rPr lang="en-US" b="1" dirty="0"/>
-              <a:t>public function </a:t>
+              <a:t>		}</a:t>
+            </a:r>
+            <a:br>
+              <a:rPr lang="en-US" b="1" dirty="0"/>
+            </a:br>
+            <a:r>
+              <a:rPr lang="en-US" b="1" dirty="0"/>
+              <a:t>	}else{</a:t>
+            </a:r>
+          </a:p>
+          <a:p>
+            <a:pPr marL="228600" lvl="1" indent="0">
+              <a:buNone/>
+            </a:pPr>
+            <a:r>
+              <a:rPr lang="en-US" b="1" dirty="0"/>
+              <a:t>		if($this-&gt;</a:t>
             </a:r>
             <a:r>
               <a:rPr lang="en-US" b="1" dirty="0" err="1"/>
-              <a:t>authorizeRols</a:t>
+              <a:t>hasRol</a:t>
             </a:r>
             <a:r>
               <a:rPr lang="en-US" b="1" dirty="0"/>
@@ -4877,71 +4925,43 @@
             </a:r>
             <a:r>
               <a:rPr lang="en-US" b="1" dirty="0" err="1"/>
-              <a:t>rols</a:t>
-            </a:r>
-            <a:r>
-              <a:rPr lang="en-US" b="1" dirty="0"/>
-              <a:t>){</a:t>
+              <a:t>rol</a:t>
+            </a:r>
+            <a:r>
+              <a:rPr lang="en-US" b="1" dirty="0"/>
+              <a:t>)){</a:t>
+            </a:r>
+          </a:p>
+          <a:p>
+            <a:pPr marL="228600" lvl="1" indent="0">
+              <a:buNone/>
+            </a:pPr>
+            <a:r>
+              <a:rPr lang="en-US" b="1" dirty="0"/>
+              <a:t>			return true;</a:t>
             </a:r>
             <a:br>
               <a:rPr lang="en-US" b="1" dirty="0"/>
             </a:br>
             <a:r>
               <a:rPr lang="en-US" b="1" dirty="0"/>
-              <a:t>	if($this-&gt;</a:t>
-            </a:r>
-            <a:r>
-              <a:rPr lang="en-US" b="1" dirty="0" err="1"/>
-              <a:t>hasAnyRol</a:t>
-            </a:r>
-            <a:r>
-              <a:rPr lang="en-US" b="1" dirty="0"/>
-              <a:t>($</a:t>
-            </a:r>
-            <a:r>
-              <a:rPr lang="en-US" b="1" dirty="0" err="1"/>
-              <a:t>rols</a:t>
-            </a:r>
-            <a:r>
-              <a:rPr lang="en-US" b="1" dirty="0"/>
-              <a:t>){</a:t>
+              <a:t>		}</a:t>
             </a:r>
             <a:br>
               <a:rPr lang="en-US" b="1" dirty="0"/>
             </a:br>
             <a:r>
               <a:rPr lang="en-US" b="1" dirty="0"/>
-              <a:t>		return true;</a:t>
-            </a:r>
-            <a:br>
-              <a:rPr lang="en-US" b="1" dirty="0"/>
-            </a:br>
-            <a:r>
-              <a:rPr lang="en-US" b="1" dirty="0"/>
               <a:t>	}</a:t>
             </a:r>
-            <a:br>
-              <a:rPr lang="en-US" b="1" dirty="0"/>
-            </a:br>
-            <a:r>
-              <a:rPr lang="en-US" b="1" dirty="0"/>
-              <a:t>	abort(401, ‘</a:t>
-            </a:r>
-            <a:r>
-              <a:rPr lang="en-US" b="1" dirty="0" err="1"/>
-              <a:t>Accion</a:t>
-            </a:r>
-            <a:r>
-              <a:rPr lang="en-US" b="1" dirty="0"/>
-              <a:t> no </a:t>
-            </a:r>
-            <a:r>
-              <a:rPr lang="en-US" b="1" dirty="0" err="1"/>
-              <a:t>autorhizada</a:t>
-            </a:r>
-            <a:r>
-              <a:rPr lang="en-US" b="1" dirty="0"/>
-              <a:t>’);</a:t>
+          </a:p>
+          <a:p>
+            <a:pPr marL="228600" lvl="1" indent="0">
+              <a:buNone/>
+            </a:pPr>
+            <a:r>
+              <a:rPr lang="en-US" b="1" dirty="0"/>
+              <a:t>	return false;</a:t>
             </a:r>
             <a:br>
               <a:rPr lang="en-US" b="1" dirty="0"/>
@@ -4957,7 +4977,7 @@
     </p:spTree>
     <p:extLst>
       <p:ext uri="{BB962C8B-B14F-4D97-AF65-F5344CB8AC3E}">
-        <p14:creationId xmlns:p14="http://schemas.microsoft.com/office/powerpoint/2010/main" val="2592745946"/>
+        <p14:creationId xmlns:p14="http://schemas.microsoft.com/office/powerpoint/2010/main" val="162151903"/>
       </p:ext>
     </p:extLst>
   </p:cSld>
@@ -4989,7 +5009,7 @@
           <p:cNvPr id="2" name="Title 1">
             <a:extLst>
               <a:ext uri="{FF2B5EF4-FFF2-40B4-BE49-F238E27FC236}">
-                <a16:creationId xmlns:a16="http://schemas.microsoft.com/office/drawing/2014/main" id="{749DF25B-C662-44FB-BCD6-73AD5DEBBB7F}"/>
+                <a16:creationId xmlns:a16="http://schemas.microsoft.com/office/drawing/2014/main" id="{C5525EA4-AC0F-4C61-A5E5-7B2A8674736A}"/>
               </a:ext>
             </a:extLst>
           </p:cNvPr>
@@ -5005,7 +5025,7 @@
           <a:bodyPr/>
           <a:lstStyle/>
           <a:p>
-            <a:endParaRPr lang="es-MX"/>
+            <a:endParaRPr lang="es-MX" dirty="0"/>
           </a:p>
         </p:txBody>
       </p:sp>
@@ -5014,7 +5034,7 @@
           <p:cNvPr id="3" name="Content Placeholder 2">
             <a:extLst>
               <a:ext uri="{FF2B5EF4-FFF2-40B4-BE49-F238E27FC236}">
-                <a16:creationId xmlns:a16="http://schemas.microsoft.com/office/drawing/2014/main" id="{4403E045-3A36-478D-A5E5-DB00779E52EC}"/>
+                <a16:creationId xmlns:a16="http://schemas.microsoft.com/office/drawing/2014/main" id="{3D7CC8E2-FD64-48B2-A98E-BEEAB00E918F}"/>
               </a:ext>
             </a:extLst>
           </p:cNvPr>
@@ -5031,16 +5051,12 @@
           <a:lstStyle/>
           <a:p>
             <a:r>
-              <a:rPr lang="en-US" dirty="0" err="1"/>
-              <a:t>Despues</a:t>
-            </a:r>
-            <a:r>
-              <a:rPr lang="en-US" dirty="0"/>
-              <a:t> de </a:t>
-            </a:r>
-            <a:r>
-              <a:rPr lang="en-US" dirty="0" err="1"/>
-              <a:t>esto</a:t>
+              <a:rPr lang="en-US" dirty="0"/>
+              <a:t>Si </a:t>
+            </a:r>
+            <a:r>
+              <a:rPr lang="en-US" dirty="0" err="1"/>
+              <a:t>gustan</a:t>
             </a:r>
             <a:r>
               <a:rPr lang="en-US" dirty="0"/>
@@ -5048,66 +5064,41 @@
             </a:r>
             <a:r>
               <a:rPr lang="en-US" dirty="0" err="1"/>
-              <a:t>ya</a:t>
-            </a:r>
-            <a:r>
-              <a:rPr lang="en-US" dirty="0"/>
-              <a:t> solo se require </a:t>
-            </a:r>
-            <a:r>
-              <a:rPr lang="en-US" dirty="0" err="1"/>
-              <a:t>llamar</a:t>
-            </a:r>
-            <a:r>
-              <a:rPr lang="en-US" dirty="0"/>
-              <a:t> a la function, se </a:t>
-            </a:r>
-            <a:r>
-              <a:rPr lang="en-US" dirty="0" err="1"/>
-              <a:t>puede</a:t>
-            </a:r>
-            <a:r>
-              <a:rPr lang="en-US" dirty="0"/>
-              <a:t> </a:t>
-            </a:r>
-            <a:r>
-              <a:rPr lang="en-US" dirty="0" err="1"/>
-              <a:t>realizar</a:t>
-            </a:r>
-            <a:r>
-              <a:rPr lang="en-US" dirty="0"/>
-              <a:t> </a:t>
-            </a:r>
-            <a:r>
-              <a:rPr lang="en-US" dirty="0" err="1"/>
-              <a:t>en</a:t>
-            </a:r>
-            <a:r>
-              <a:rPr lang="en-US" dirty="0"/>
-              <a:t> un </a:t>
-            </a:r>
-            <a:r>
-              <a:rPr lang="en-US" dirty="0" err="1"/>
-              <a:t>controlador</a:t>
-            </a:r>
-            <a:r>
-              <a:rPr lang="en-US" dirty="0"/>
-              <a:t> o </a:t>
-            </a:r>
-            <a:r>
-              <a:rPr lang="en-US" dirty="0" err="1"/>
-              <a:t>en</a:t>
-            </a:r>
-            <a:r>
-              <a:rPr lang="en-US" dirty="0"/>
-              <a:t> un middleware</a:t>
-            </a:r>
-          </a:p>
-          <a:p>
-            <a:pPr lvl="1"/>
-            <a:r>
-              <a:rPr lang="en-US" b="1" dirty="0"/>
-              <a:t>$request-&gt;user()-&gt;</a:t>
+              <a:t>agregar</a:t>
+            </a:r>
+            <a:r>
+              <a:rPr lang="en-US" dirty="0"/>
+              <a:t> una </a:t>
+            </a:r>
+            <a:r>
+              <a:rPr lang="en-US" dirty="0" err="1"/>
+              <a:t>pantalla</a:t>
+            </a:r>
+            <a:r>
+              <a:rPr lang="en-US" dirty="0"/>
+              <a:t> de error </a:t>
+            </a:r>
+            <a:r>
+              <a:rPr lang="en-US" dirty="0" err="1"/>
+              <a:t>pueden</a:t>
+            </a:r>
+            <a:r>
+              <a:rPr lang="en-US" dirty="0"/>
+              <a:t> realizer lo </a:t>
+            </a:r>
+            <a:r>
+              <a:rPr lang="en-US" dirty="0" err="1"/>
+              <a:t>sigueinte</a:t>
+            </a:r>
+            <a:endParaRPr lang="en-US" dirty="0"/>
+          </a:p>
+          <a:p>
+            <a:pPr marL="228600" lvl="1" indent="0">
+              <a:buNone/>
+            </a:pPr>
+            <a:r>
+              <a:rPr lang="en-US" b="1" dirty="0"/>
+              <a:t>public function </a:t>
             </a:r>
             <a:r>
               <a:rPr lang="en-US" b="1" dirty="0" err="1"/>
@@ -5115,88 +5106,91 @@
             </a:r>
             <a:r>
               <a:rPr lang="en-US" b="1" dirty="0"/>
-              <a:t>(‘admin’);</a:t>
-            </a:r>
-          </a:p>
-          <a:p>
-            <a:r>
-              <a:rPr lang="en-US" dirty="0" err="1"/>
-              <a:t>En</a:t>
-            </a:r>
-            <a:r>
-              <a:rPr lang="en-US" dirty="0"/>
-              <a:t> </a:t>
-            </a:r>
-            <a:r>
-              <a:rPr lang="en-US" dirty="0" err="1"/>
-              <a:t>tal</a:t>
-            </a:r>
-            <a:r>
-              <a:rPr lang="en-US" dirty="0"/>
-              <a:t> </a:t>
-            </a:r>
-            <a:r>
-              <a:rPr lang="en-US" dirty="0" err="1"/>
-              <a:t>caso</a:t>
-            </a:r>
-            <a:r>
-              <a:rPr lang="en-US" dirty="0"/>
-              <a:t> de que </a:t>
-            </a:r>
-            <a:r>
-              <a:rPr lang="en-US" dirty="0" err="1"/>
-              <a:t>quieran</a:t>
-            </a:r>
-            <a:r>
-              <a:rPr lang="en-US" dirty="0"/>
-              <a:t> de una </a:t>
-            </a:r>
-            <a:r>
-              <a:rPr lang="en-US" dirty="0" err="1"/>
-              <a:t>eleccion</a:t>
-            </a:r>
-            <a:r>
-              <a:rPr lang="en-US" dirty="0"/>
-              <a:t> de roles</a:t>
-            </a:r>
-          </a:p>
-          <a:p>
-            <a:pPr lvl="1"/>
-            <a:r>
-              <a:rPr lang="en-US" b="1" dirty="0"/>
-              <a:t>$request-&gt;user()-&gt;</a:t>
+              <a:t>($</a:t>
             </a:r>
             <a:r>
               <a:rPr lang="en-US" b="1" dirty="0" err="1"/>
-              <a:t>authorizeRols</a:t>
-            </a:r>
-            <a:r>
-              <a:rPr lang="en-US" b="1" dirty="0"/>
-              <a:t>([‘</a:t>
+              <a:t>rols</a:t>
+            </a:r>
+            <a:r>
+              <a:rPr lang="en-US" b="1" dirty="0"/>
+              <a:t>){</a:t>
+            </a:r>
+            <a:br>
+              <a:rPr lang="en-US" b="1" dirty="0"/>
+            </a:br>
+            <a:r>
+              <a:rPr lang="en-US" b="1" dirty="0"/>
+              <a:t>	if($this-&gt;</a:t>
             </a:r>
             <a:r>
               <a:rPr lang="en-US" b="1" dirty="0" err="1"/>
-              <a:t>admin’,’user</a:t>
-            </a:r>
-            <a:r>
-              <a:rPr lang="en-US" b="1" dirty="0"/>
-              <a:t>’]);</a:t>
-            </a:r>
-          </a:p>
-          <a:p>
-            <a:pPr lvl="1"/>
-            <a:endParaRPr lang="en-US" dirty="0"/>
-          </a:p>
-          <a:p>
-            <a:pPr lvl="1"/>
-            <a:endParaRPr lang="es-MX" dirty="0"/>
+              <a:t>hasAnyRol</a:t>
+            </a:r>
+            <a:r>
+              <a:rPr lang="en-US" b="1" dirty="0"/>
+              <a:t>($</a:t>
+            </a:r>
+            <a:r>
+              <a:rPr lang="en-US" b="1" dirty="0" err="1"/>
+              <a:t>rols</a:t>
+            </a:r>
+            <a:r>
+              <a:rPr lang="en-US" b="1" dirty="0"/>
+              <a:t>){</a:t>
+            </a:r>
+            <a:br>
+              <a:rPr lang="en-US" b="1" dirty="0"/>
+            </a:br>
+            <a:r>
+              <a:rPr lang="en-US" b="1" dirty="0"/>
+              <a:t>		return true;</a:t>
+            </a:r>
+            <a:br>
+              <a:rPr lang="en-US" b="1" dirty="0"/>
+            </a:br>
+            <a:r>
+              <a:rPr lang="en-US" b="1" dirty="0"/>
+              <a:t>	}</a:t>
+            </a:r>
+            <a:br>
+              <a:rPr lang="en-US" b="1" dirty="0"/>
+            </a:br>
+            <a:r>
+              <a:rPr lang="en-US" b="1" dirty="0"/>
+              <a:t>	abort(401, ‘</a:t>
+            </a:r>
+            <a:r>
+              <a:rPr lang="en-US" b="1" dirty="0" err="1"/>
+              <a:t>Accion</a:t>
+            </a:r>
+            <a:r>
+              <a:rPr lang="en-US" b="1" dirty="0"/>
+              <a:t> no </a:t>
+            </a:r>
+            <a:r>
+              <a:rPr lang="en-US" b="1" dirty="0" err="1"/>
+              <a:t>autorhizada</a:t>
+            </a:r>
+            <a:r>
+              <a:rPr lang="en-US" b="1" dirty="0"/>
+              <a:t>’);</a:t>
+            </a:r>
+            <a:br>
+              <a:rPr lang="en-US" b="1" dirty="0"/>
+            </a:br>
+            <a:r>
+              <a:rPr lang="en-US" b="1" dirty="0"/>
+              <a:t>}</a:t>
+            </a:r>
+            <a:endParaRPr lang="es-MX" b="1" dirty="0"/>
           </a:p>
         </p:txBody>
       </p:sp>
     </p:spTree>
     <p:extLst>
       <p:ext uri="{BB962C8B-B14F-4D97-AF65-F5344CB8AC3E}">
-        <p14:creationId xmlns:p14="http://schemas.microsoft.com/office/powerpoint/2010/main" val="88567574"/>
+        <p14:creationId xmlns:p14="http://schemas.microsoft.com/office/powerpoint/2010/main" val="2592745946"/>
       </p:ext>
     </p:extLst>
   </p:cSld>
@@ -5228,7 +5222,7 @@
           <p:cNvPr id="2" name="Title 1">
             <a:extLst>
               <a:ext uri="{FF2B5EF4-FFF2-40B4-BE49-F238E27FC236}">
-                <a16:creationId xmlns:a16="http://schemas.microsoft.com/office/drawing/2014/main" id="{037EF00B-6628-412E-8ACD-E3C4064FD20A}"/>
+                <a16:creationId xmlns:a16="http://schemas.microsoft.com/office/drawing/2014/main" id="{749DF25B-C662-44FB-BCD6-73AD5DEBBB7F}"/>
               </a:ext>
             </a:extLst>
           </p:cNvPr>
@@ -5244,7 +5238,7 @@
           <a:bodyPr/>
           <a:lstStyle/>
           <a:p>
-            <a:endParaRPr lang="es-MX" dirty="0"/>
+            <a:endParaRPr lang="es-MX"/>
           </a:p>
         </p:txBody>
       </p:sp>
@@ -5253,7 +5247,7 @@
           <p:cNvPr id="3" name="Content Placeholder 2">
             <a:extLst>
               <a:ext uri="{FF2B5EF4-FFF2-40B4-BE49-F238E27FC236}">
-                <a16:creationId xmlns:a16="http://schemas.microsoft.com/office/drawing/2014/main" id="{8C531460-1861-4DEE-A2F1-BF407DFDD132}"/>
+                <a16:creationId xmlns:a16="http://schemas.microsoft.com/office/drawing/2014/main" id="{4403E045-3A36-478D-A5E5-DB00779E52EC}"/>
               </a:ext>
             </a:extLst>
           </p:cNvPr>
@@ -5270,18 +5264,16 @@
           <a:lstStyle/>
           <a:p>
             <a:r>
-              <a:rPr lang="en-US" dirty="0"/>
-              <a:t>Extra</a:t>
-            </a:r>
-          </a:p>
-          <a:p>
-            <a:r>
-              <a:rPr lang="en-US" dirty="0"/>
-              <a:t>El error </a:t>
-            </a:r>
-            <a:r>
-              <a:rPr lang="en-US" dirty="0" err="1"/>
-              <a:t>nos</a:t>
+              <a:rPr lang="en-US" dirty="0" err="1"/>
+              <a:t>Despues</a:t>
+            </a:r>
+            <a:r>
+              <a:rPr lang="en-US" dirty="0"/>
+              <a:t> de </a:t>
+            </a:r>
+            <a:r>
+              <a:rPr lang="en-US" dirty="0" err="1"/>
+              <a:t>esto</a:t>
             </a:r>
             <a:r>
               <a:rPr lang="en-US" dirty="0"/>
@@ -5289,7 +5281,39 @@
             </a:r>
             <a:r>
               <a:rPr lang="en-US" dirty="0" err="1"/>
-              <a:t>mandara</a:t>
+              <a:t>ya</a:t>
+            </a:r>
+            <a:r>
+              <a:rPr lang="en-US" dirty="0"/>
+              <a:t> solo se require </a:t>
+            </a:r>
+            <a:r>
+              <a:rPr lang="en-US" dirty="0" err="1"/>
+              <a:t>llamar</a:t>
+            </a:r>
+            <a:r>
+              <a:rPr lang="en-US" dirty="0"/>
+              <a:t> a la function, se </a:t>
+            </a:r>
+            <a:r>
+              <a:rPr lang="en-US" dirty="0" err="1"/>
+              <a:t>puede</a:t>
+            </a:r>
+            <a:r>
+              <a:rPr lang="en-US" dirty="0"/>
+              <a:t> </a:t>
+            </a:r>
+            <a:r>
+              <a:rPr lang="en-US" dirty="0" err="1"/>
+              <a:t>realizar</a:t>
+            </a:r>
+            <a:r>
+              <a:rPr lang="en-US" dirty="0"/>
+              <a:t> </a:t>
+            </a:r>
+            <a:r>
+              <a:rPr lang="en-US" dirty="0" err="1"/>
+              <a:t>en</a:t>
             </a:r>
             <a:r>
               <a:rPr lang="en-US" dirty="0"/>
@@ -5297,39 +5321,40 @@
             </a:r>
             <a:r>
               <a:rPr lang="en-US" dirty="0" err="1"/>
-              <a:t>codigo</a:t>
-            </a:r>
-            <a:r>
-              <a:rPr lang="en-US" dirty="0"/>
-              <a:t> 401 lo </a:t>
-            </a:r>
-            <a:r>
-              <a:rPr lang="en-US" dirty="0" err="1"/>
-              <a:t>cual</a:t>
-            </a:r>
-            <a:r>
-              <a:rPr lang="en-US" dirty="0"/>
-              <a:t> es un </a:t>
-            </a:r>
-            <a:r>
-              <a:rPr lang="en-US" dirty="0" err="1"/>
-              <a:t>acceso</a:t>
-            </a:r>
-            <a:r>
-              <a:rPr lang="en-US" dirty="0"/>
-              <a:t> no </a:t>
-            </a:r>
-            <a:r>
-              <a:rPr lang="en-US" dirty="0" err="1"/>
-              <a:t>autorizado</a:t>
-            </a:r>
-            <a:r>
-              <a:rPr lang="en-US" dirty="0"/>
-              <a:t>, </a:t>
-            </a:r>
-            <a:r>
-              <a:rPr lang="en-US" dirty="0" err="1"/>
-              <a:t>nos</a:t>
+              <a:t>controlador</a:t>
+            </a:r>
+            <a:r>
+              <a:rPr lang="en-US" dirty="0"/>
+              <a:t> o </a:t>
+            </a:r>
+            <a:r>
+              <a:rPr lang="en-US" dirty="0" err="1"/>
+              <a:t>en</a:t>
+            </a:r>
+            <a:r>
+              <a:rPr lang="en-US" dirty="0"/>
+              <a:t> un middleware</a:t>
+            </a:r>
+          </a:p>
+          <a:p>
+            <a:pPr lvl="1"/>
+            <a:r>
+              <a:rPr lang="en-US" b="1" dirty="0"/>
+              <a:t>$request-&gt;user()-&gt;</a:t>
+            </a:r>
+            <a:r>
+              <a:rPr lang="en-US" b="1" dirty="0" err="1"/>
+              <a:t>authorizeRols</a:t>
+            </a:r>
+            <a:r>
+              <a:rPr lang="en-US" b="1" dirty="0"/>
+              <a:t>(‘admin’);</a:t>
+            </a:r>
+          </a:p>
+          <a:p>
+            <a:r>
+              <a:rPr lang="en-US" dirty="0" err="1"/>
+              <a:t>En</a:t>
             </a:r>
             <a:r>
               <a:rPr lang="en-US" dirty="0"/>
@@ -5337,15 +5362,7 @@
             </a:r>
             <a:r>
               <a:rPr lang="en-US" dirty="0" err="1"/>
-              <a:t>mandara</a:t>
-            </a:r>
-            <a:r>
-              <a:rPr lang="en-US" dirty="0"/>
-              <a:t> a una Ventana, </a:t>
-            </a:r>
-            <a:r>
-              <a:rPr lang="en-US" dirty="0" err="1"/>
-              <a:t>en</a:t>
+              <a:t>tal</a:t>
             </a:r>
             <a:r>
               <a:rPr lang="en-US" dirty="0"/>
@@ -5357,154 +5374,54 @@
             </a:r>
             <a:r>
               <a:rPr lang="en-US" dirty="0"/>
-              <a:t> de no </a:t>
-            </a:r>
-            <a:r>
-              <a:rPr lang="en-US" dirty="0" err="1"/>
-              <a:t>existir</a:t>
-            </a:r>
-            <a:r>
-              <a:rPr lang="en-US" dirty="0"/>
-              <a:t> la </a:t>
-            </a:r>
-            <a:r>
-              <a:rPr lang="en-US" dirty="0" err="1"/>
-              <a:t>podemos</a:t>
-            </a:r>
-            <a:r>
-              <a:rPr lang="en-US" dirty="0"/>
-              <a:t> </a:t>
-            </a:r>
-            <a:r>
-              <a:rPr lang="en-US" dirty="0" err="1"/>
-              <a:t>crear</a:t>
-            </a:r>
+              <a:t> de que </a:t>
+            </a:r>
+            <a:r>
+              <a:rPr lang="en-US" dirty="0" err="1"/>
+              <a:t>quieran</a:t>
+            </a:r>
+            <a:r>
+              <a:rPr lang="en-US" dirty="0"/>
+              <a:t> de una </a:t>
+            </a:r>
+            <a:r>
+              <a:rPr lang="en-US" dirty="0" err="1"/>
+              <a:t>eleccion</a:t>
+            </a:r>
+            <a:r>
+              <a:rPr lang="en-US" dirty="0"/>
+              <a:t> de roles</a:t>
+            </a:r>
+          </a:p>
+          <a:p>
+            <a:pPr lvl="1"/>
+            <a:r>
+              <a:rPr lang="en-US" b="1" dirty="0"/>
+              <a:t>$request-&gt;user()-&gt;</a:t>
+            </a:r>
+            <a:r>
+              <a:rPr lang="en-US" b="1" dirty="0" err="1"/>
+              <a:t>authorizeRols</a:t>
+            </a:r>
+            <a:r>
+              <a:rPr lang="en-US" b="1" dirty="0"/>
+              <a:t>([‘</a:t>
+            </a:r>
+            <a:r>
+              <a:rPr lang="en-US" b="1" dirty="0" err="1"/>
+              <a:t>admin’,’user</a:t>
+            </a:r>
+            <a:r>
+              <a:rPr lang="en-US" b="1" dirty="0"/>
+              <a:t>’]);</a:t>
+            </a:r>
+          </a:p>
+          <a:p>
+            <a:pPr lvl="1"/>
             <a:endParaRPr lang="en-US" dirty="0"/>
           </a:p>
           <a:p>
-            <a:r>
-              <a:rPr lang="en-US" dirty="0" err="1"/>
-              <a:t>Simplemente</a:t>
-            </a:r>
-            <a:r>
-              <a:rPr lang="en-US" dirty="0"/>
-              <a:t> </a:t>
-            </a:r>
-            <a:r>
-              <a:rPr lang="en-US" dirty="0" err="1"/>
-              <a:t>vamos</a:t>
-            </a:r>
-            <a:r>
-              <a:rPr lang="en-US" dirty="0"/>
-              <a:t> a </a:t>
-            </a:r>
-            <a:r>
-              <a:rPr lang="en-US" b="1" dirty="0"/>
-              <a:t>resources/views</a:t>
-            </a:r>
-            <a:r>
-              <a:rPr lang="en-US" dirty="0"/>
-              <a:t> y </a:t>
-            </a:r>
-            <a:r>
-              <a:rPr lang="en-US" dirty="0" err="1"/>
-              <a:t>crearemos</a:t>
-            </a:r>
-            <a:r>
-              <a:rPr lang="en-US" dirty="0"/>
-              <a:t> la </a:t>
-            </a:r>
-            <a:r>
-              <a:rPr lang="en-US" dirty="0" err="1"/>
-              <a:t>carpeta</a:t>
-            </a:r>
-            <a:r>
-              <a:rPr lang="en-US" dirty="0"/>
-              <a:t> </a:t>
-            </a:r>
-            <a:r>
-              <a:rPr lang="en-US" b="1" dirty="0"/>
-              <a:t>errors</a:t>
-            </a:r>
-            <a:r>
-              <a:rPr lang="en-US" dirty="0"/>
-              <a:t> </a:t>
-            </a:r>
-            <a:r>
-              <a:rPr lang="en-US" dirty="0" err="1"/>
-              <a:t>si</a:t>
-            </a:r>
-            <a:r>
-              <a:rPr lang="en-US" dirty="0"/>
-              <a:t> es que no </a:t>
-            </a:r>
-            <a:r>
-              <a:rPr lang="en-US" dirty="0" err="1"/>
-              <a:t>existe</a:t>
-            </a:r>
-            <a:r>
-              <a:rPr lang="en-US" dirty="0"/>
-              <a:t> </a:t>
-            </a:r>
-            <a:r>
-              <a:rPr lang="en-US" dirty="0" err="1"/>
-              <a:t>ya</a:t>
-            </a:r>
-            <a:endParaRPr lang="en-US" dirty="0"/>
-          </a:p>
-          <a:p>
-            <a:r>
-              <a:rPr lang="en-US" dirty="0" err="1"/>
-              <a:t>Despues</a:t>
-            </a:r>
-            <a:r>
-              <a:rPr lang="en-US" dirty="0"/>
-              <a:t> de </a:t>
-            </a:r>
-            <a:r>
-              <a:rPr lang="en-US" dirty="0" err="1"/>
-              <a:t>esto</a:t>
-            </a:r>
-            <a:r>
-              <a:rPr lang="en-US" dirty="0"/>
-              <a:t> </a:t>
-            </a:r>
-            <a:r>
-              <a:rPr lang="en-US" dirty="0" err="1"/>
-              <a:t>crearemos</a:t>
-            </a:r>
-            <a:r>
-              <a:rPr lang="en-US" dirty="0"/>
-              <a:t> un </a:t>
-            </a:r>
-            <a:r>
-              <a:rPr lang="en-US" b="1" dirty="0"/>
-              <a:t>401.blade.php</a:t>
-            </a:r>
-            <a:r>
-              <a:rPr lang="en-US" dirty="0"/>
-              <a:t> y </a:t>
-            </a:r>
-            <a:r>
-              <a:rPr lang="en-US" dirty="0" err="1"/>
-              <a:t>colocaremos</a:t>
-            </a:r>
-            <a:r>
-              <a:rPr lang="en-US" dirty="0"/>
-              <a:t> el </a:t>
-            </a:r>
-            <a:r>
-              <a:rPr lang="en-US" dirty="0" err="1"/>
-              <a:t>formato</a:t>
-            </a:r>
-            <a:r>
-              <a:rPr lang="en-US" dirty="0"/>
-              <a:t> que </a:t>
-            </a:r>
-            <a:r>
-              <a:rPr lang="en-US" dirty="0" err="1"/>
-              <a:t>gustemos</a:t>
-            </a:r>
+            <a:pPr lvl="1"/>
             <a:endParaRPr lang="es-MX" dirty="0"/>
           </a:p>
         </p:txBody>
@@ -5512,7 +5429,7 @@
     </p:spTree>
     <p:extLst>
       <p:ext uri="{BB962C8B-B14F-4D97-AF65-F5344CB8AC3E}">
-        <p14:creationId xmlns:p14="http://schemas.microsoft.com/office/powerpoint/2010/main" val="2853818965"/>
+        <p14:creationId xmlns:p14="http://schemas.microsoft.com/office/powerpoint/2010/main" val="88567574"/>
       </p:ext>
     </p:extLst>
   </p:cSld>
@@ -5544,6 +5461,322 @@
           <p:cNvPr id="2" name="Title 1">
             <a:extLst>
               <a:ext uri="{FF2B5EF4-FFF2-40B4-BE49-F238E27FC236}">
+                <a16:creationId xmlns:a16="http://schemas.microsoft.com/office/drawing/2014/main" id="{037EF00B-6628-412E-8ACD-E3C4064FD20A}"/>
+              </a:ext>
+            </a:extLst>
+          </p:cNvPr>
+          <p:cNvSpPr>
+            <a:spLocks noGrp="1"/>
+          </p:cNvSpPr>
+          <p:nvPr>
+            <p:ph type="title"/>
+          </p:nvPr>
+        </p:nvSpPr>
+        <p:spPr/>
+        <p:txBody>
+          <a:bodyPr/>
+          <a:lstStyle/>
+          <a:p>
+            <a:endParaRPr lang="es-MX" dirty="0"/>
+          </a:p>
+        </p:txBody>
+      </p:sp>
+      <p:sp>
+        <p:nvSpPr>
+          <p:cNvPr id="3" name="Content Placeholder 2">
+            <a:extLst>
+              <a:ext uri="{FF2B5EF4-FFF2-40B4-BE49-F238E27FC236}">
+                <a16:creationId xmlns:a16="http://schemas.microsoft.com/office/drawing/2014/main" id="{8C531460-1861-4DEE-A2F1-BF407DFDD132}"/>
+              </a:ext>
+            </a:extLst>
+          </p:cNvPr>
+          <p:cNvSpPr>
+            <a:spLocks noGrp="1"/>
+          </p:cNvSpPr>
+          <p:nvPr>
+            <p:ph idx="1"/>
+          </p:nvPr>
+        </p:nvSpPr>
+        <p:spPr/>
+        <p:txBody>
+          <a:bodyPr/>
+          <a:lstStyle/>
+          <a:p>
+            <a:r>
+              <a:rPr lang="en-US" dirty="0"/>
+              <a:t>Extra</a:t>
+            </a:r>
+          </a:p>
+          <a:p>
+            <a:r>
+              <a:rPr lang="en-US" dirty="0"/>
+              <a:t>El error </a:t>
+            </a:r>
+            <a:r>
+              <a:rPr lang="en-US" dirty="0" err="1"/>
+              <a:t>nos</a:t>
+            </a:r>
+            <a:r>
+              <a:rPr lang="en-US" dirty="0"/>
+              <a:t> </a:t>
+            </a:r>
+            <a:r>
+              <a:rPr lang="en-US" dirty="0" err="1"/>
+              <a:t>mandara</a:t>
+            </a:r>
+            <a:r>
+              <a:rPr lang="en-US" dirty="0"/>
+              <a:t> un </a:t>
+            </a:r>
+            <a:r>
+              <a:rPr lang="en-US" dirty="0" err="1"/>
+              <a:t>codigo</a:t>
+            </a:r>
+            <a:r>
+              <a:rPr lang="en-US" dirty="0"/>
+              <a:t> 401 lo </a:t>
+            </a:r>
+            <a:r>
+              <a:rPr lang="en-US" dirty="0" err="1"/>
+              <a:t>cual</a:t>
+            </a:r>
+            <a:r>
+              <a:rPr lang="en-US" dirty="0"/>
+              <a:t> es un </a:t>
+            </a:r>
+            <a:r>
+              <a:rPr lang="en-US" dirty="0" err="1"/>
+              <a:t>acceso</a:t>
+            </a:r>
+            <a:r>
+              <a:rPr lang="en-US" dirty="0"/>
+              <a:t> no </a:t>
+            </a:r>
+            <a:r>
+              <a:rPr lang="en-US" dirty="0" err="1"/>
+              <a:t>autorizado</a:t>
+            </a:r>
+            <a:r>
+              <a:rPr lang="en-US" dirty="0"/>
+              <a:t>, </a:t>
+            </a:r>
+            <a:r>
+              <a:rPr lang="en-US" dirty="0" err="1"/>
+              <a:t>nos</a:t>
+            </a:r>
+            <a:r>
+              <a:rPr lang="en-US" dirty="0"/>
+              <a:t> </a:t>
+            </a:r>
+            <a:r>
+              <a:rPr lang="en-US" dirty="0" err="1"/>
+              <a:t>mandara</a:t>
+            </a:r>
+            <a:r>
+              <a:rPr lang="en-US" dirty="0"/>
+              <a:t> a una Ventana, </a:t>
+            </a:r>
+            <a:r>
+              <a:rPr lang="en-US" dirty="0" err="1"/>
+              <a:t>en</a:t>
+            </a:r>
+            <a:r>
+              <a:rPr lang="en-US" dirty="0"/>
+              <a:t> </a:t>
+            </a:r>
+            <a:r>
+              <a:rPr lang="en-US" dirty="0" err="1"/>
+              <a:t>caso</a:t>
+            </a:r>
+            <a:r>
+              <a:rPr lang="en-US" dirty="0"/>
+              <a:t> de no </a:t>
+            </a:r>
+            <a:r>
+              <a:rPr lang="en-US" dirty="0" err="1"/>
+              <a:t>existir</a:t>
+            </a:r>
+            <a:r>
+              <a:rPr lang="en-US" dirty="0"/>
+              <a:t> la </a:t>
+            </a:r>
+            <a:r>
+              <a:rPr lang="en-US" dirty="0" err="1"/>
+              <a:t>podemos</a:t>
+            </a:r>
+            <a:r>
+              <a:rPr lang="en-US" dirty="0"/>
+              <a:t> </a:t>
+            </a:r>
+            <a:r>
+              <a:rPr lang="en-US" dirty="0" err="1"/>
+              <a:t>crear</a:t>
+            </a:r>
+            <a:endParaRPr lang="en-US" dirty="0"/>
+          </a:p>
+          <a:p>
+            <a:r>
+              <a:rPr lang="en-US" dirty="0" err="1"/>
+              <a:t>Simplemente</a:t>
+            </a:r>
+            <a:r>
+              <a:rPr lang="en-US" dirty="0"/>
+              <a:t> </a:t>
+            </a:r>
+            <a:r>
+              <a:rPr lang="en-US" dirty="0" err="1"/>
+              <a:t>vamos</a:t>
+            </a:r>
+            <a:r>
+              <a:rPr lang="en-US" dirty="0"/>
+              <a:t> a </a:t>
+            </a:r>
+            <a:r>
+              <a:rPr lang="en-US" b="1" dirty="0"/>
+              <a:t>resources/views</a:t>
+            </a:r>
+            <a:r>
+              <a:rPr lang="en-US" dirty="0"/>
+              <a:t> y </a:t>
+            </a:r>
+            <a:r>
+              <a:rPr lang="en-US" dirty="0" err="1"/>
+              <a:t>crearemos</a:t>
+            </a:r>
+            <a:r>
+              <a:rPr lang="en-US" dirty="0"/>
+              <a:t> la </a:t>
+            </a:r>
+            <a:r>
+              <a:rPr lang="en-US" dirty="0" err="1"/>
+              <a:t>carpeta</a:t>
+            </a:r>
+            <a:r>
+              <a:rPr lang="en-US" dirty="0"/>
+              <a:t> </a:t>
+            </a:r>
+            <a:r>
+              <a:rPr lang="en-US" b="1" dirty="0"/>
+              <a:t>errors</a:t>
+            </a:r>
+            <a:r>
+              <a:rPr lang="en-US" dirty="0"/>
+              <a:t> </a:t>
+            </a:r>
+            <a:r>
+              <a:rPr lang="en-US" dirty="0" err="1"/>
+              <a:t>si</a:t>
+            </a:r>
+            <a:r>
+              <a:rPr lang="en-US" dirty="0"/>
+              <a:t> es que no </a:t>
+            </a:r>
+            <a:r>
+              <a:rPr lang="en-US" dirty="0" err="1"/>
+              <a:t>existe</a:t>
+            </a:r>
+            <a:r>
+              <a:rPr lang="en-US" dirty="0"/>
+              <a:t> </a:t>
+            </a:r>
+            <a:r>
+              <a:rPr lang="en-US" dirty="0" err="1"/>
+              <a:t>ya</a:t>
+            </a:r>
+            <a:endParaRPr lang="en-US" dirty="0"/>
+          </a:p>
+          <a:p>
+            <a:r>
+              <a:rPr lang="en-US" dirty="0" err="1"/>
+              <a:t>Despues</a:t>
+            </a:r>
+            <a:r>
+              <a:rPr lang="en-US" dirty="0"/>
+              <a:t> de </a:t>
+            </a:r>
+            <a:r>
+              <a:rPr lang="en-US" dirty="0" err="1"/>
+              <a:t>esto</a:t>
+            </a:r>
+            <a:r>
+              <a:rPr lang="en-US" dirty="0"/>
+              <a:t> </a:t>
+            </a:r>
+            <a:r>
+              <a:rPr lang="en-US" dirty="0" err="1"/>
+              <a:t>crearemos</a:t>
+            </a:r>
+            <a:r>
+              <a:rPr lang="en-US" dirty="0"/>
+              <a:t> un </a:t>
+            </a:r>
+            <a:r>
+              <a:rPr lang="en-US" b="1" dirty="0"/>
+              <a:t>401.blade.php</a:t>
+            </a:r>
+            <a:r>
+              <a:rPr lang="en-US" dirty="0"/>
+              <a:t> y </a:t>
+            </a:r>
+            <a:r>
+              <a:rPr lang="en-US" dirty="0" err="1"/>
+              <a:t>colocaremos</a:t>
+            </a:r>
+            <a:r>
+              <a:rPr lang="en-US" dirty="0"/>
+              <a:t> el </a:t>
+            </a:r>
+            <a:r>
+              <a:rPr lang="en-US" dirty="0" err="1"/>
+              <a:t>formato</a:t>
+            </a:r>
+            <a:r>
+              <a:rPr lang="en-US" dirty="0"/>
+              <a:t> que </a:t>
+            </a:r>
+            <a:r>
+              <a:rPr lang="en-US" dirty="0" err="1"/>
+              <a:t>gustemos</a:t>
+            </a:r>
+            <a:endParaRPr lang="es-MX" dirty="0"/>
+          </a:p>
+        </p:txBody>
+      </p:sp>
+    </p:spTree>
+    <p:extLst>
+      <p:ext uri="{BB962C8B-B14F-4D97-AF65-F5344CB8AC3E}">
+        <p14:creationId xmlns:p14="http://schemas.microsoft.com/office/powerpoint/2010/main" val="2853818965"/>
+      </p:ext>
+    </p:extLst>
+  </p:cSld>
+  <p:clrMapOvr>
+    <a:masterClrMapping/>
+  </p:clrMapOvr>
+</p:sld>
+</file>
+
+<file path=ppt/slides/slide16.xml><?xml version="1.0" encoding="utf-8"?>
+<p:sld xmlns:a="http://schemas.openxmlformats.org/drawingml/2006/main" xmlns:r="http://schemas.openxmlformats.org/officeDocument/2006/relationships" xmlns:p="http://schemas.openxmlformats.org/presentationml/2006/main">
+  <p:cSld>
+    <p:spTree>
+      <p:nvGrpSpPr>
+        <p:cNvPr id="1" name=""/>
+        <p:cNvGrpSpPr/>
+        <p:nvPr/>
+      </p:nvGrpSpPr>
+      <p:grpSpPr>
+        <a:xfrm>
+          <a:off x="0" y="0"/>
+          <a:ext cx="0" cy="0"/>
+          <a:chOff x="0" y="0"/>
+          <a:chExt cx="0" cy="0"/>
+        </a:xfrm>
+      </p:grpSpPr>
+      <p:sp>
+        <p:nvSpPr>
+          <p:cNvPr id="2" name="Title 1">
+            <a:extLst>
+              <a:ext uri="{FF2B5EF4-FFF2-40B4-BE49-F238E27FC236}">
                 <a16:creationId xmlns:a16="http://schemas.microsoft.com/office/drawing/2014/main" id="{21101502-F76E-4912-9689-27A98BBD9B14}"/>
               </a:ext>
             </a:extLst>
@@ -5721,8 +5954,174 @@
               <a:t>migrate:fresh</a:t>
             </a:r>
             <a:r>
-              <a:rPr lang="en-US" b="1"/>
+              <a:rPr lang="en-US" b="1" dirty="0"/>
               <a:t> --seed</a:t>
+            </a:r>
+          </a:p>
+          <a:p>
+            <a:r>
+              <a:rPr lang="en-US" b="1" dirty="0"/>
+              <a:t>migrate: fresh</a:t>
+            </a:r>
+            <a:r>
+              <a:rPr lang="en-US" dirty="0"/>
+              <a:t> </a:t>
+            </a:r>
+            <a:r>
+              <a:rPr lang="en-US" dirty="0" err="1"/>
+              <a:t>nos</a:t>
+            </a:r>
+            <a:r>
+              <a:rPr lang="en-US" dirty="0"/>
+              <a:t> </a:t>
+            </a:r>
+            <a:r>
+              <a:rPr lang="en-US" dirty="0" err="1"/>
+              <a:t>permite</a:t>
+            </a:r>
+            <a:r>
+              <a:rPr lang="en-US" dirty="0"/>
+              <a:t> </a:t>
+            </a:r>
+            <a:r>
+              <a:rPr lang="en-US" dirty="0" err="1"/>
+              <a:t>tirar</a:t>
+            </a:r>
+            <a:r>
+              <a:rPr lang="en-US" dirty="0"/>
+              <a:t> </a:t>
+            </a:r>
+            <a:r>
+              <a:rPr lang="en-US" dirty="0" err="1"/>
+              <a:t>todas</a:t>
+            </a:r>
+            <a:r>
+              <a:rPr lang="en-US" dirty="0"/>
+              <a:t> las </a:t>
+            </a:r>
+            <a:r>
+              <a:rPr lang="en-US" dirty="0" err="1"/>
+              <a:t>tablas</a:t>
+            </a:r>
+            <a:r>
+              <a:rPr lang="en-US" dirty="0"/>
+              <a:t> de </a:t>
+            </a:r>
+            <a:r>
+              <a:rPr lang="en-US" dirty="0" err="1"/>
+              <a:t>nuestra</a:t>
+            </a:r>
+            <a:r>
+              <a:rPr lang="en-US" dirty="0"/>
+              <a:t> base de </a:t>
+            </a:r>
+            <a:r>
+              <a:rPr lang="en-US" dirty="0" err="1"/>
+              <a:t>dato</a:t>
+            </a:r>
+            <a:r>
+              <a:rPr lang="en-US" dirty="0"/>
+              <a:t> y </a:t>
+            </a:r>
+            <a:r>
+              <a:rPr lang="en-US" dirty="0" err="1"/>
+              <a:t>ejecutar</a:t>
+            </a:r>
+            <a:r>
+              <a:rPr lang="en-US" dirty="0"/>
+              <a:t> el </a:t>
+            </a:r>
+            <a:r>
+              <a:rPr lang="en-US" dirty="0" err="1"/>
+              <a:t>comando</a:t>
+            </a:r>
+            <a:r>
+              <a:rPr lang="en-US" dirty="0"/>
+              <a:t> </a:t>
+            </a:r>
+            <a:r>
+              <a:rPr lang="en-US" b="1" dirty="0"/>
+              <a:t>migrate</a:t>
+            </a:r>
+            <a:r>
+              <a:rPr lang="en-US" dirty="0"/>
+              <a:t> </a:t>
+            </a:r>
+            <a:r>
+              <a:rPr lang="en-US" dirty="0" err="1"/>
+              <a:t>nuevamente</a:t>
+            </a:r>
+            <a:r>
+              <a:rPr lang="en-US" dirty="0"/>
+              <a:t>, para que de </a:t>
+            </a:r>
+            <a:r>
+              <a:rPr lang="en-US" dirty="0" err="1"/>
+              <a:t>esta</a:t>
+            </a:r>
+            <a:r>
+              <a:rPr lang="en-US" dirty="0"/>
+              <a:t> </a:t>
+            </a:r>
+            <a:r>
+              <a:rPr lang="en-US" dirty="0" err="1"/>
+              <a:t>manera</a:t>
+            </a:r>
+            <a:r>
+              <a:rPr lang="en-US" dirty="0"/>
+              <a:t> lo </a:t>
+            </a:r>
+            <a:r>
+              <a:rPr lang="en-US" dirty="0" err="1"/>
+              <a:t>unico</a:t>
+            </a:r>
+            <a:r>
+              <a:rPr lang="en-US" dirty="0"/>
+              <a:t> que </a:t>
+            </a:r>
+            <a:r>
+              <a:rPr lang="en-US" dirty="0" err="1"/>
+              <a:t>exista</a:t>
+            </a:r>
+            <a:r>
+              <a:rPr lang="en-US" dirty="0"/>
+              <a:t> </a:t>
+            </a:r>
+            <a:r>
+              <a:rPr lang="en-US" dirty="0" err="1"/>
+              <a:t>en</a:t>
+            </a:r>
+            <a:r>
+              <a:rPr lang="en-US" dirty="0"/>
+              <a:t> </a:t>
+            </a:r>
+            <a:r>
+              <a:rPr lang="en-US" dirty="0" err="1"/>
+              <a:t>nuestra</a:t>
+            </a:r>
+            <a:r>
+              <a:rPr lang="en-US" dirty="0"/>
+              <a:t> base de </a:t>
+            </a:r>
+            <a:r>
+              <a:rPr lang="en-US" dirty="0" err="1"/>
+              <a:t>datos</a:t>
+            </a:r>
+            <a:r>
+              <a:rPr lang="en-US" dirty="0"/>
+              <a:t> sea </a:t>
+            </a:r>
+            <a:r>
+              <a:rPr lang="en-US" dirty="0" err="1"/>
+              <a:t>nuestros</a:t>
+            </a:r>
+            <a:r>
+              <a:rPr lang="en-US" dirty="0"/>
+              <a:t> </a:t>
+            </a:r>
+            <a:r>
+              <a:rPr lang="en-US" b="1" dirty="0"/>
+              <a:t>seeds</a:t>
             </a:r>
             <a:endParaRPr lang="es-MX" b="1" dirty="0"/>
           </a:p>
@@ -6260,7 +6659,7 @@
             </a:r>
             <a:r>
               <a:rPr lang="es-MX" b="1" dirty="0" err="1"/>
-              <a:t>crear_roles_de_usuario</a:t>
+              <a:t>créate_rol_user_table</a:t>
             </a:r>
             <a:endParaRPr lang="es-MX" b="1" dirty="0"/>
           </a:p>
@@ -6308,6 +6707,51 @@
               <a:rPr lang="es-MX" dirty="0"/>
               <a:t>.</a:t>
             </a:r>
+          </a:p>
+          <a:p>
+            <a:pPr lvl="1"/>
+            <a:r>
+              <a:rPr lang="es-MX" b="1" dirty="0"/>
+              <a:t>*En caso de no haber creado el código del </a:t>
+            </a:r>
+            <a:r>
+              <a:rPr lang="es-MX" b="1" dirty="0" err="1"/>
+              <a:t>scheme</a:t>
+            </a:r>
+            <a:r>
+              <a:rPr lang="es-MX" b="1" dirty="0"/>
+              <a:t> crearlo</a:t>
+            </a:r>
+          </a:p>
+          <a:p>
+            <a:r>
+              <a:rPr lang="es-MX" dirty="0"/>
+              <a:t>Terminando realizar </a:t>
+            </a:r>
+          </a:p>
+          <a:p>
+            <a:pPr lvl="1"/>
+            <a:r>
+              <a:rPr lang="es-MX" b="1" dirty="0" err="1"/>
+              <a:t>php</a:t>
+            </a:r>
+            <a:r>
+              <a:rPr lang="es-MX" b="1" dirty="0"/>
+              <a:t> </a:t>
+            </a:r>
+            <a:r>
+              <a:rPr lang="es-MX" b="1" dirty="0" err="1"/>
+              <a:t>artisan</a:t>
+            </a:r>
+            <a:r>
+              <a:rPr lang="es-MX" b="1" dirty="0"/>
+              <a:t> </a:t>
+            </a:r>
+            <a:r>
+              <a:rPr lang="es-MX" b="1" dirty="0" err="1"/>
+              <a:t>migrate</a:t>
+            </a:r>
+            <a:endParaRPr lang="es-MX" b="1" dirty="0"/>
           </a:p>
         </p:txBody>
       </p:sp>
@@ -6743,7 +7187,7 @@
             </a:r>
             <a:r>
               <a:rPr lang="es-MX" b="1" dirty="0" err="1"/>
-              <a:t>RoleTableSeeder</a:t>
+              <a:t>RolTableSeeder</a:t>
             </a:r>
             <a:endParaRPr lang="es-MX" b="1" dirty="0"/>
           </a:p>
@@ -6975,7 +7419,7 @@
           <p:cNvPr id="2" name="Title 1">
             <a:extLst>
               <a:ext uri="{FF2B5EF4-FFF2-40B4-BE49-F238E27FC236}">
-                <a16:creationId xmlns:a16="http://schemas.microsoft.com/office/drawing/2014/main" id="{23550AB8-06AB-45C0-B46B-795247EBA72B}"/>
+                <a16:creationId xmlns:a16="http://schemas.microsoft.com/office/drawing/2014/main" id="{6A4EB910-8AFF-4144-B7CD-E1D3745027FF}"/>
               </a:ext>
             </a:extLst>
           </p:cNvPr>
@@ -6991,15 +7435,7 @@
           <a:bodyPr/>
           <a:lstStyle/>
           <a:p>
-            <a:r>
-              <a:rPr lang="en-US" dirty="0" err="1"/>
-              <a:t>Rol</a:t>
-            </a:r>
-            <a:r>
-              <a:rPr lang="en-US" dirty="0"/>
-              <a:t> default</a:t>
-            </a:r>
-            <a:endParaRPr lang="es-MX" dirty="0"/>
+            <a:endParaRPr lang="es-MX"/>
           </a:p>
         </p:txBody>
       </p:sp>
@@ -7008,7 +7444,7 @@
           <p:cNvPr id="3" name="Content Placeholder 2">
             <a:extLst>
               <a:ext uri="{FF2B5EF4-FFF2-40B4-BE49-F238E27FC236}">
-                <a16:creationId xmlns:a16="http://schemas.microsoft.com/office/drawing/2014/main" id="{D0E0FDC3-C7E3-49CD-847F-2A6B828BB8DC}"/>
+                <a16:creationId xmlns:a16="http://schemas.microsoft.com/office/drawing/2014/main" id="{CEFE903A-80DF-44E7-BB2D-C20E9C614166}"/>
               </a:ext>
             </a:extLst>
           </p:cNvPr>
@@ -7025,135 +7461,77 @@
           <a:lstStyle/>
           <a:p>
             <a:r>
-              <a:rPr lang="en-US" dirty="0"/>
-              <a:t>Una </a:t>
-            </a:r>
-            <a:r>
-              <a:rPr lang="en-US" dirty="0" err="1"/>
-              <a:t>vez</a:t>
-            </a:r>
-            <a:r>
-              <a:rPr lang="en-US" dirty="0"/>
-              <a:t> que temenos lo </a:t>
-            </a:r>
-            <a:r>
-              <a:rPr lang="en-US" dirty="0" err="1"/>
-              <a:t>demas</a:t>
-            </a:r>
-            <a:r>
-              <a:rPr lang="en-US" dirty="0"/>
+              <a:rPr lang="es-MX" dirty="0"/>
+              <a:t>Terminando de crear los </a:t>
+            </a:r>
+            <a:r>
+              <a:rPr lang="es-MX" dirty="0" err="1"/>
+              <a:t>seeders</a:t>
+            </a:r>
+            <a:r>
+              <a:rPr lang="es-MX" dirty="0"/>
+              <a:t> pertinentes ir a </a:t>
+            </a:r>
+            <a:r>
+              <a:rPr lang="es-MX" b="1" dirty="0" err="1"/>
+              <a:t>DatabaseSeeder</a:t>
+            </a:r>
+            <a:r>
+              <a:rPr lang="es-MX" b="1" dirty="0"/>
               <a:t> </a:t>
             </a:r>
             <a:r>
-              <a:rPr lang="en-US" dirty="0" err="1"/>
-              <a:t>podemos</a:t>
-            </a:r>
-            <a:r>
-              <a:rPr lang="en-US" dirty="0"/>
+              <a:rPr lang="es-MX" dirty="0"/>
+              <a:t>dentro de </a:t>
+            </a:r>
+            <a:r>
+              <a:rPr lang="es-MX" b="1" dirty="0" err="1"/>
+              <a:t>database</a:t>
+            </a:r>
+            <a:r>
+              <a:rPr lang="es-MX" b="1" dirty="0"/>
+              <a:t>/</a:t>
+            </a:r>
+            <a:r>
+              <a:rPr lang="es-MX" b="1" dirty="0" err="1"/>
+              <a:t>seeds</a:t>
+            </a:r>
+            <a:r>
+              <a:rPr lang="es-MX" b="1" dirty="0"/>
               <a:t> </a:t>
             </a:r>
-            <a:r>
-              <a:rPr lang="en-US" dirty="0" err="1"/>
-              <a:t>ir</a:t>
-            </a:r>
-            <a:r>
-              <a:rPr lang="en-US" dirty="0"/>
-              <a:t> a la </a:t>
-            </a:r>
-            <a:r>
-              <a:rPr lang="en-US" dirty="0" err="1"/>
-              <a:t>direccion</a:t>
-            </a:r>
-            <a:r>
-              <a:rPr lang="en-US" dirty="0"/>
-              <a:t> </a:t>
-            </a:r>
-            <a:r>
-              <a:rPr lang="en-US" b="1" dirty="0"/>
-              <a:t>app/Http/Controllers/Auth/</a:t>
+          </a:p>
+          <a:p>
+            <a:r>
+              <a:rPr lang="es-MX" dirty="0"/>
+              <a:t>Aquí encontraremos una función llamada run y correremos el siguiente código</a:t>
+            </a:r>
+          </a:p>
+          <a:p>
+            <a:pPr lvl="1"/>
+            <a:r>
+              <a:rPr lang="es-MX" b="1" dirty="0"/>
+              <a:t>$</a:t>
+            </a:r>
+            <a:r>
+              <a:rPr lang="es-MX" b="1" dirty="0" err="1"/>
+              <a:t>this</a:t>
+            </a:r>
+            <a:r>
+              <a:rPr lang="es-MX" b="1" dirty="0"/>
+              <a:t>-</a:t>
+            </a:r>
+            <a:r>
+              <a:rPr lang="en-US" b="1" dirty="0"/>
+              <a:t>&gt;call(</a:t>
             </a:r>
             <a:r>
               <a:rPr lang="en-US" b="1" dirty="0" err="1"/>
-              <a:t>RegisterController.php</a:t>
-            </a:r>
-            <a:r>
-              <a:rPr lang="en-US" b="1" dirty="0"/>
-              <a:t> </a:t>
-            </a:r>
-            <a:r>
-              <a:rPr lang="en-US" dirty="0"/>
-              <a:t>de </a:t>
-            </a:r>
-            <a:r>
-              <a:rPr lang="en-US" dirty="0" err="1"/>
-              <a:t>esta</a:t>
-            </a:r>
-            <a:r>
-              <a:rPr lang="en-US" dirty="0"/>
-              <a:t> </a:t>
-            </a:r>
-            <a:r>
-              <a:rPr lang="en-US" dirty="0" err="1"/>
-              <a:t>manera</a:t>
-            </a:r>
-            <a:endParaRPr lang="en-US" dirty="0"/>
-          </a:p>
-          <a:p>
-            <a:r>
-              <a:rPr lang="en-US" dirty="0"/>
-              <a:t>Dentro de </a:t>
-            </a:r>
-            <a:r>
-              <a:rPr lang="en-US" dirty="0" err="1"/>
-              <a:t>su</a:t>
-            </a:r>
-            <a:r>
-              <a:rPr lang="en-US" dirty="0"/>
-              <a:t> function create </a:t>
-            </a:r>
-            <a:r>
-              <a:rPr lang="en-US" dirty="0" err="1"/>
-              <a:t>agregaremos</a:t>
-            </a:r>
-            <a:r>
-              <a:rPr lang="en-US" dirty="0"/>
-              <a:t> la </a:t>
-            </a:r>
-            <a:r>
-              <a:rPr lang="en-US" dirty="0" err="1"/>
-              <a:t>siguiente</a:t>
-            </a:r>
-            <a:r>
-              <a:rPr lang="en-US" dirty="0"/>
-              <a:t> </a:t>
-            </a:r>
-            <a:r>
-              <a:rPr lang="en-US" dirty="0" err="1"/>
-              <a:t>linea</a:t>
-            </a:r>
-            <a:endParaRPr lang="en-US" dirty="0"/>
-          </a:p>
-          <a:p>
-            <a:pPr lvl="1"/>
-            <a:r>
-              <a:rPr lang="en-US" b="1" dirty="0"/>
-              <a:t>$user-&gt;</a:t>
-            </a:r>
-            <a:r>
-              <a:rPr lang="en-US" b="1" dirty="0" err="1"/>
-              <a:t>rols</a:t>
-            </a:r>
-            <a:r>
-              <a:rPr lang="en-US" b="1" dirty="0"/>
-              <a:t>()-&gt;attach(Role::where(‘</a:t>
-            </a:r>
-            <a:r>
-              <a:rPr lang="en-US" b="1" dirty="0" err="1"/>
-              <a:t>name’,’user</a:t>
-            </a:r>
-            <a:r>
-              <a:rPr lang="en-US" b="1" dirty="0"/>
-              <a:t>’)-&gt;first());</a:t>
+              <a:t>NameSeeder</a:t>
+            </a:r>
+            <a:r>
+              <a:rPr lang="en-US" b="1" dirty="0"/>
+              <a:t>::class);</a:t>
             </a:r>
             <a:endParaRPr lang="es-MX" b="1" dirty="0"/>
           </a:p>
@@ -7162,7 +7540,7 @@
     </p:spTree>
     <p:extLst>
       <p:ext uri="{BB962C8B-B14F-4D97-AF65-F5344CB8AC3E}">
-        <p14:creationId xmlns:p14="http://schemas.microsoft.com/office/powerpoint/2010/main" val="1633187605"/>
+        <p14:creationId xmlns:p14="http://schemas.microsoft.com/office/powerpoint/2010/main" val="918714073"/>
       </p:ext>
     </p:extLst>
   </p:cSld>

</xml_diff>

<commit_message>
Actualizacion de Creacion de Roles y se agrega proteccion CSRF
</commit_message>
<xml_diff>
--- a/Presentaciones/Creacion de Roles.pptx
+++ b/Presentaciones/Creacion de Roles.pptx
@@ -5,7 +5,7 @@
     <p:sldMasterId id="2147483660" r:id="rId1"/>
   </p:sldMasterIdLst>
   <p:notesMasterIdLst>
-    <p:notesMasterId r:id="rId18"/>
+    <p:notesMasterId r:id="rId19"/>
   </p:notesMasterIdLst>
   <p:sldIdLst>
     <p:sldId id="256" r:id="rId2"/>
@@ -16,14 +16,15 @@
     <p:sldId id="261" r:id="rId7"/>
     <p:sldId id="262" r:id="rId8"/>
     <p:sldId id="263" r:id="rId9"/>
-    <p:sldId id="271" r:id="rId10"/>
-    <p:sldId id="264" r:id="rId11"/>
-    <p:sldId id="265" r:id="rId12"/>
-    <p:sldId id="266" r:id="rId13"/>
-    <p:sldId id="267" r:id="rId14"/>
-    <p:sldId id="268" r:id="rId15"/>
-    <p:sldId id="269" r:id="rId16"/>
-    <p:sldId id="270" r:id="rId17"/>
+    <p:sldId id="272" r:id="rId10"/>
+    <p:sldId id="271" r:id="rId11"/>
+    <p:sldId id="264" r:id="rId12"/>
+    <p:sldId id="265" r:id="rId13"/>
+    <p:sldId id="266" r:id="rId14"/>
+    <p:sldId id="267" r:id="rId15"/>
+    <p:sldId id="268" r:id="rId16"/>
+    <p:sldId id="269" r:id="rId17"/>
+    <p:sldId id="270" r:id="rId18"/>
   </p:sldIdLst>
   <p:sldSz cx="12192000" cy="6858000"/>
   <p:notesSz cx="6858000" cy="9144000"/>
@@ -212,7 +213,7 @@
           <a:p>
             <a:fld id="{0F684009-8968-43BD-962D-0E79FC35F153}" type="datetimeFigureOut">
               <a:rPr lang="es-MX" smtClean="0"/>
-              <a:t>20/02/2019</a:t>
+              <a:t>26/02/2019</a:t>
             </a:fld>
             <a:endParaRPr lang="es-MX"/>
           </a:p>
@@ -722,7 +723,7 @@
           <a:p>
             <a:fld id="{D3D461BD-8B21-4C94-A6EB-616F1D195CCE}" type="slidenum">
               <a:rPr lang="es-MX" smtClean="0"/>
-              <a:t>11</a:t>
+              <a:t>12</a:t>
             </a:fld>
             <a:endParaRPr lang="es-MX"/>
           </a:p>
@@ -809,7 +810,7 @@
           <a:p>
             <a:fld id="{D3D461BD-8B21-4C94-A6EB-616F1D195CCE}" type="slidenum">
               <a:rPr lang="es-MX" smtClean="0"/>
-              <a:t>12</a:t>
+              <a:t>13</a:t>
             </a:fld>
             <a:endParaRPr lang="es-MX"/>
           </a:p>
@@ -1004,7 +1005,7 @@
           <a:p>
             <a:fld id="{5AC2033E-D627-4FBA-A878-476A4624D270}" type="datetimeFigureOut">
               <a:rPr lang="es-MX" smtClean="0"/>
-              <a:t>20/02/2019</a:t>
+              <a:t>26/02/2019</a:t>
             </a:fld>
             <a:endParaRPr lang="es-MX"/>
           </a:p>
@@ -1174,7 +1175,7 @@
           <a:p>
             <a:fld id="{5AC2033E-D627-4FBA-A878-476A4624D270}" type="datetimeFigureOut">
               <a:rPr lang="es-MX" smtClean="0"/>
-              <a:t>20/02/2019</a:t>
+              <a:t>26/02/2019</a:t>
             </a:fld>
             <a:endParaRPr lang="es-MX"/>
           </a:p>
@@ -1397,7 +1398,7 @@
           <a:p>
             <a:fld id="{5AC2033E-D627-4FBA-A878-476A4624D270}" type="datetimeFigureOut">
               <a:rPr lang="es-MX" smtClean="0"/>
-              <a:t>20/02/2019</a:t>
+              <a:t>26/02/2019</a:t>
             </a:fld>
             <a:endParaRPr lang="es-MX"/>
           </a:p>
@@ -1577,7 +1578,7 @@
           <a:p>
             <a:fld id="{5AC2033E-D627-4FBA-A878-476A4624D270}" type="datetimeFigureOut">
               <a:rPr lang="es-MX" smtClean="0"/>
-              <a:t>20/02/2019</a:t>
+              <a:t>26/02/2019</a:t>
             </a:fld>
             <a:endParaRPr lang="es-MX"/>
           </a:p>
@@ -1883,7 +1884,7 @@
           <a:p>
             <a:fld id="{5AC2033E-D627-4FBA-A878-476A4624D270}" type="datetimeFigureOut">
               <a:rPr lang="es-MX" smtClean="0"/>
-              <a:t>20/02/2019</a:t>
+              <a:t>26/02/2019</a:t>
             </a:fld>
             <a:endParaRPr lang="es-MX"/>
           </a:p>
@@ -2187,7 +2188,7 @@
           <a:p>
             <a:fld id="{5AC2033E-D627-4FBA-A878-476A4624D270}" type="datetimeFigureOut">
               <a:rPr lang="es-MX" smtClean="0"/>
-              <a:t>20/02/2019</a:t>
+              <a:t>26/02/2019</a:t>
             </a:fld>
             <a:endParaRPr lang="es-MX"/>
           </a:p>
@@ -2609,7 +2610,7 @@
           <a:p>
             <a:fld id="{5AC2033E-D627-4FBA-A878-476A4624D270}" type="datetimeFigureOut">
               <a:rPr lang="es-MX" smtClean="0"/>
-              <a:t>20/02/2019</a:t>
+              <a:t>26/02/2019</a:t>
             </a:fld>
             <a:endParaRPr lang="es-MX"/>
           </a:p>
@@ -2727,7 +2728,7 @@
           <a:p>
             <a:fld id="{5AC2033E-D627-4FBA-A878-476A4624D270}" type="datetimeFigureOut">
               <a:rPr lang="es-MX" smtClean="0"/>
-              <a:t>20/02/2019</a:t>
+              <a:t>26/02/2019</a:t>
             </a:fld>
             <a:endParaRPr lang="es-MX"/>
           </a:p>
@@ -2822,7 +2823,7 @@
           <a:p>
             <a:fld id="{5AC2033E-D627-4FBA-A878-476A4624D270}" type="datetimeFigureOut">
               <a:rPr lang="es-MX" smtClean="0"/>
-              <a:t>20/02/2019</a:t>
+              <a:t>26/02/2019</a:t>
             </a:fld>
             <a:endParaRPr lang="es-MX"/>
           </a:p>
@@ -3095,7 +3096,7 @@
           <a:p>
             <a:fld id="{5AC2033E-D627-4FBA-A878-476A4624D270}" type="datetimeFigureOut">
               <a:rPr lang="es-MX" smtClean="0"/>
-              <a:t>20/02/2019</a:t>
+              <a:t>26/02/2019</a:t>
             </a:fld>
             <a:endParaRPr lang="es-MX"/>
           </a:p>
@@ -3360,7 +3361,7 @@
           <a:p>
             <a:fld id="{5AC2033E-D627-4FBA-A878-476A4624D270}" type="datetimeFigureOut">
               <a:rPr lang="es-MX" smtClean="0"/>
-              <a:t>20/02/2019</a:t>
+              <a:t>26/02/2019</a:t>
             </a:fld>
             <a:endParaRPr lang="es-MX"/>
           </a:p>
@@ -3609,7 +3610,7 @@
           <a:p>
             <a:fld id="{5AC2033E-D627-4FBA-A878-476A4624D270}" type="datetimeFigureOut">
               <a:rPr lang="es-MX" smtClean="0"/>
-              <a:t>20/02/2019</a:t>
+              <a:t>26/02/2019</a:t>
             </a:fld>
             <a:endParaRPr lang="es-MX"/>
           </a:p>
@@ -4086,12 +4087,8 @@
           <a:lstStyle/>
           <a:p>
             <a:r>
-              <a:rPr lang="es-MX" dirty="0" err="1"/>
-              <a:t>Creacion</a:t>
-            </a:r>
-            <a:r>
-              <a:rPr lang="es-MX" dirty="0"/>
-              <a:t> de Roles</a:t>
+              <a:rPr lang="es-MX" dirty="0"/>
+              <a:t>Creación de Roles</a:t>
             </a:r>
           </a:p>
         </p:txBody>
@@ -4156,7 +4153,7 @@
           <p:cNvPr id="2" name="Title 1">
             <a:extLst>
               <a:ext uri="{FF2B5EF4-FFF2-40B4-BE49-F238E27FC236}">
-                <a16:creationId xmlns:a16="http://schemas.microsoft.com/office/drawing/2014/main" id="{23550AB8-06AB-45C0-B46B-795247EBA72B}"/>
+                <a16:creationId xmlns:a16="http://schemas.microsoft.com/office/drawing/2014/main" id="{6A4EB910-8AFF-4144-B7CD-E1D3745027FF}"/>
               </a:ext>
             </a:extLst>
           </p:cNvPr>
@@ -4172,15 +4169,7 @@
           <a:bodyPr/>
           <a:lstStyle/>
           <a:p>
-            <a:r>
-              <a:rPr lang="en-US" dirty="0" err="1"/>
-              <a:t>Rol</a:t>
-            </a:r>
-            <a:r>
-              <a:rPr lang="en-US" dirty="0"/>
-              <a:t> default</a:t>
-            </a:r>
-            <a:endParaRPr lang="es-MX" dirty="0"/>
+            <a:endParaRPr lang="es-MX"/>
           </a:p>
         </p:txBody>
       </p:sp>
@@ -4189,7 +4178,7 @@
           <p:cNvPr id="3" name="Content Placeholder 2">
             <a:extLst>
               <a:ext uri="{FF2B5EF4-FFF2-40B4-BE49-F238E27FC236}">
-                <a16:creationId xmlns:a16="http://schemas.microsoft.com/office/drawing/2014/main" id="{D0E0FDC3-C7E3-49CD-847F-2A6B828BB8DC}"/>
+                <a16:creationId xmlns:a16="http://schemas.microsoft.com/office/drawing/2014/main" id="{CEFE903A-80DF-44E7-BB2D-C20E9C614166}"/>
               </a:ext>
             </a:extLst>
           </p:cNvPr>
@@ -4206,152 +4195,147 @@
           <a:lstStyle/>
           <a:p>
             <a:r>
-              <a:rPr lang="en-US" dirty="0"/>
-              <a:t>Una </a:t>
-            </a:r>
-            <a:r>
-              <a:rPr lang="en-US" dirty="0" err="1"/>
-              <a:t>vez</a:t>
-            </a:r>
-            <a:r>
-              <a:rPr lang="en-US" dirty="0"/>
-              <a:t> que temenos lo </a:t>
-            </a:r>
-            <a:r>
-              <a:rPr lang="en-US" dirty="0" err="1"/>
-              <a:t>demas</a:t>
-            </a:r>
-            <a:r>
-              <a:rPr lang="en-US" dirty="0"/>
+              <a:rPr lang="es-MX" dirty="0"/>
+              <a:t>Terminando de crear los </a:t>
+            </a:r>
+            <a:r>
+              <a:rPr lang="es-MX" dirty="0" err="1"/>
+              <a:t>seeders</a:t>
+            </a:r>
+            <a:r>
+              <a:rPr lang="es-MX" dirty="0"/>
+              <a:t> pertinentes ir a </a:t>
+            </a:r>
+            <a:r>
+              <a:rPr lang="es-MX" b="1" dirty="0" err="1"/>
+              <a:t>DatabaseSeeder</a:t>
+            </a:r>
+            <a:r>
+              <a:rPr lang="es-MX" b="1" dirty="0"/>
               <a:t> </a:t>
             </a:r>
             <a:r>
-              <a:rPr lang="en-US" dirty="0" err="1"/>
-              <a:t>podemos</a:t>
-            </a:r>
-            <a:r>
-              <a:rPr lang="en-US" dirty="0"/>
+              <a:rPr lang="es-MX" dirty="0"/>
+              <a:t>dentro de </a:t>
+            </a:r>
+            <a:r>
+              <a:rPr lang="es-MX" b="1" dirty="0" err="1"/>
+              <a:t>database</a:t>
+            </a:r>
+            <a:r>
+              <a:rPr lang="es-MX" b="1" dirty="0"/>
+              <a:t>/</a:t>
+            </a:r>
+            <a:r>
+              <a:rPr lang="es-MX" b="1" dirty="0" err="1"/>
+              <a:t>seeds</a:t>
+            </a:r>
+            <a:r>
+              <a:rPr lang="es-MX" b="1" dirty="0"/>
               <a:t> </a:t>
             </a:r>
-            <a:r>
-              <a:rPr lang="en-US" dirty="0" err="1"/>
-              <a:t>ir</a:t>
-            </a:r>
-            <a:r>
-              <a:rPr lang="en-US" dirty="0"/>
-              <a:t> a la </a:t>
-            </a:r>
-            <a:r>
-              <a:rPr lang="en-US" dirty="0" err="1"/>
-              <a:t>direccion</a:t>
-            </a:r>
-            <a:r>
-              <a:rPr lang="en-US" dirty="0"/>
-              <a:t> </a:t>
-            </a:r>
-            <a:r>
-              <a:rPr lang="en-US" b="1" dirty="0"/>
-              <a:t>app/Http/Controllers/Auth/</a:t>
+          </a:p>
+          <a:p>
+            <a:r>
+              <a:rPr lang="es-MX" dirty="0"/>
+              <a:t>Aquí encontraremos una función llamada run y correremos el siguiente código</a:t>
+            </a:r>
+          </a:p>
+          <a:p>
+            <a:pPr lvl="1"/>
+            <a:r>
+              <a:rPr lang="es-MX" b="1" dirty="0"/>
+              <a:t>$</a:t>
+            </a:r>
+            <a:r>
+              <a:rPr lang="es-MX" b="1" dirty="0" err="1"/>
+              <a:t>this</a:t>
+            </a:r>
+            <a:r>
+              <a:rPr lang="es-MX" b="1" dirty="0"/>
+              <a:t>-</a:t>
+            </a:r>
+            <a:r>
+              <a:rPr lang="en-US" b="1" dirty="0"/>
+              <a:t>&gt;call(</a:t>
             </a:r>
             <a:r>
               <a:rPr lang="en-US" b="1" dirty="0" err="1"/>
-              <a:t>RegisterController.php</a:t>
-            </a:r>
-            <a:r>
-              <a:rPr lang="en-US" b="1" dirty="0"/>
-              <a:t> </a:t>
-            </a:r>
-            <a:r>
-              <a:rPr lang="en-US" dirty="0"/>
-              <a:t>de </a:t>
-            </a:r>
-            <a:r>
-              <a:rPr lang="en-US" dirty="0" err="1"/>
-              <a:t>esta</a:t>
-            </a:r>
-            <a:r>
-              <a:rPr lang="en-US" dirty="0"/>
-              <a:t> </a:t>
-            </a:r>
-            <a:r>
-              <a:rPr lang="en-US" dirty="0" err="1"/>
-              <a:t>manera</a:t>
-            </a:r>
-            <a:endParaRPr lang="en-US" dirty="0"/>
-          </a:p>
-          <a:p>
-            <a:r>
-              <a:rPr lang="en-US" dirty="0"/>
-              <a:t>Dentro de </a:t>
-            </a:r>
-            <a:r>
-              <a:rPr lang="en-US" dirty="0" err="1"/>
-              <a:t>su</a:t>
-            </a:r>
-            <a:r>
-              <a:rPr lang="en-US" dirty="0"/>
-              <a:t> function create </a:t>
-            </a:r>
-            <a:r>
-              <a:rPr lang="en-US" dirty="0" err="1"/>
-              <a:t>agregaremos</a:t>
-            </a:r>
-            <a:r>
-              <a:rPr lang="en-US" dirty="0"/>
-              <a:t> la </a:t>
-            </a:r>
-            <a:r>
-              <a:rPr lang="en-US" dirty="0" err="1"/>
-              <a:t>siguiente</a:t>
-            </a:r>
-            <a:r>
-              <a:rPr lang="en-US" dirty="0"/>
-              <a:t> </a:t>
-            </a:r>
-            <a:r>
-              <a:rPr lang="en-US" dirty="0" err="1"/>
-              <a:t>linea</a:t>
-            </a:r>
-            <a:endParaRPr lang="en-US" dirty="0"/>
+              <a:t>NameSeeder</a:t>
+            </a:r>
+            <a:r>
+              <a:rPr lang="en-US" b="1" dirty="0"/>
+              <a:t>::class);</a:t>
+            </a:r>
           </a:p>
           <a:p>
             <a:pPr lvl="1"/>
             <a:r>
-              <a:rPr lang="en-US" b="1" dirty="0"/>
-              <a:t>$user-&gt;</a:t>
-            </a:r>
-            <a:r>
               <a:rPr lang="en-US" b="1" dirty="0" err="1"/>
-              <a:t>rols</a:t>
-            </a:r>
-            <a:r>
-              <a:rPr lang="en-US" b="1" dirty="0"/>
-              <a:t>()-&gt;attach(</a:t>
+              <a:t>Ejemplo</a:t>
+            </a:r>
+            <a:endParaRPr lang="en-US" b="1" dirty="0"/>
+          </a:p>
+          <a:p>
+            <a:pPr lvl="1"/>
+            <a:r>
+              <a:rPr lang="es-MX" b="1" dirty="0"/>
+              <a:t>$</a:t>
+            </a:r>
+            <a:r>
+              <a:rPr lang="es-MX" b="1" dirty="0" err="1"/>
+              <a:t>this</a:t>
+            </a:r>
+            <a:r>
+              <a:rPr lang="es-MX" b="1" dirty="0"/>
+              <a:t>-</a:t>
+            </a:r>
+            <a:r>
+              <a:rPr lang="en-US" b="1" dirty="0"/>
+              <a:t>&gt;call(</a:t>
             </a:r>
             <a:r>
               <a:rPr lang="en-US" b="1" dirty="0" err="1"/>
-              <a:t>Rol</a:t>
-            </a:r>
-            <a:r>
-              <a:rPr lang="en-US" b="1" dirty="0"/>
-              <a:t>::where(‘</a:t>
+              <a:t>RoleTableSeeder</a:t>
+            </a:r>
+            <a:r>
+              <a:rPr lang="en-US" b="1" dirty="0"/>
+              <a:t>::class);</a:t>
+            </a:r>
+          </a:p>
+          <a:p>
+            <a:pPr lvl="1"/>
+            <a:r>
+              <a:rPr lang="es-MX" b="1" dirty="0"/>
+              <a:t>$</a:t>
+            </a:r>
+            <a:r>
+              <a:rPr lang="es-MX" b="1" dirty="0" err="1"/>
+              <a:t>this</a:t>
+            </a:r>
+            <a:r>
+              <a:rPr lang="es-MX" b="1" dirty="0"/>
+              <a:t>-</a:t>
+            </a:r>
+            <a:r>
+              <a:rPr lang="en-US" b="1" dirty="0"/>
+              <a:t>&gt;call(</a:t>
             </a:r>
             <a:r>
               <a:rPr lang="en-US" b="1" dirty="0" err="1"/>
-              <a:t>name’,’user</a:t>
-            </a:r>
-            <a:r>
-              <a:rPr lang="en-US" b="1" dirty="0"/>
-              <a:t>’)-&gt;first());</a:t>
-            </a:r>
-            <a:endParaRPr lang="es-MX" b="1" dirty="0"/>
+              <a:t>UserTableSeeder</a:t>
+            </a:r>
+            <a:r>
+              <a:rPr lang="en-US" b="1" dirty="0"/>
+              <a:t>::class);</a:t>
+            </a:r>
           </a:p>
         </p:txBody>
       </p:sp>
     </p:spTree>
     <p:extLst>
       <p:ext uri="{BB962C8B-B14F-4D97-AF65-F5344CB8AC3E}">
-        <p14:creationId xmlns:p14="http://schemas.microsoft.com/office/powerpoint/2010/main" val="1633187605"/>
+        <p14:creationId xmlns:p14="http://schemas.microsoft.com/office/powerpoint/2010/main" val="918714073"/>
       </p:ext>
     </p:extLst>
   </p:cSld>
@@ -4383,7 +4367,7 @@
           <p:cNvPr id="2" name="Title 1">
             <a:extLst>
               <a:ext uri="{FF2B5EF4-FFF2-40B4-BE49-F238E27FC236}">
-                <a16:creationId xmlns:a16="http://schemas.microsoft.com/office/drawing/2014/main" id="{D5B32CE9-9A10-45A4-90BF-FF3FAE14EC01}"/>
+                <a16:creationId xmlns:a16="http://schemas.microsoft.com/office/drawing/2014/main" id="{23550AB8-06AB-45C0-B46B-795247EBA72B}"/>
               </a:ext>
             </a:extLst>
           </p:cNvPr>
@@ -4401,15 +4385,11 @@
           <a:p>
             <a:r>
               <a:rPr lang="en-US" dirty="0" err="1"/>
-              <a:t>Crear</a:t>
-            </a:r>
-            <a:r>
-              <a:rPr lang="en-US" dirty="0"/>
-              <a:t> </a:t>
-            </a:r>
-            <a:r>
-              <a:rPr lang="en-US" dirty="0" err="1"/>
-              <a:t>logica</a:t>
+              <a:t>Rol</a:t>
+            </a:r>
+            <a:r>
+              <a:rPr lang="en-US" dirty="0"/>
+              <a:t> default</a:t>
             </a:r>
             <a:endParaRPr lang="es-MX" dirty="0"/>
           </a:p>
@@ -4420,7 +4400,7 @@
           <p:cNvPr id="3" name="Content Placeholder 2">
             <a:extLst>
               <a:ext uri="{FF2B5EF4-FFF2-40B4-BE49-F238E27FC236}">
-                <a16:creationId xmlns:a16="http://schemas.microsoft.com/office/drawing/2014/main" id="{DF29CD60-6524-4031-B4CE-97D162EFE429}"/>
+                <a16:creationId xmlns:a16="http://schemas.microsoft.com/office/drawing/2014/main" id="{D0E0FDC3-C7E3-49CD-847F-2A6B828BB8DC}"/>
               </a:ext>
             </a:extLst>
           </p:cNvPr>
@@ -4433,12 +4413,26 @@
         </p:nvSpPr>
         <p:spPr/>
         <p:txBody>
-          <a:bodyPr/>
+          <a:bodyPr>
+            <a:normAutofit fontScale="92500" lnSpcReduction="10000"/>
+          </a:bodyPr>
           <a:lstStyle/>
           <a:p>
             <a:r>
-              <a:rPr lang="en-US" dirty="0" err="1"/>
-              <a:t>Ocuparemos</a:t>
+              <a:rPr lang="en-US" dirty="0"/>
+              <a:t>Una </a:t>
+            </a:r>
+            <a:r>
+              <a:rPr lang="en-US" dirty="0" err="1"/>
+              <a:t>vez</a:t>
+            </a:r>
+            <a:r>
+              <a:rPr lang="en-US" dirty="0"/>
+              <a:t> que temenos lo </a:t>
+            </a:r>
+            <a:r>
+              <a:rPr lang="en-US" dirty="0" err="1"/>
+              <a:t>demas</a:t>
             </a:r>
             <a:r>
               <a:rPr lang="en-US" dirty="0"/>
@@ -4446,15 +4440,7 @@
             </a:r>
             <a:r>
               <a:rPr lang="en-US" dirty="0" err="1"/>
-              <a:t>funciones</a:t>
-            </a:r>
-            <a:r>
-              <a:rPr lang="en-US" dirty="0"/>
-              <a:t> que </a:t>
-            </a:r>
-            <a:r>
-              <a:rPr lang="en-US" dirty="0" err="1"/>
-              <a:t>nos</a:t>
+              <a:t>podemos</a:t>
             </a:r>
             <a:r>
               <a:rPr lang="en-US" dirty="0"/>
@@ -4462,39 +4448,39 @@
             </a:r>
             <a:r>
               <a:rPr lang="en-US" dirty="0" err="1"/>
-              <a:t>permitan</a:t>
-            </a:r>
-            <a:r>
-              <a:rPr lang="en-US" dirty="0"/>
-              <a:t> saber </a:t>
-            </a:r>
-            <a:r>
-              <a:rPr lang="en-US" dirty="0" err="1"/>
-              <a:t>si</a:t>
-            </a:r>
-            <a:r>
-              <a:rPr lang="en-US" dirty="0"/>
-              <a:t> se </a:t>
-            </a:r>
-            <a:r>
-              <a:rPr lang="en-US" dirty="0" err="1"/>
-              <a:t>tiene</a:t>
+              <a:t>ir</a:t>
+            </a:r>
+            <a:r>
+              <a:rPr lang="en-US" dirty="0"/>
+              <a:t> a la </a:t>
+            </a:r>
+            <a:r>
+              <a:rPr lang="en-US" dirty="0" err="1"/>
+              <a:t>direccion</a:t>
             </a:r>
             <a:r>
               <a:rPr lang="en-US" dirty="0"/>
               <a:t> </a:t>
             </a:r>
             <a:r>
-              <a:rPr lang="en-US" dirty="0" err="1"/>
-              <a:t>algun</a:t>
-            </a:r>
-            <a:r>
-              <a:rPr lang="en-US" dirty="0"/>
+              <a:rPr lang="en-US" b="1" dirty="0"/>
+              <a:t>app/Http/Controllers/Auth/</a:t>
+            </a:r>
+            <a:r>
+              <a:rPr lang="en-US" b="1" dirty="0" err="1"/>
+              <a:t>RegisterController.php</a:t>
+            </a:r>
+            <a:r>
+              <a:rPr lang="en-US" b="1" dirty="0"/>
               <a:t> </a:t>
             </a:r>
             <a:r>
-              <a:rPr lang="en-US" dirty="0" err="1"/>
-              <a:t>rol</a:t>
+              <a:rPr lang="en-US" dirty="0"/>
+              <a:t>de </a:t>
+            </a:r>
+            <a:r>
+              <a:rPr lang="en-US" dirty="0" err="1"/>
+              <a:t>esta</a:t>
             </a:r>
             <a:r>
               <a:rPr lang="en-US" dirty="0"/>
@@ -4502,7 +4488,34 @@
             </a:r>
             <a:r>
               <a:rPr lang="en-US" dirty="0" err="1"/>
-              <a:t>en</a:t>
+              <a:t>manera</a:t>
+            </a:r>
+            <a:endParaRPr lang="en-US" dirty="0"/>
+          </a:p>
+          <a:p>
+            <a:r>
+              <a:rPr lang="en-US" dirty="0"/>
+              <a:t>Dentro de </a:t>
+            </a:r>
+            <a:r>
+              <a:rPr lang="en-US" dirty="0" err="1"/>
+              <a:t>su</a:t>
+            </a:r>
+            <a:r>
+              <a:rPr lang="en-US" dirty="0"/>
+              <a:t> function create </a:t>
+            </a:r>
+            <a:r>
+              <a:rPr lang="en-US" dirty="0" err="1"/>
+              <a:t>agregaremos</a:t>
+            </a:r>
+            <a:r>
+              <a:rPr lang="en-US" dirty="0"/>
+              <a:t> la </a:t>
+            </a:r>
+            <a:r>
+              <a:rPr lang="en-US" dirty="0" err="1"/>
+              <a:t>siguiente</a:t>
             </a:r>
             <a:r>
               <a:rPr lang="en-US" dirty="0"/>
@@ -4510,84 +4523,15 @@
             </a:r>
             <a:r>
               <a:rPr lang="en-US" dirty="0" err="1"/>
-              <a:t>especifico</a:t>
-            </a:r>
-            <a:r>
-              <a:rPr lang="en-US" dirty="0"/>
-              <a:t> o entre </a:t>
-            </a:r>
-            <a:r>
-              <a:rPr lang="en-US" dirty="0" err="1"/>
-              <a:t>varias</a:t>
-            </a:r>
-            <a:r>
-              <a:rPr lang="en-US" dirty="0"/>
-              <a:t> </a:t>
-            </a:r>
-            <a:r>
-              <a:rPr lang="en-US" dirty="0" err="1"/>
-              <a:t>opciones</a:t>
-            </a:r>
-            <a:r>
-              <a:rPr lang="en-US" dirty="0"/>
-              <a:t>.</a:t>
-            </a:r>
-          </a:p>
-          <a:p>
-            <a:r>
-              <a:rPr lang="en-US" dirty="0"/>
-              <a:t>Por </a:t>
-            </a:r>
-            <a:r>
-              <a:rPr lang="en-US" dirty="0" err="1"/>
-              <a:t>ejemplo</a:t>
-            </a:r>
-            <a:r>
-              <a:rPr lang="es-MX" dirty="0"/>
-              <a:t>:</a:t>
-            </a:r>
+              <a:t>linea</a:t>
+            </a:r>
+            <a:endParaRPr lang="en-US" dirty="0"/>
           </a:p>
           <a:p>
             <a:pPr lvl="1"/>
             <a:r>
-              <a:rPr lang="es-MX" b="1" dirty="0" err="1"/>
-              <a:t>public</a:t>
-            </a:r>
-            <a:r>
-              <a:rPr lang="es-MX" b="1" dirty="0"/>
-              <a:t> </a:t>
-            </a:r>
-            <a:r>
-              <a:rPr lang="es-MX" b="1" dirty="0" err="1"/>
-              <a:t>function</a:t>
-            </a:r>
-            <a:r>
-              <a:rPr lang="es-MX" b="1" dirty="0"/>
-              <a:t> </a:t>
-            </a:r>
-            <a:r>
-              <a:rPr lang="es-MX" b="1" dirty="0" err="1"/>
-              <a:t>hasRol</a:t>
-            </a:r>
-            <a:r>
-              <a:rPr lang="es-MX" b="1" dirty="0"/>
-              <a:t>($rol)</a:t>
-            </a:r>
-          </a:p>
-          <a:p>
-            <a:pPr marL="228600" lvl="1" indent="0">
-              <a:buNone/>
-            </a:pPr>
-            <a:r>
-              <a:rPr lang="en-US" b="1" dirty="0"/>
-              <a:t>{</a:t>
-            </a:r>
-            <a:br>
-              <a:rPr lang="en-US" b="1" dirty="0"/>
-            </a:br>
-            <a:r>
-              <a:rPr lang="en-US" b="1" dirty="0"/>
-              <a:t>	if($this-&gt;</a:t>
+              <a:rPr lang="en-US" b="1" dirty="0"/>
+              <a:t>$user-&gt;</a:t>
             </a:r>
             <a:r>
               <a:rPr lang="en-US" b="1" dirty="0" err="1"/>
@@ -4595,46 +4539,119 @@
             </a:r>
             <a:r>
               <a:rPr lang="en-US" b="1" dirty="0"/>
-              <a:t>()-&gt;where(‘name’, $</a:t>
+              <a:t>()-&gt;attach(</a:t>
             </a:r>
             <a:r>
               <a:rPr lang="en-US" b="1" dirty="0" err="1"/>
-              <a:t>rol</a:t>
-            </a:r>
-            <a:r>
-              <a:rPr lang="en-US" b="1" dirty="0"/>
-              <a:t>)-&gt;first()){</a:t>
+              <a:t>Rol</a:t>
+            </a:r>
+            <a:r>
+              <a:rPr lang="en-US" b="1" dirty="0"/>
+              <a:t>::where(‘</a:t>
+            </a:r>
+            <a:r>
+              <a:rPr lang="en-US" b="1" dirty="0" err="1"/>
+              <a:t>name’,’user</a:t>
+            </a:r>
+            <a:r>
+              <a:rPr lang="en-US" b="1" dirty="0"/>
+              <a:t>’)-&gt;first());</a:t>
+            </a:r>
+          </a:p>
+          <a:p>
+            <a:pPr lvl="1"/>
+            <a:r>
+              <a:rPr lang="en-US" b="1" dirty="0" err="1"/>
+              <a:t>Ej</a:t>
+            </a:r>
+            <a:r>
+              <a:rPr lang="en-US" b="1" dirty="0"/>
+              <a:t>.</a:t>
+            </a:r>
+          </a:p>
+          <a:p>
+            <a:pPr lvl="2"/>
+            <a:r>
+              <a:rPr lang="en-US" b="1" dirty="0"/>
+              <a:t>Protected function create(array $data)</a:t>
             </a:r>
             <a:br>
               <a:rPr lang="en-US" b="1" dirty="0"/>
             </a:br>
             <a:r>
               <a:rPr lang="en-US" b="1" dirty="0"/>
-              <a:t>		return true;</a:t>
+              <a:t>{</a:t>
             </a:r>
             <a:br>
               <a:rPr lang="en-US" b="1" dirty="0"/>
             </a:br>
             <a:r>
               <a:rPr lang="en-US" b="1" dirty="0"/>
-              <a:t>	}</a:t>
-            </a:r>
-          </a:p>
-          <a:p>
-            <a:pPr marL="228600" lvl="1" indent="0">
-              <a:buNone/>
-            </a:pPr>
-            <a:r>
-              <a:rPr lang="en-US" b="1" dirty="0"/>
-              <a:t>	return false;</a:t>
+              <a:t>	$user = User::create([</a:t>
             </a:r>
             <a:br>
               <a:rPr lang="en-US" b="1" dirty="0"/>
             </a:br>
             <a:r>
               <a:rPr lang="en-US" b="1" dirty="0"/>
+              <a:t>	‘name’ =&gt; $data[‘name’],</a:t>
+            </a:r>
+            <a:br>
+              <a:rPr lang="en-US" b="1" dirty="0"/>
+            </a:br>
+            <a:r>
+              <a:rPr lang="en-US" b="1" dirty="0"/>
+              <a:t>	‘email’ =&gt; $data[‘email’],</a:t>
+            </a:r>
+            <a:br>
+              <a:rPr lang="en-US" b="1" dirty="0"/>
+            </a:br>
+            <a:r>
+              <a:rPr lang="en-US" b="1" dirty="0"/>
+              <a:t>	‘password’ =&gt; Hash::make($data[‘password’])</a:t>
+            </a:r>
+            <a:br>
+              <a:rPr lang="en-US" b="1" dirty="0"/>
+            </a:br>
+            <a:r>
+              <a:rPr lang="en-US" b="1" dirty="0"/>
+              <a:t>	]);</a:t>
+            </a:r>
+            <a:br>
+              <a:rPr lang="en-US" b="1" dirty="0"/>
+            </a:br>
+            <a:r>
+              <a:rPr lang="en-US" b="1" dirty="0"/>
+              <a:t>	$user-&gt;roles()-&gt;attach(Role::where(‘</a:t>
+            </a:r>
+            <a:r>
+              <a:rPr lang="en-US" b="1" dirty="0" err="1"/>
+              <a:t>name’,’user</a:t>
+            </a:r>
+            <a:r>
+              <a:rPr lang="en-US" b="1" dirty="0"/>
+              <a:t>’)-&gt;first());</a:t>
+            </a:r>
+            <a:br>
+              <a:rPr lang="en-US" b="1" dirty="0"/>
+            </a:br>
+            <a:r>
+              <a:rPr lang="en-US" b="1" dirty="0"/>
+              <a:t>	return user;</a:t>
+            </a:r>
+            <a:br>
+              <a:rPr lang="en-US" b="1" dirty="0"/>
+            </a:br>
+            <a:r>
+              <a:rPr lang="en-US" b="1" dirty="0"/>
               <a:t>}</a:t>
             </a:r>
+            <a:br>
+              <a:rPr lang="en-US" b="1" dirty="0"/>
+            </a:br>
+            <a:br>
+              <a:rPr lang="en-US" b="1" dirty="0"/>
+            </a:br>
             <a:endParaRPr lang="es-MX" b="1" dirty="0"/>
           </a:p>
         </p:txBody>
@@ -4642,7 +4659,7 @@
     </p:spTree>
     <p:extLst>
       <p:ext uri="{BB962C8B-B14F-4D97-AF65-F5344CB8AC3E}">
-        <p14:creationId xmlns:p14="http://schemas.microsoft.com/office/powerpoint/2010/main" val="1727338606"/>
+        <p14:creationId xmlns:p14="http://schemas.microsoft.com/office/powerpoint/2010/main" val="1633187605"/>
       </p:ext>
     </p:extLst>
   </p:cSld>
@@ -4674,7 +4691,7 @@
           <p:cNvPr id="2" name="Title 1">
             <a:extLst>
               <a:ext uri="{FF2B5EF4-FFF2-40B4-BE49-F238E27FC236}">
-                <a16:creationId xmlns:a16="http://schemas.microsoft.com/office/drawing/2014/main" id="{B6B290C7-14F9-4ED1-B7F4-0F0DC8F63491}"/>
+                <a16:creationId xmlns:a16="http://schemas.microsoft.com/office/drawing/2014/main" id="{D5B32CE9-9A10-45A4-90BF-FF3FAE14EC01}"/>
               </a:ext>
             </a:extLst>
           </p:cNvPr>
@@ -4690,7 +4707,19 @@
           <a:bodyPr/>
           <a:lstStyle/>
           <a:p>
-            <a:endParaRPr lang="es-MX"/>
+            <a:r>
+              <a:rPr lang="en-US" dirty="0" err="1"/>
+              <a:t>Crear</a:t>
+            </a:r>
+            <a:r>
+              <a:rPr lang="en-US" dirty="0"/>
+              <a:t> </a:t>
+            </a:r>
+            <a:r>
+              <a:rPr lang="en-US" dirty="0" err="1"/>
+              <a:t>logica</a:t>
+            </a:r>
+            <a:endParaRPr lang="es-MX" dirty="0"/>
           </a:p>
         </p:txBody>
       </p:sp>
@@ -4699,7 +4728,7 @@
           <p:cNvPr id="3" name="Content Placeholder 2">
             <a:extLst>
               <a:ext uri="{FF2B5EF4-FFF2-40B4-BE49-F238E27FC236}">
-                <a16:creationId xmlns:a16="http://schemas.microsoft.com/office/drawing/2014/main" id="{9C854629-B4B2-4909-AB6B-4EF799DFF6C0}"/>
+                <a16:creationId xmlns:a16="http://schemas.microsoft.com/office/drawing/2014/main" id="{DF29CD60-6524-4031-B4CE-97D162EFE429}"/>
               </a:ext>
             </a:extLst>
           </p:cNvPr>
@@ -4712,14 +4741,40 @@
         </p:nvSpPr>
         <p:spPr/>
         <p:txBody>
-          <a:bodyPr>
-            <a:normAutofit lnSpcReduction="10000"/>
-          </a:bodyPr>
+          <a:bodyPr/>
           <a:lstStyle/>
           <a:p>
             <a:r>
-              <a:rPr lang="en-US" dirty="0"/>
-              <a:t>Para saber </a:t>
+              <a:rPr lang="en-US" dirty="0" err="1"/>
+              <a:t>Ocuparemos</a:t>
+            </a:r>
+            <a:r>
+              <a:rPr lang="en-US" dirty="0"/>
+              <a:t> </a:t>
+            </a:r>
+            <a:r>
+              <a:rPr lang="en-US" dirty="0" err="1"/>
+              <a:t>funciones</a:t>
+            </a:r>
+            <a:r>
+              <a:rPr lang="en-US" dirty="0"/>
+              <a:t> que </a:t>
+            </a:r>
+            <a:r>
+              <a:rPr lang="en-US" dirty="0" err="1"/>
+              <a:t>nos</a:t>
+            </a:r>
+            <a:r>
+              <a:rPr lang="en-US" dirty="0"/>
+              <a:t> </a:t>
+            </a:r>
+            <a:r>
+              <a:rPr lang="en-US" dirty="0" err="1"/>
+              <a:t>permitan</a:t>
+            </a:r>
+            <a:r>
+              <a:rPr lang="en-US" dirty="0"/>
+              <a:t> saber </a:t>
             </a:r>
             <a:r>
               <a:rPr lang="en-US" dirty="0" err="1"/>
@@ -4727,11 +4782,19 @@
             </a:r>
             <a:r>
               <a:rPr lang="en-US" dirty="0"/>
+              <a:t> se </a:t>
+            </a:r>
+            <a:r>
+              <a:rPr lang="en-US" dirty="0" err="1"/>
+              <a:t>tiene</a:t>
+            </a:r>
+            <a:r>
+              <a:rPr lang="en-US" dirty="0"/>
               <a:t> </a:t>
             </a:r>
             <a:r>
               <a:rPr lang="en-US" dirty="0" err="1"/>
-              <a:t>tiene</a:t>
+              <a:t>algun</a:t>
             </a:r>
             <a:r>
               <a:rPr lang="en-US" dirty="0"/>
@@ -4739,7 +4802,7 @@
             </a:r>
             <a:r>
               <a:rPr lang="en-US" dirty="0" err="1"/>
-              <a:t>algun</a:t>
+              <a:t>rol</a:t>
             </a:r>
             <a:r>
               <a:rPr lang="en-US" dirty="0"/>
@@ -4747,31 +4810,7 @@
             </a:r>
             <a:r>
               <a:rPr lang="en-US" dirty="0" err="1"/>
-              <a:t>rol</a:t>
-            </a:r>
-            <a:r>
-              <a:rPr lang="en-US" dirty="0"/>
-              <a:t> entre </a:t>
-            </a:r>
-            <a:r>
-              <a:rPr lang="en-US" dirty="0" err="1"/>
-              <a:t>varios</a:t>
-            </a:r>
-            <a:r>
-              <a:rPr lang="en-US" dirty="0"/>
-              <a:t> se </a:t>
-            </a:r>
-            <a:r>
-              <a:rPr lang="en-US" dirty="0" err="1"/>
-              <a:t>puede</a:t>
-            </a:r>
-            <a:r>
-              <a:rPr lang="en-US" dirty="0"/>
-              <a:t> realizer de la </a:t>
-            </a:r>
-            <a:r>
-              <a:rPr lang="en-US" dirty="0" err="1"/>
-              <a:t>siguiente</a:t>
+              <a:t>en</a:t>
             </a:r>
             <a:r>
               <a:rPr lang="en-US" dirty="0"/>
@@ -4779,116 +4818,68 @@
             </a:r>
             <a:r>
               <a:rPr lang="en-US" dirty="0" err="1"/>
-              <a:t>manera</a:t>
-            </a:r>
-            <a:endParaRPr lang="en-US" dirty="0"/>
+              <a:t>especifico</a:t>
+            </a:r>
+            <a:r>
+              <a:rPr lang="en-US" dirty="0"/>
+              <a:t> o entre </a:t>
+            </a:r>
+            <a:r>
+              <a:rPr lang="en-US" dirty="0" err="1"/>
+              <a:t>varias</a:t>
+            </a:r>
+            <a:r>
+              <a:rPr lang="en-US" dirty="0"/>
+              <a:t> </a:t>
+            </a:r>
+            <a:r>
+              <a:rPr lang="en-US" dirty="0" err="1"/>
+              <a:t>opciones</a:t>
+            </a:r>
+            <a:r>
+              <a:rPr lang="en-US" dirty="0"/>
+              <a:t>.</a:t>
+            </a:r>
+          </a:p>
+          <a:p>
+            <a:r>
+              <a:rPr lang="en-US" dirty="0"/>
+              <a:t>Por </a:t>
+            </a:r>
+            <a:r>
+              <a:rPr lang="en-US" dirty="0" err="1"/>
+              <a:t>ejemplo</a:t>
+            </a:r>
+            <a:r>
+              <a:rPr lang="es-MX" dirty="0"/>
+              <a:t>:</a:t>
+            </a:r>
           </a:p>
           <a:p>
             <a:pPr lvl="1"/>
             <a:r>
-              <a:rPr lang="en-US" b="1" dirty="0"/>
-              <a:t>public function </a:t>
-            </a:r>
-            <a:r>
-              <a:rPr lang="en-US" b="1" dirty="0" err="1"/>
-              <a:t>hasAnyRol</a:t>
-            </a:r>
-            <a:r>
-              <a:rPr lang="en-US" b="1" dirty="0"/>
-              <a:t>($</a:t>
-            </a:r>
-            <a:r>
-              <a:rPr lang="en-US" b="1" dirty="0" err="1"/>
-              <a:t>rols</a:t>
-            </a:r>
-            <a:r>
-              <a:rPr lang="en-US" b="1" dirty="0"/>
-              <a:t>){</a:t>
-            </a:r>
-            <a:br>
-              <a:rPr lang="en-US" b="1" dirty="0"/>
-            </a:br>
-            <a:r>
-              <a:rPr lang="en-US" b="1" dirty="0"/>
-              <a:t>	if(</a:t>
-            </a:r>
-            <a:r>
-              <a:rPr lang="en-US" b="1" dirty="0" err="1"/>
-              <a:t>is_array</a:t>
-            </a:r>
-            <a:r>
-              <a:rPr lang="en-US" b="1" dirty="0"/>
-              <a:t>($</a:t>
-            </a:r>
-            <a:r>
-              <a:rPr lang="en-US" b="1" dirty="0" err="1"/>
-              <a:t>rols</a:t>
-            </a:r>
-            <a:r>
-              <a:rPr lang="en-US" b="1" dirty="0"/>
-              <a:t>)){</a:t>
-            </a:r>
-            <a:br>
-              <a:rPr lang="en-US" b="1" dirty="0"/>
-            </a:br>
-            <a:r>
-              <a:rPr lang="en-US" b="1" dirty="0"/>
-              <a:t>		foreach($</a:t>
-            </a:r>
-            <a:r>
-              <a:rPr lang="en-US" b="1" dirty="0" err="1"/>
-              <a:t>rols</a:t>
-            </a:r>
-            <a:r>
-              <a:rPr lang="en-US" b="1" dirty="0"/>
-              <a:t> as $</a:t>
-            </a:r>
-            <a:r>
-              <a:rPr lang="en-US" b="1" dirty="0" err="1"/>
-              <a:t>rol</a:t>
-            </a:r>
-            <a:r>
-              <a:rPr lang="en-US" b="1" dirty="0"/>
-              <a:t>){</a:t>
-            </a:r>
-            <a:br>
-              <a:rPr lang="en-US" b="1" dirty="0"/>
-            </a:br>
-            <a:r>
-              <a:rPr lang="en-US" b="1" dirty="0"/>
-              <a:t>			if($this-&gt;</a:t>
-            </a:r>
-            <a:r>
-              <a:rPr lang="en-US" b="1" dirty="0" err="1"/>
+              <a:rPr lang="es-MX" b="1" dirty="0" err="1"/>
+              <a:t>public</a:t>
+            </a:r>
+            <a:r>
+              <a:rPr lang="es-MX" b="1" dirty="0"/>
+              <a:t> </a:t>
+            </a:r>
+            <a:r>
+              <a:rPr lang="es-MX" b="1" dirty="0" err="1"/>
+              <a:t>function</a:t>
+            </a:r>
+            <a:r>
+              <a:rPr lang="es-MX" b="1" dirty="0"/>
+              <a:t> </a:t>
+            </a:r>
+            <a:r>
+              <a:rPr lang="es-MX" b="1" dirty="0" err="1"/>
               <a:t>hasRol</a:t>
             </a:r>
             <a:r>
-              <a:rPr lang="en-US" b="1" dirty="0"/>
-              <a:t>($</a:t>
-            </a:r>
-            <a:r>
-              <a:rPr lang="en-US" b="1" dirty="0" err="1"/>
-              <a:t>rol</a:t>
-            </a:r>
-            <a:r>
-              <a:rPr lang="en-US" b="1" dirty="0"/>
-              <a:t>)){</a:t>
-            </a:r>
-          </a:p>
-          <a:p>
-            <a:pPr marL="685800" lvl="3" indent="0">
-              <a:buNone/>
-            </a:pPr>
-            <a:r>
-              <a:rPr lang="en-US" b="1" dirty="0"/>
-              <a:t>				return true;</a:t>
-            </a:r>
-            <a:br>
-              <a:rPr lang="en-US" b="1" dirty="0"/>
-            </a:br>
-            <a:r>
-              <a:rPr lang="en-US" b="1" dirty="0"/>
-              <a:t>			}</a:t>
+              <a:rPr lang="es-MX" b="1" dirty="0"/>
+              <a:t>($rol)</a:t>
             </a:r>
           </a:p>
           <a:p>
@@ -4897,14 +4888,44 @@
             </a:pPr>
             <a:r>
               <a:rPr lang="en-US" b="1" dirty="0"/>
-              <a:t>		}</a:t>
+              <a:t>{</a:t>
             </a:r>
             <a:br>
               <a:rPr lang="en-US" b="1" dirty="0"/>
             </a:br>
             <a:r>
               <a:rPr lang="en-US" b="1" dirty="0"/>
-              <a:t>	}else{</a:t>
+              <a:t>	if($this-&gt;</a:t>
+            </a:r>
+            <a:r>
+              <a:rPr lang="en-US" b="1" dirty="0" err="1"/>
+              <a:t>rols</a:t>
+            </a:r>
+            <a:r>
+              <a:rPr lang="en-US" b="1" dirty="0"/>
+              <a:t>()-&gt;where(‘name’, $</a:t>
+            </a:r>
+            <a:r>
+              <a:rPr lang="en-US" b="1" dirty="0" err="1"/>
+              <a:t>rol</a:t>
+            </a:r>
+            <a:r>
+              <a:rPr lang="en-US" b="1" dirty="0"/>
+              <a:t>)-&gt;first()){</a:t>
+            </a:r>
+            <a:br>
+              <a:rPr lang="en-US" b="1" dirty="0"/>
+            </a:br>
+            <a:r>
+              <a:rPr lang="en-US" b="1" dirty="0"/>
+              <a:t>		return true;</a:t>
+            </a:r>
+            <a:br>
+              <a:rPr lang="en-US" b="1" dirty="0"/>
+            </a:br>
+            <a:r>
+              <a:rPr lang="en-US" b="1" dirty="0"/>
+              <a:t>	}</a:t>
             </a:r>
           </a:p>
           <a:p>
@@ -4913,54 +4934,6 @@
             </a:pPr>
             <a:r>
               <a:rPr lang="en-US" b="1" dirty="0"/>
-              <a:t>		if($this-&gt;</a:t>
-            </a:r>
-            <a:r>
-              <a:rPr lang="en-US" b="1" dirty="0" err="1"/>
-              <a:t>hasRol</a:t>
-            </a:r>
-            <a:r>
-              <a:rPr lang="en-US" b="1" dirty="0"/>
-              <a:t>($</a:t>
-            </a:r>
-            <a:r>
-              <a:rPr lang="en-US" b="1" dirty="0" err="1"/>
-              <a:t>rol</a:t>
-            </a:r>
-            <a:r>
-              <a:rPr lang="en-US" b="1" dirty="0"/>
-              <a:t>)){</a:t>
-            </a:r>
-          </a:p>
-          <a:p>
-            <a:pPr marL="228600" lvl="1" indent="0">
-              <a:buNone/>
-            </a:pPr>
-            <a:r>
-              <a:rPr lang="en-US" b="1" dirty="0"/>
-              <a:t>			return true;</a:t>
-            </a:r>
-            <a:br>
-              <a:rPr lang="en-US" b="1" dirty="0"/>
-            </a:br>
-            <a:r>
-              <a:rPr lang="en-US" b="1" dirty="0"/>
-              <a:t>		}</a:t>
-            </a:r>
-            <a:br>
-              <a:rPr lang="en-US" b="1" dirty="0"/>
-            </a:br>
-            <a:r>
-              <a:rPr lang="en-US" b="1" dirty="0"/>
-              <a:t>	}</a:t>
-            </a:r>
-          </a:p>
-          <a:p>
-            <a:pPr marL="228600" lvl="1" indent="0">
-              <a:buNone/>
-            </a:pPr>
-            <a:r>
-              <a:rPr lang="en-US" b="1" dirty="0"/>
               <a:t>	return false;</a:t>
             </a:r>
             <a:br>
@@ -4977,7 +4950,7 @@
     </p:spTree>
     <p:extLst>
       <p:ext uri="{BB962C8B-B14F-4D97-AF65-F5344CB8AC3E}">
-        <p14:creationId xmlns:p14="http://schemas.microsoft.com/office/powerpoint/2010/main" val="162151903"/>
+        <p14:creationId xmlns:p14="http://schemas.microsoft.com/office/powerpoint/2010/main" val="1727338606"/>
       </p:ext>
     </p:extLst>
   </p:cSld>
@@ -5009,7 +4982,7 @@
           <p:cNvPr id="2" name="Title 1">
             <a:extLst>
               <a:ext uri="{FF2B5EF4-FFF2-40B4-BE49-F238E27FC236}">
-                <a16:creationId xmlns:a16="http://schemas.microsoft.com/office/drawing/2014/main" id="{C5525EA4-AC0F-4C61-A5E5-7B2A8674736A}"/>
+                <a16:creationId xmlns:a16="http://schemas.microsoft.com/office/drawing/2014/main" id="{B6B290C7-14F9-4ED1-B7F4-0F0DC8F63491}"/>
               </a:ext>
             </a:extLst>
           </p:cNvPr>
@@ -5025,7 +4998,7 @@
           <a:bodyPr/>
           <a:lstStyle/>
           <a:p>
-            <a:endParaRPr lang="es-MX" dirty="0"/>
+            <a:endParaRPr lang="es-MX"/>
           </a:p>
         </p:txBody>
       </p:sp>
@@ -5034,7 +5007,7 @@
           <p:cNvPr id="3" name="Content Placeholder 2">
             <a:extLst>
               <a:ext uri="{FF2B5EF4-FFF2-40B4-BE49-F238E27FC236}">
-                <a16:creationId xmlns:a16="http://schemas.microsoft.com/office/drawing/2014/main" id="{3D7CC8E2-FD64-48B2-A98E-BEEAB00E918F}"/>
+                <a16:creationId xmlns:a16="http://schemas.microsoft.com/office/drawing/2014/main" id="{9C854629-B4B2-4909-AB6B-4EF799DFF6C0}"/>
               </a:ext>
             </a:extLst>
           </p:cNvPr>
@@ -5047,16 +5020,18 @@
         </p:nvSpPr>
         <p:spPr/>
         <p:txBody>
-          <a:bodyPr/>
+          <a:bodyPr>
+            <a:normAutofit lnSpcReduction="10000"/>
+          </a:bodyPr>
           <a:lstStyle/>
           <a:p>
             <a:r>
               <a:rPr lang="en-US" dirty="0"/>
-              <a:t>Si </a:t>
-            </a:r>
-            <a:r>
-              <a:rPr lang="en-US" dirty="0" err="1"/>
-              <a:t>gustan</a:t>
+              <a:t>Para saber </a:t>
+            </a:r>
+            <a:r>
+              <a:rPr lang="en-US" dirty="0" err="1"/>
+              <a:t>si</a:t>
             </a:r>
             <a:r>
               <a:rPr lang="en-US" dirty="0"/>
@@ -5064,33 +5039,165 @@
             </a:r>
             <a:r>
               <a:rPr lang="en-US" dirty="0" err="1"/>
-              <a:t>agregar</a:t>
-            </a:r>
-            <a:r>
-              <a:rPr lang="en-US" dirty="0"/>
-              <a:t> una </a:t>
-            </a:r>
-            <a:r>
-              <a:rPr lang="en-US" dirty="0" err="1"/>
-              <a:t>pantalla</a:t>
-            </a:r>
-            <a:r>
-              <a:rPr lang="en-US" dirty="0"/>
-              <a:t> de error </a:t>
-            </a:r>
-            <a:r>
-              <a:rPr lang="en-US" dirty="0" err="1"/>
-              <a:t>pueden</a:t>
-            </a:r>
-            <a:r>
-              <a:rPr lang="en-US" dirty="0"/>
-              <a:t> realizer lo </a:t>
-            </a:r>
-            <a:r>
-              <a:rPr lang="en-US" dirty="0" err="1"/>
-              <a:t>sigueinte</a:t>
+              <a:t>tiene</a:t>
+            </a:r>
+            <a:r>
+              <a:rPr lang="en-US" dirty="0"/>
+              <a:t> </a:t>
+            </a:r>
+            <a:r>
+              <a:rPr lang="en-US" dirty="0" err="1"/>
+              <a:t>algun</a:t>
+            </a:r>
+            <a:r>
+              <a:rPr lang="en-US" dirty="0"/>
+              <a:t> </a:t>
+            </a:r>
+            <a:r>
+              <a:rPr lang="en-US" dirty="0" err="1"/>
+              <a:t>rol</a:t>
+            </a:r>
+            <a:r>
+              <a:rPr lang="en-US" dirty="0"/>
+              <a:t> entre </a:t>
+            </a:r>
+            <a:r>
+              <a:rPr lang="en-US" dirty="0" err="1"/>
+              <a:t>varios</a:t>
+            </a:r>
+            <a:r>
+              <a:rPr lang="en-US" dirty="0"/>
+              <a:t> se </a:t>
+            </a:r>
+            <a:r>
+              <a:rPr lang="en-US" dirty="0" err="1"/>
+              <a:t>puede</a:t>
+            </a:r>
+            <a:r>
+              <a:rPr lang="en-US" dirty="0"/>
+              <a:t> realizer de la </a:t>
+            </a:r>
+            <a:r>
+              <a:rPr lang="en-US" dirty="0" err="1"/>
+              <a:t>siguiente</a:t>
+            </a:r>
+            <a:r>
+              <a:rPr lang="en-US" dirty="0"/>
+              <a:t> </a:t>
+            </a:r>
+            <a:r>
+              <a:rPr lang="en-US" dirty="0" err="1"/>
+              <a:t>manera</a:t>
             </a:r>
             <a:endParaRPr lang="en-US" dirty="0"/>
+          </a:p>
+          <a:p>
+            <a:pPr lvl="1"/>
+            <a:r>
+              <a:rPr lang="en-US" b="1" dirty="0"/>
+              <a:t>public function </a:t>
+            </a:r>
+            <a:r>
+              <a:rPr lang="en-US" b="1" dirty="0" err="1"/>
+              <a:t>hasAnyRol</a:t>
+            </a:r>
+            <a:r>
+              <a:rPr lang="en-US" b="1" dirty="0"/>
+              <a:t>($</a:t>
+            </a:r>
+            <a:r>
+              <a:rPr lang="en-US" b="1" dirty="0" err="1"/>
+              <a:t>rols</a:t>
+            </a:r>
+            <a:r>
+              <a:rPr lang="en-US" b="1" dirty="0"/>
+              <a:t>){</a:t>
+            </a:r>
+            <a:br>
+              <a:rPr lang="en-US" b="1" dirty="0"/>
+            </a:br>
+            <a:r>
+              <a:rPr lang="en-US" b="1" dirty="0"/>
+              <a:t>	if(</a:t>
+            </a:r>
+            <a:r>
+              <a:rPr lang="en-US" b="1" dirty="0" err="1"/>
+              <a:t>is_array</a:t>
+            </a:r>
+            <a:r>
+              <a:rPr lang="en-US" b="1" dirty="0"/>
+              <a:t>($</a:t>
+            </a:r>
+            <a:r>
+              <a:rPr lang="en-US" b="1" dirty="0" err="1"/>
+              <a:t>rols</a:t>
+            </a:r>
+            <a:r>
+              <a:rPr lang="en-US" b="1" dirty="0"/>
+              <a:t>)){</a:t>
+            </a:r>
+            <a:br>
+              <a:rPr lang="en-US" b="1" dirty="0"/>
+            </a:br>
+            <a:r>
+              <a:rPr lang="en-US" b="1" dirty="0"/>
+              <a:t>		foreach($</a:t>
+            </a:r>
+            <a:r>
+              <a:rPr lang="en-US" b="1" dirty="0" err="1"/>
+              <a:t>rols</a:t>
+            </a:r>
+            <a:r>
+              <a:rPr lang="en-US" b="1" dirty="0"/>
+              <a:t> as $</a:t>
+            </a:r>
+            <a:r>
+              <a:rPr lang="en-US" b="1" dirty="0" err="1"/>
+              <a:t>rol</a:t>
+            </a:r>
+            <a:r>
+              <a:rPr lang="en-US" b="1" dirty="0"/>
+              <a:t>){</a:t>
+            </a:r>
+            <a:br>
+              <a:rPr lang="en-US" b="1" dirty="0"/>
+            </a:br>
+            <a:r>
+              <a:rPr lang="en-US" b="1" dirty="0"/>
+              <a:t>			if($this-&gt;</a:t>
+            </a:r>
+            <a:r>
+              <a:rPr lang="en-US" b="1" dirty="0" err="1"/>
+              <a:t>hasRol</a:t>
+            </a:r>
+            <a:r>
+              <a:rPr lang="en-US" b="1" dirty="0"/>
+              <a:t>($</a:t>
+            </a:r>
+            <a:r>
+              <a:rPr lang="en-US" b="1" dirty="0" err="1"/>
+              <a:t>rol</a:t>
+            </a:r>
+            <a:r>
+              <a:rPr lang="en-US" b="1" dirty="0"/>
+              <a:t>)){</a:t>
+            </a:r>
+          </a:p>
+          <a:p>
+            <a:pPr marL="685800" lvl="3" indent="0">
+              <a:buNone/>
+            </a:pPr>
+            <a:r>
+              <a:rPr lang="en-US" b="1" dirty="0"/>
+              <a:t>				return true;</a:t>
+            </a:r>
+            <a:br>
+              <a:rPr lang="en-US" b="1" dirty="0"/>
+            </a:br>
+            <a:r>
+              <a:rPr lang="en-US" b="1" dirty="0"/>
+              <a:t>			}</a:t>
+            </a:r>
           </a:p>
           <a:p>
             <a:pPr marL="228600" lvl="1" indent="0">
@@ -5098,11 +5205,27 @@
             </a:pPr>
             <a:r>
               <a:rPr lang="en-US" b="1" dirty="0"/>
-              <a:t>public function </a:t>
+              <a:t>		}</a:t>
+            </a:r>
+            <a:br>
+              <a:rPr lang="en-US" b="1" dirty="0"/>
+            </a:br>
+            <a:r>
+              <a:rPr lang="en-US" b="1" dirty="0"/>
+              <a:t>	}else{</a:t>
+            </a:r>
+          </a:p>
+          <a:p>
+            <a:pPr marL="228600" lvl="1" indent="0">
+              <a:buNone/>
+            </a:pPr>
+            <a:r>
+              <a:rPr lang="en-US" b="1" dirty="0"/>
+              <a:t>		if($this-&gt;</a:t>
             </a:r>
             <a:r>
               <a:rPr lang="en-US" b="1" dirty="0" err="1"/>
-              <a:t>authorizeRols</a:t>
+              <a:t>hasRol</a:t>
             </a:r>
             <a:r>
               <a:rPr lang="en-US" b="1" dirty="0"/>
@@ -5110,71 +5233,43 @@
             </a:r>
             <a:r>
               <a:rPr lang="en-US" b="1" dirty="0" err="1"/>
-              <a:t>rols</a:t>
-            </a:r>
-            <a:r>
-              <a:rPr lang="en-US" b="1" dirty="0"/>
-              <a:t>){</a:t>
+              <a:t>rol</a:t>
+            </a:r>
+            <a:r>
+              <a:rPr lang="en-US" b="1" dirty="0"/>
+              <a:t>)){</a:t>
+            </a:r>
+          </a:p>
+          <a:p>
+            <a:pPr marL="228600" lvl="1" indent="0">
+              <a:buNone/>
+            </a:pPr>
+            <a:r>
+              <a:rPr lang="en-US" b="1" dirty="0"/>
+              <a:t>			return true;</a:t>
             </a:r>
             <a:br>
               <a:rPr lang="en-US" b="1" dirty="0"/>
             </a:br>
             <a:r>
               <a:rPr lang="en-US" b="1" dirty="0"/>
-              <a:t>	if($this-&gt;</a:t>
-            </a:r>
-            <a:r>
-              <a:rPr lang="en-US" b="1" dirty="0" err="1"/>
-              <a:t>hasAnyRol</a:t>
-            </a:r>
-            <a:r>
-              <a:rPr lang="en-US" b="1" dirty="0"/>
-              <a:t>($</a:t>
-            </a:r>
-            <a:r>
-              <a:rPr lang="en-US" b="1" dirty="0" err="1"/>
-              <a:t>rols</a:t>
-            </a:r>
-            <a:r>
-              <a:rPr lang="en-US" b="1" dirty="0"/>
-              <a:t>){</a:t>
+              <a:t>		}</a:t>
             </a:r>
             <a:br>
               <a:rPr lang="en-US" b="1" dirty="0"/>
             </a:br>
             <a:r>
               <a:rPr lang="en-US" b="1" dirty="0"/>
-              <a:t>		return true;</a:t>
-            </a:r>
-            <a:br>
-              <a:rPr lang="en-US" b="1" dirty="0"/>
-            </a:br>
-            <a:r>
-              <a:rPr lang="en-US" b="1" dirty="0"/>
               <a:t>	}</a:t>
             </a:r>
-            <a:br>
-              <a:rPr lang="en-US" b="1" dirty="0"/>
-            </a:br>
-            <a:r>
-              <a:rPr lang="en-US" b="1" dirty="0"/>
-              <a:t>	abort(401, ‘</a:t>
-            </a:r>
-            <a:r>
-              <a:rPr lang="en-US" b="1" dirty="0" err="1"/>
-              <a:t>Accion</a:t>
-            </a:r>
-            <a:r>
-              <a:rPr lang="en-US" b="1" dirty="0"/>
-              <a:t> no </a:t>
-            </a:r>
-            <a:r>
-              <a:rPr lang="en-US" b="1" dirty="0" err="1"/>
-              <a:t>autorhizada</a:t>
-            </a:r>
-            <a:r>
-              <a:rPr lang="en-US" b="1" dirty="0"/>
-              <a:t>’);</a:t>
+          </a:p>
+          <a:p>
+            <a:pPr marL="228600" lvl="1" indent="0">
+              <a:buNone/>
+            </a:pPr>
+            <a:r>
+              <a:rPr lang="en-US" b="1" dirty="0"/>
+              <a:t>	return false;</a:t>
             </a:r>
             <a:br>
               <a:rPr lang="en-US" b="1" dirty="0"/>
@@ -5190,7 +5285,7 @@
     </p:spTree>
     <p:extLst>
       <p:ext uri="{BB962C8B-B14F-4D97-AF65-F5344CB8AC3E}">
-        <p14:creationId xmlns:p14="http://schemas.microsoft.com/office/powerpoint/2010/main" val="2592745946"/>
+        <p14:creationId xmlns:p14="http://schemas.microsoft.com/office/powerpoint/2010/main" val="162151903"/>
       </p:ext>
     </p:extLst>
   </p:cSld>
@@ -5222,7 +5317,7 @@
           <p:cNvPr id="2" name="Title 1">
             <a:extLst>
               <a:ext uri="{FF2B5EF4-FFF2-40B4-BE49-F238E27FC236}">
-                <a16:creationId xmlns:a16="http://schemas.microsoft.com/office/drawing/2014/main" id="{749DF25B-C662-44FB-BCD6-73AD5DEBBB7F}"/>
+                <a16:creationId xmlns:a16="http://schemas.microsoft.com/office/drawing/2014/main" id="{C5525EA4-AC0F-4C61-A5E5-7B2A8674736A}"/>
               </a:ext>
             </a:extLst>
           </p:cNvPr>
@@ -5238,7 +5333,7 @@
           <a:bodyPr/>
           <a:lstStyle/>
           <a:p>
-            <a:endParaRPr lang="es-MX"/>
+            <a:endParaRPr lang="es-MX" dirty="0"/>
           </a:p>
         </p:txBody>
       </p:sp>
@@ -5247,7 +5342,7 @@
           <p:cNvPr id="3" name="Content Placeholder 2">
             <a:extLst>
               <a:ext uri="{FF2B5EF4-FFF2-40B4-BE49-F238E27FC236}">
-                <a16:creationId xmlns:a16="http://schemas.microsoft.com/office/drawing/2014/main" id="{4403E045-3A36-478D-A5E5-DB00779E52EC}"/>
+                <a16:creationId xmlns:a16="http://schemas.microsoft.com/office/drawing/2014/main" id="{3D7CC8E2-FD64-48B2-A98E-BEEAB00E918F}"/>
               </a:ext>
             </a:extLst>
           </p:cNvPr>
@@ -5264,16 +5359,12 @@
           <a:lstStyle/>
           <a:p>
             <a:r>
-              <a:rPr lang="en-US" dirty="0" err="1"/>
-              <a:t>Despues</a:t>
-            </a:r>
-            <a:r>
-              <a:rPr lang="en-US" dirty="0"/>
-              <a:t> de </a:t>
-            </a:r>
-            <a:r>
-              <a:rPr lang="en-US" dirty="0" err="1"/>
-              <a:t>esto</a:t>
+              <a:rPr lang="en-US" dirty="0"/>
+              <a:t>Si </a:t>
+            </a:r>
+            <a:r>
+              <a:rPr lang="en-US" dirty="0" err="1"/>
+              <a:t>gustan</a:t>
             </a:r>
             <a:r>
               <a:rPr lang="en-US" dirty="0"/>
@@ -5281,66 +5372,41 @@
             </a:r>
             <a:r>
               <a:rPr lang="en-US" dirty="0" err="1"/>
-              <a:t>ya</a:t>
-            </a:r>
-            <a:r>
-              <a:rPr lang="en-US" dirty="0"/>
-              <a:t> solo se require </a:t>
-            </a:r>
-            <a:r>
-              <a:rPr lang="en-US" dirty="0" err="1"/>
-              <a:t>llamar</a:t>
-            </a:r>
-            <a:r>
-              <a:rPr lang="en-US" dirty="0"/>
-              <a:t> a la function, se </a:t>
-            </a:r>
-            <a:r>
-              <a:rPr lang="en-US" dirty="0" err="1"/>
-              <a:t>puede</a:t>
-            </a:r>
-            <a:r>
-              <a:rPr lang="en-US" dirty="0"/>
-              <a:t> </a:t>
-            </a:r>
-            <a:r>
-              <a:rPr lang="en-US" dirty="0" err="1"/>
-              <a:t>realizar</a:t>
-            </a:r>
-            <a:r>
-              <a:rPr lang="en-US" dirty="0"/>
-              <a:t> </a:t>
-            </a:r>
-            <a:r>
-              <a:rPr lang="en-US" dirty="0" err="1"/>
-              <a:t>en</a:t>
-            </a:r>
-            <a:r>
-              <a:rPr lang="en-US" dirty="0"/>
-              <a:t> un </a:t>
-            </a:r>
-            <a:r>
-              <a:rPr lang="en-US" dirty="0" err="1"/>
-              <a:t>controlador</a:t>
-            </a:r>
-            <a:r>
-              <a:rPr lang="en-US" dirty="0"/>
-              <a:t> o </a:t>
-            </a:r>
-            <a:r>
-              <a:rPr lang="en-US" dirty="0" err="1"/>
-              <a:t>en</a:t>
-            </a:r>
-            <a:r>
-              <a:rPr lang="en-US" dirty="0"/>
-              <a:t> un middleware</a:t>
-            </a:r>
-          </a:p>
-          <a:p>
-            <a:pPr lvl="1"/>
-            <a:r>
-              <a:rPr lang="en-US" b="1" dirty="0"/>
-              <a:t>$request-&gt;user()-&gt;</a:t>
+              <a:t>agregar</a:t>
+            </a:r>
+            <a:r>
+              <a:rPr lang="en-US" dirty="0"/>
+              <a:t> una </a:t>
+            </a:r>
+            <a:r>
+              <a:rPr lang="en-US" dirty="0" err="1"/>
+              <a:t>pantalla</a:t>
+            </a:r>
+            <a:r>
+              <a:rPr lang="en-US" dirty="0"/>
+              <a:t> de error </a:t>
+            </a:r>
+            <a:r>
+              <a:rPr lang="en-US" dirty="0" err="1"/>
+              <a:t>pueden</a:t>
+            </a:r>
+            <a:r>
+              <a:rPr lang="en-US" dirty="0"/>
+              <a:t> realizer lo </a:t>
+            </a:r>
+            <a:r>
+              <a:rPr lang="en-US" dirty="0" err="1"/>
+              <a:t>sigueinte</a:t>
+            </a:r>
+            <a:endParaRPr lang="en-US" dirty="0"/>
+          </a:p>
+          <a:p>
+            <a:pPr marL="228600" lvl="1" indent="0">
+              <a:buNone/>
+            </a:pPr>
+            <a:r>
+              <a:rPr lang="en-US" b="1" dirty="0"/>
+              <a:t>public function </a:t>
             </a:r>
             <a:r>
               <a:rPr lang="en-US" b="1" dirty="0" err="1"/>
@@ -5348,88 +5414,91 @@
             </a:r>
             <a:r>
               <a:rPr lang="en-US" b="1" dirty="0"/>
-              <a:t>(‘admin’);</a:t>
-            </a:r>
-          </a:p>
-          <a:p>
-            <a:r>
-              <a:rPr lang="en-US" dirty="0" err="1"/>
-              <a:t>En</a:t>
-            </a:r>
-            <a:r>
-              <a:rPr lang="en-US" dirty="0"/>
-              <a:t> </a:t>
-            </a:r>
-            <a:r>
-              <a:rPr lang="en-US" dirty="0" err="1"/>
-              <a:t>tal</a:t>
-            </a:r>
-            <a:r>
-              <a:rPr lang="en-US" dirty="0"/>
-              <a:t> </a:t>
-            </a:r>
-            <a:r>
-              <a:rPr lang="en-US" dirty="0" err="1"/>
-              <a:t>caso</a:t>
-            </a:r>
-            <a:r>
-              <a:rPr lang="en-US" dirty="0"/>
-              <a:t> de que </a:t>
-            </a:r>
-            <a:r>
-              <a:rPr lang="en-US" dirty="0" err="1"/>
-              <a:t>quieran</a:t>
-            </a:r>
-            <a:r>
-              <a:rPr lang="en-US" dirty="0"/>
-              <a:t> de una </a:t>
-            </a:r>
-            <a:r>
-              <a:rPr lang="en-US" dirty="0" err="1"/>
-              <a:t>eleccion</a:t>
-            </a:r>
-            <a:r>
-              <a:rPr lang="en-US" dirty="0"/>
-              <a:t> de roles</a:t>
-            </a:r>
-          </a:p>
-          <a:p>
-            <a:pPr lvl="1"/>
-            <a:r>
-              <a:rPr lang="en-US" b="1" dirty="0"/>
-              <a:t>$request-&gt;user()-&gt;</a:t>
+              <a:t>($</a:t>
             </a:r>
             <a:r>
               <a:rPr lang="en-US" b="1" dirty="0" err="1"/>
-              <a:t>authorizeRols</a:t>
-            </a:r>
-            <a:r>
-              <a:rPr lang="en-US" b="1" dirty="0"/>
-              <a:t>([‘</a:t>
+              <a:t>rols</a:t>
+            </a:r>
+            <a:r>
+              <a:rPr lang="en-US" b="1" dirty="0"/>
+              <a:t>){</a:t>
+            </a:r>
+            <a:br>
+              <a:rPr lang="en-US" b="1" dirty="0"/>
+            </a:br>
+            <a:r>
+              <a:rPr lang="en-US" b="1" dirty="0"/>
+              <a:t>	if($this-&gt;</a:t>
             </a:r>
             <a:r>
               <a:rPr lang="en-US" b="1" dirty="0" err="1"/>
-              <a:t>admin’,’user</a:t>
-            </a:r>
-            <a:r>
-              <a:rPr lang="en-US" b="1" dirty="0"/>
-              <a:t>’]);</a:t>
-            </a:r>
-          </a:p>
-          <a:p>
-            <a:pPr lvl="1"/>
-            <a:endParaRPr lang="en-US" dirty="0"/>
-          </a:p>
-          <a:p>
-            <a:pPr lvl="1"/>
-            <a:endParaRPr lang="es-MX" dirty="0"/>
+              <a:t>hasAnyRol</a:t>
+            </a:r>
+            <a:r>
+              <a:rPr lang="en-US" b="1" dirty="0"/>
+              <a:t>($</a:t>
+            </a:r>
+            <a:r>
+              <a:rPr lang="en-US" b="1" dirty="0" err="1"/>
+              <a:t>rols</a:t>
+            </a:r>
+            <a:r>
+              <a:rPr lang="en-US" b="1" dirty="0"/>
+              <a:t>){</a:t>
+            </a:r>
+            <a:br>
+              <a:rPr lang="en-US" b="1" dirty="0"/>
+            </a:br>
+            <a:r>
+              <a:rPr lang="en-US" b="1" dirty="0"/>
+              <a:t>		return true;</a:t>
+            </a:r>
+            <a:br>
+              <a:rPr lang="en-US" b="1" dirty="0"/>
+            </a:br>
+            <a:r>
+              <a:rPr lang="en-US" b="1" dirty="0"/>
+              <a:t>	}</a:t>
+            </a:r>
+            <a:br>
+              <a:rPr lang="en-US" b="1" dirty="0"/>
+            </a:br>
+            <a:r>
+              <a:rPr lang="en-US" b="1" dirty="0"/>
+              <a:t>	abort(401, ‘</a:t>
+            </a:r>
+            <a:r>
+              <a:rPr lang="en-US" b="1" dirty="0" err="1"/>
+              <a:t>Accion</a:t>
+            </a:r>
+            <a:r>
+              <a:rPr lang="en-US" b="1" dirty="0"/>
+              <a:t> no </a:t>
+            </a:r>
+            <a:r>
+              <a:rPr lang="en-US" b="1" dirty="0" err="1"/>
+              <a:t>autorhizada</a:t>
+            </a:r>
+            <a:r>
+              <a:rPr lang="en-US" b="1" dirty="0"/>
+              <a:t>’);</a:t>
+            </a:r>
+            <a:br>
+              <a:rPr lang="en-US" b="1" dirty="0"/>
+            </a:br>
+            <a:r>
+              <a:rPr lang="en-US" b="1" dirty="0"/>
+              <a:t>}</a:t>
+            </a:r>
+            <a:endParaRPr lang="es-MX" b="1" dirty="0"/>
           </a:p>
         </p:txBody>
       </p:sp>
     </p:spTree>
     <p:extLst>
       <p:ext uri="{BB962C8B-B14F-4D97-AF65-F5344CB8AC3E}">
-        <p14:creationId xmlns:p14="http://schemas.microsoft.com/office/powerpoint/2010/main" val="88567574"/>
+        <p14:creationId xmlns:p14="http://schemas.microsoft.com/office/powerpoint/2010/main" val="2592745946"/>
       </p:ext>
     </p:extLst>
   </p:cSld>
@@ -5461,6 +5530,245 @@
           <p:cNvPr id="2" name="Title 1">
             <a:extLst>
               <a:ext uri="{FF2B5EF4-FFF2-40B4-BE49-F238E27FC236}">
+                <a16:creationId xmlns:a16="http://schemas.microsoft.com/office/drawing/2014/main" id="{749DF25B-C662-44FB-BCD6-73AD5DEBBB7F}"/>
+              </a:ext>
+            </a:extLst>
+          </p:cNvPr>
+          <p:cNvSpPr>
+            <a:spLocks noGrp="1"/>
+          </p:cNvSpPr>
+          <p:nvPr>
+            <p:ph type="title"/>
+          </p:nvPr>
+        </p:nvSpPr>
+        <p:spPr/>
+        <p:txBody>
+          <a:bodyPr/>
+          <a:lstStyle/>
+          <a:p>
+            <a:endParaRPr lang="es-MX"/>
+          </a:p>
+        </p:txBody>
+      </p:sp>
+      <p:sp>
+        <p:nvSpPr>
+          <p:cNvPr id="3" name="Content Placeholder 2">
+            <a:extLst>
+              <a:ext uri="{FF2B5EF4-FFF2-40B4-BE49-F238E27FC236}">
+                <a16:creationId xmlns:a16="http://schemas.microsoft.com/office/drawing/2014/main" id="{4403E045-3A36-478D-A5E5-DB00779E52EC}"/>
+              </a:ext>
+            </a:extLst>
+          </p:cNvPr>
+          <p:cNvSpPr>
+            <a:spLocks noGrp="1"/>
+          </p:cNvSpPr>
+          <p:nvPr>
+            <p:ph idx="1"/>
+          </p:nvPr>
+        </p:nvSpPr>
+        <p:spPr/>
+        <p:txBody>
+          <a:bodyPr/>
+          <a:lstStyle/>
+          <a:p>
+            <a:r>
+              <a:rPr lang="en-US" dirty="0" err="1"/>
+              <a:t>Despues</a:t>
+            </a:r>
+            <a:r>
+              <a:rPr lang="en-US" dirty="0"/>
+              <a:t> de </a:t>
+            </a:r>
+            <a:r>
+              <a:rPr lang="en-US" dirty="0" err="1"/>
+              <a:t>esto</a:t>
+            </a:r>
+            <a:r>
+              <a:rPr lang="en-US" dirty="0"/>
+              <a:t> </a:t>
+            </a:r>
+            <a:r>
+              <a:rPr lang="en-US" dirty="0" err="1"/>
+              <a:t>ya</a:t>
+            </a:r>
+            <a:r>
+              <a:rPr lang="en-US" dirty="0"/>
+              <a:t> solo se require </a:t>
+            </a:r>
+            <a:r>
+              <a:rPr lang="en-US" dirty="0" err="1"/>
+              <a:t>llamar</a:t>
+            </a:r>
+            <a:r>
+              <a:rPr lang="en-US" dirty="0"/>
+              <a:t> a la function, se </a:t>
+            </a:r>
+            <a:r>
+              <a:rPr lang="en-US" dirty="0" err="1"/>
+              <a:t>puede</a:t>
+            </a:r>
+            <a:r>
+              <a:rPr lang="en-US" dirty="0"/>
+              <a:t> </a:t>
+            </a:r>
+            <a:r>
+              <a:rPr lang="en-US" dirty="0" err="1"/>
+              <a:t>realizar</a:t>
+            </a:r>
+            <a:r>
+              <a:rPr lang="en-US" dirty="0"/>
+              <a:t> </a:t>
+            </a:r>
+            <a:r>
+              <a:rPr lang="en-US" dirty="0" err="1"/>
+              <a:t>en</a:t>
+            </a:r>
+            <a:r>
+              <a:rPr lang="en-US" dirty="0"/>
+              <a:t> un </a:t>
+            </a:r>
+            <a:r>
+              <a:rPr lang="en-US" dirty="0" err="1"/>
+              <a:t>controlador</a:t>
+            </a:r>
+            <a:r>
+              <a:rPr lang="en-US" dirty="0"/>
+              <a:t> o </a:t>
+            </a:r>
+            <a:r>
+              <a:rPr lang="en-US" dirty="0" err="1"/>
+              <a:t>en</a:t>
+            </a:r>
+            <a:r>
+              <a:rPr lang="en-US" dirty="0"/>
+              <a:t> un middleware</a:t>
+            </a:r>
+          </a:p>
+          <a:p>
+            <a:pPr lvl="1"/>
+            <a:r>
+              <a:rPr lang="en-US" b="1" dirty="0"/>
+              <a:t>$request-&gt;user()-&gt;</a:t>
+            </a:r>
+            <a:r>
+              <a:rPr lang="en-US" b="1" dirty="0" err="1"/>
+              <a:t>authorizeRols</a:t>
+            </a:r>
+            <a:r>
+              <a:rPr lang="en-US" b="1" dirty="0"/>
+              <a:t>(‘admin’);</a:t>
+            </a:r>
+          </a:p>
+          <a:p>
+            <a:r>
+              <a:rPr lang="en-US" dirty="0" err="1"/>
+              <a:t>En</a:t>
+            </a:r>
+            <a:r>
+              <a:rPr lang="en-US" dirty="0"/>
+              <a:t> </a:t>
+            </a:r>
+            <a:r>
+              <a:rPr lang="en-US" dirty="0" err="1"/>
+              <a:t>tal</a:t>
+            </a:r>
+            <a:r>
+              <a:rPr lang="en-US" dirty="0"/>
+              <a:t> </a:t>
+            </a:r>
+            <a:r>
+              <a:rPr lang="en-US" dirty="0" err="1"/>
+              <a:t>caso</a:t>
+            </a:r>
+            <a:r>
+              <a:rPr lang="en-US" dirty="0"/>
+              <a:t> de que </a:t>
+            </a:r>
+            <a:r>
+              <a:rPr lang="en-US" dirty="0" err="1"/>
+              <a:t>quieran</a:t>
+            </a:r>
+            <a:r>
+              <a:rPr lang="en-US" dirty="0"/>
+              <a:t> de una </a:t>
+            </a:r>
+            <a:r>
+              <a:rPr lang="en-US" dirty="0" err="1"/>
+              <a:t>eleccion</a:t>
+            </a:r>
+            <a:r>
+              <a:rPr lang="en-US" dirty="0"/>
+              <a:t> de roles</a:t>
+            </a:r>
+          </a:p>
+          <a:p>
+            <a:pPr lvl="1"/>
+            <a:r>
+              <a:rPr lang="en-US" b="1" dirty="0"/>
+              <a:t>$request-&gt;user()-&gt;</a:t>
+            </a:r>
+            <a:r>
+              <a:rPr lang="en-US" b="1" dirty="0" err="1"/>
+              <a:t>authorizeRols</a:t>
+            </a:r>
+            <a:r>
+              <a:rPr lang="en-US" b="1" dirty="0"/>
+              <a:t>([‘</a:t>
+            </a:r>
+            <a:r>
+              <a:rPr lang="en-US" b="1" dirty="0" err="1"/>
+              <a:t>admin’,’user</a:t>
+            </a:r>
+            <a:r>
+              <a:rPr lang="en-US" b="1" dirty="0"/>
+              <a:t>’]);</a:t>
+            </a:r>
+          </a:p>
+          <a:p>
+            <a:pPr lvl="1"/>
+            <a:endParaRPr lang="en-US" dirty="0"/>
+          </a:p>
+          <a:p>
+            <a:pPr lvl="1"/>
+            <a:endParaRPr lang="es-MX" dirty="0"/>
+          </a:p>
+        </p:txBody>
+      </p:sp>
+    </p:spTree>
+    <p:extLst>
+      <p:ext uri="{BB962C8B-B14F-4D97-AF65-F5344CB8AC3E}">
+        <p14:creationId xmlns:p14="http://schemas.microsoft.com/office/powerpoint/2010/main" val="88567574"/>
+      </p:ext>
+    </p:extLst>
+  </p:cSld>
+  <p:clrMapOvr>
+    <a:masterClrMapping/>
+  </p:clrMapOvr>
+</p:sld>
+</file>
+
+<file path=ppt/slides/slide16.xml><?xml version="1.0" encoding="utf-8"?>
+<p:sld xmlns:a="http://schemas.openxmlformats.org/drawingml/2006/main" xmlns:r="http://schemas.openxmlformats.org/officeDocument/2006/relationships" xmlns:p="http://schemas.openxmlformats.org/presentationml/2006/main">
+  <p:cSld>
+    <p:spTree>
+      <p:nvGrpSpPr>
+        <p:cNvPr id="1" name=""/>
+        <p:cNvGrpSpPr/>
+        <p:nvPr/>
+      </p:nvGrpSpPr>
+      <p:grpSpPr>
+        <a:xfrm>
+          <a:off x="0" y="0"/>
+          <a:ext cx="0" cy="0"/>
+          <a:chOff x="0" y="0"/>
+          <a:chExt cx="0" cy="0"/>
+        </a:xfrm>
+      </p:grpSpPr>
+      <p:sp>
+        <p:nvSpPr>
+          <p:cNvPr id="2" name="Title 1">
+            <a:extLst>
+              <a:ext uri="{FF2B5EF4-FFF2-40B4-BE49-F238E27FC236}">
                 <a16:creationId xmlns:a16="http://schemas.microsoft.com/office/drawing/2014/main" id="{037EF00B-6628-412E-8ACD-E3C4064FD20A}"/>
               </a:ext>
             </a:extLst>
@@ -5755,7 +6063,7 @@
 </p:sld>
 </file>
 
-<file path=ppt/slides/slide16.xml><?xml version="1.0" encoding="utf-8"?>
+<file path=ppt/slides/slide17.xml><?xml version="1.0" encoding="utf-8"?>
 <p:sld xmlns:a="http://schemas.openxmlformats.org/drawingml/2006/main" xmlns:r="http://schemas.openxmlformats.org/officeDocument/2006/relationships" xmlns:p="http://schemas.openxmlformats.org/presentationml/2006/main">
   <p:cSld>
     <p:spTree>
@@ -6454,7 +6762,7 @@
             </a:r>
             <a:r>
               <a:rPr lang="es-MX" b="1" dirty="0"/>
-              <a:t> Rol –m</a:t>
+              <a:t> Role –m</a:t>
             </a:r>
           </a:p>
           <a:p>
@@ -6581,7 +6889,9 @@
         </p:nvSpPr>
         <p:spPr/>
         <p:txBody>
-          <a:bodyPr/>
+          <a:bodyPr>
+            <a:normAutofit lnSpcReduction="10000"/>
+          </a:bodyPr>
           <a:lstStyle/>
           <a:p>
             <a:r>
@@ -6659,7 +6969,7 @@
             </a:r>
             <a:r>
               <a:rPr lang="es-MX" b="1" dirty="0" err="1"/>
-              <a:t>créate_rol_user_table</a:t>
+              <a:t>create_role_user_table</a:t>
             </a:r>
             <a:endParaRPr lang="es-MX" b="1" dirty="0"/>
           </a:p>
@@ -6701,12 +7011,59 @@
             </a:r>
             <a:r>
               <a:rPr lang="es-MX" b="1" dirty="0"/>
-              <a:t>usuario</a:t>
+              <a:t>usuario </a:t>
+            </a:r>
+            <a:r>
+              <a:rPr lang="es-MX" dirty="0"/>
+              <a:t>y </a:t>
+            </a:r>
+            <a:r>
+              <a:rPr lang="es-MX" dirty="0" err="1"/>
+              <a:t>unsigned</a:t>
             </a:r>
             <a:r>
               <a:rPr lang="es-MX" dirty="0"/>
               <a:t>.</a:t>
             </a:r>
+          </a:p>
+          <a:p>
+            <a:pPr lvl="2"/>
+            <a:r>
+              <a:rPr lang="es-MX" dirty="0"/>
+              <a:t>$table-</a:t>
+            </a:r>
+            <a:r>
+              <a:rPr lang="en-US" dirty="0"/>
+              <a:t>&gt;integer(‘</a:t>
+            </a:r>
+            <a:r>
+              <a:rPr lang="en-US" dirty="0" err="1"/>
+              <a:t>role_id</a:t>
+            </a:r>
+            <a:r>
+              <a:rPr lang="en-US" dirty="0"/>
+              <a:t>’)-&gt;unsigned();</a:t>
+            </a:r>
+          </a:p>
+          <a:p>
+            <a:pPr lvl="2"/>
+            <a:r>
+              <a:rPr lang="es-MX" dirty="0"/>
+              <a:t>$table-</a:t>
+            </a:r>
+            <a:r>
+              <a:rPr lang="en-US" dirty="0"/>
+              <a:t>&gt;integer(‘</a:t>
+            </a:r>
+            <a:r>
+              <a:rPr lang="en-US" dirty="0" err="1"/>
+              <a:t>user_id</a:t>
+            </a:r>
+            <a:r>
+              <a:rPr lang="en-US" dirty="0"/>
+              <a:t>’)-&gt;unsigned();</a:t>
+            </a:r>
+            <a:endParaRPr lang="es-MX" dirty="0"/>
           </a:p>
           <a:p>
             <a:pPr lvl="1"/>
@@ -7187,7 +7544,39 @@
             </a:r>
             <a:r>
               <a:rPr lang="es-MX" b="1" dirty="0" err="1"/>
-              <a:t>RolTableSeeder</a:t>
+              <a:t>RoleTableSeeder</a:t>
+            </a:r>
+            <a:endParaRPr lang="es-MX" b="1" dirty="0"/>
+          </a:p>
+          <a:p>
+            <a:pPr lvl="1"/>
+            <a:r>
+              <a:rPr lang="es-MX" b="1" dirty="0" err="1"/>
+              <a:t>php</a:t>
+            </a:r>
+            <a:r>
+              <a:rPr lang="es-MX" b="1" dirty="0"/>
+              <a:t> </a:t>
+            </a:r>
+            <a:r>
+              <a:rPr lang="es-MX" b="1" dirty="0" err="1"/>
+              <a:t>artisan</a:t>
+            </a:r>
+            <a:r>
+              <a:rPr lang="es-MX" b="1" dirty="0"/>
+              <a:t> </a:t>
+            </a:r>
+            <a:r>
+              <a:rPr lang="es-MX" b="1" dirty="0" err="1"/>
+              <a:t>make:seeder</a:t>
+            </a:r>
+            <a:r>
+              <a:rPr lang="es-MX" b="1" dirty="0"/>
+              <a:t> </a:t>
+            </a:r>
+            <a:r>
+              <a:rPr lang="es-MX" b="1" dirty="0" err="1"/>
+              <a:t>UserTableSeeder</a:t>
             </a:r>
             <a:endParaRPr lang="es-MX" b="1" dirty="0"/>
           </a:p>
@@ -7289,7 +7678,19 @@
               <a:rPr lang="es-MX" b="1" dirty="0"/>
               <a:t>/</a:t>
             </a:r>
-            <a:endParaRPr lang="es-MX" dirty="0"/>
+          </a:p>
+          <a:p>
+            <a:r>
+              <a:rPr lang="es-MX" dirty="0"/>
+              <a:t>Agregar las clases necesarias para que los modelos funcionen</a:t>
+            </a:r>
+          </a:p>
+          <a:p>
+            <a:pPr lvl="1"/>
+            <a:r>
+              <a:rPr lang="es-MX" b="1" dirty="0"/>
+              <a:t>Ej. use App\Role;</a:t>
+            </a:r>
           </a:p>
           <a:p>
             <a:r>
@@ -7317,11 +7718,11 @@
             </a:r>
             <a:r>
               <a:rPr lang="es-MX" b="1" dirty="0" err="1"/>
-              <a:t>rol_admin</a:t>
+              <a:t>role_admin</a:t>
             </a:r>
             <a:r>
               <a:rPr lang="es-MX" b="1" dirty="0"/>
-              <a:t> = new Rol();</a:t>
+              <a:t> = new Role();</a:t>
             </a:r>
           </a:p>
           <a:p>
@@ -7332,7 +7733,7 @@
             </a:r>
             <a:r>
               <a:rPr lang="es-MX" b="1" dirty="0" err="1"/>
-              <a:t>rol_admin</a:t>
+              <a:t>role_admin</a:t>
             </a:r>
             <a:r>
               <a:rPr lang="en-US" b="1" dirty="0"/>
@@ -7347,7 +7748,7 @@
             </a:r>
             <a:r>
               <a:rPr lang="en-US" b="1" dirty="0" err="1"/>
-              <a:t>rol_admin</a:t>
+              <a:t>role_admin</a:t>
             </a:r>
             <a:r>
               <a:rPr lang="en-US" b="1" dirty="0"/>
@@ -7370,7 +7771,7 @@
             </a:r>
             <a:r>
               <a:rPr lang="en-US" b="1" dirty="0" err="1"/>
-              <a:t>rol_admin</a:t>
+              <a:t>role_admin</a:t>
             </a:r>
             <a:r>
               <a:rPr lang="en-US" b="1" dirty="0"/>
@@ -7419,7 +7820,7 @@
           <p:cNvPr id="2" name="Title 1">
             <a:extLst>
               <a:ext uri="{FF2B5EF4-FFF2-40B4-BE49-F238E27FC236}">
-                <a16:creationId xmlns:a16="http://schemas.microsoft.com/office/drawing/2014/main" id="{6A4EB910-8AFF-4144-B7CD-E1D3745027FF}"/>
+                <a16:creationId xmlns:a16="http://schemas.microsoft.com/office/drawing/2014/main" id="{28814A40-F13C-4094-A041-07CD634C64B7}"/>
               </a:ext>
             </a:extLst>
           </p:cNvPr>
@@ -7444,7 +7845,7 @@
           <p:cNvPr id="3" name="Content Placeholder 2">
             <a:extLst>
               <a:ext uri="{FF2B5EF4-FFF2-40B4-BE49-F238E27FC236}">
-                <a16:creationId xmlns:a16="http://schemas.microsoft.com/office/drawing/2014/main" id="{CEFE903A-80DF-44E7-BB2D-C20E9C614166}"/>
+                <a16:creationId xmlns:a16="http://schemas.microsoft.com/office/drawing/2014/main" id="{FEB61889-A8CA-48C3-87F4-623615C3BD1C}"/>
               </a:ext>
             </a:extLst>
           </p:cNvPr>
@@ -7462,85 +7863,228 @@
           <a:p>
             <a:r>
               <a:rPr lang="es-MX" dirty="0"/>
-              <a:t>Terminando de crear los </a:t>
+              <a:t>$</a:t>
             </a:r>
             <a:r>
               <a:rPr lang="es-MX" dirty="0" err="1"/>
-              <a:t>seeders</a:t>
-            </a:r>
-            <a:r>
-              <a:rPr lang="es-MX" dirty="0"/>
-              <a:t> pertinentes ir a </a:t>
-            </a:r>
-            <a:r>
-              <a:rPr lang="es-MX" b="1" dirty="0" err="1"/>
-              <a:t>DatabaseSeeder</a:t>
-            </a:r>
-            <a:r>
-              <a:rPr lang="es-MX" b="1" dirty="0"/>
+              <a:t>role_admin</a:t>
+            </a:r>
+            <a:r>
+              <a:rPr lang="es-MX" dirty="0"/>
+              <a:t> = Role::</a:t>
+            </a:r>
+            <a:r>
+              <a:rPr lang="es-MX" dirty="0" err="1"/>
+              <a:t>where</a:t>
+            </a:r>
+            <a:r>
+              <a:rPr lang="es-MX" dirty="0"/>
+              <a:t>(‘</a:t>
+            </a:r>
+            <a:r>
+              <a:rPr lang="es-MX" dirty="0" err="1"/>
+              <a:t>name</a:t>
+            </a:r>
+            <a:r>
+              <a:rPr lang="es-MX" dirty="0"/>
+              <a:t>’,’</a:t>
+            </a:r>
+            <a:r>
+              <a:rPr lang="es-MX" dirty="0" err="1"/>
+              <a:t>admin</a:t>
+            </a:r>
+            <a:r>
+              <a:rPr lang="es-MX" dirty="0"/>
+              <a:t>’)-&gt;</a:t>
+            </a:r>
+            <a:r>
+              <a:rPr lang="es-MX" dirty="0" err="1"/>
+              <a:t>first</a:t>
+            </a:r>
+            <a:r>
+              <a:rPr lang="es-MX" dirty="0"/>
+              <a:t>();</a:t>
+            </a:r>
+            <a:br>
+              <a:rPr lang="es-MX" dirty="0"/>
+            </a:br>
+            <a:br>
+              <a:rPr lang="es-MX" dirty="0"/>
+            </a:br>
+            <a:r>
+              <a:rPr lang="es-MX" dirty="0"/>
+              <a:t>$</a:t>
+            </a:r>
+            <a:r>
+              <a:rPr lang="es-MX" dirty="0" err="1"/>
+              <a:t>admin</a:t>
+            </a:r>
+            <a:r>
+              <a:rPr lang="es-MX" dirty="0"/>
+              <a:t> = new </a:t>
+            </a:r>
+            <a:r>
+              <a:rPr lang="es-MX" dirty="0" err="1"/>
+              <a:t>User</a:t>
+            </a:r>
+            <a:r>
+              <a:rPr lang="es-MX" dirty="0"/>
+              <a:t>();</a:t>
+            </a:r>
+            <a:br>
+              <a:rPr lang="es-MX" dirty="0"/>
+            </a:br>
+            <a:r>
+              <a:rPr lang="es-MX" dirty="0"/>
+              <a:t>$</a:t>
+            </a:r>
+            <a:r>
+              <a:rPr lang="es-MX" dirty="0" err="1"/>
+              <a:t>admin</a:t>
+            </a:r>
+            <a:r>
+              <a:rPr lang="es-MX" dirty="0"/>
+              <a:t>-&gt;</a:t>
+            </a:r>
+            <a:r>
+              <a:rPr lang="es-MX" dirty="0" err="1"/>
+              <a:t>name</a:t>
+            </a:r>
+            <a:r>
+              <a:rPr lang="es-MX" dirty="0"/>
+              <a:t> = ‘</a:t>
+            </a:r>
+            <a:r>
+              <a:rPr lang="es-MX" dirty="0" err="1"/>
+              <a:t>Admin</a:t>
+            </a:r>
+            <a:r>
+              <a:rPr lang="es-MX" dirty="0"/>
               <a:t> </a:t>
             </a:r>
             <a:r>
-              <a:rPr lang="es-MX" dirty="0"/>
-              <a:t>dentro de </a:t>
-            </a:r>
-            <a:r>
-              <a:rPr lang="es-MX" b="1" dirty="0" err="1"/>
-              <a:t>database</a:t>
-            </a:r>
-            <a:r>
-              <a:rPr lang="es-MX" b="1" dirty="0"/>
-              <a:t>/</a:t>
-            </a:r>
-            <a:r>
-              <a:rPr lang="es-MX" b="1" dirty="0" err="1"/>
-              <a:t>seeds</a:t>
-            </a:r>
-            <a:r>
-              <a:rPr lang="es-MX" b="1" dirty="0"/>
-              <a:t> </a:t>
-            </a:r>
-          </a:p>
-          <a:p>
-            <a:r>
-              <a:rPr lang="es-MX" dirty="0"/>
-              <a:t>Aquí encontraremos una función llamada run y correremos el siguiente código</a:t>
-            </a:r>
-          </a:p>
-          <a:p>
-            <a:pPr lvl="1"/>
-            <a:r>
-              <a:rPr lang="es-MX" b="1" dirty="0"/>
+              <a:rPr lang="es-MX" dirty="0" err="1"/>
+              <a:t>User</a:t>
+            </a:r>
+            <a:r>
+              <a:rPr lang="es-MX" dirty="0"/>
+              <a:t>’;</a:t>
+            </a:r>
+            <a:br>
+              <a:rPr lang="es-MX" dirty="0"/>
+            </a:br>
+            <a:r>
+              <a:rPr lang="es-MX" dirty="0"/>
               <a:t>$</a:t>
             </a:r>
             <a:r>
-              <a:rPr lang="es-MX" b="1" dirty="0" err="1"/>
-              <a:t>this</a:t>
-            </a:r>
-            <a:r>
-              <a:rPr lang="es-MX" b="1" dirty="0"/>
-              <a:t>-</a:t>
-            </a:r>
-            <a:r>
-              <a:rPr lang="en-US" b="1" dirty="0"/>
-              <a:t>&gt;call(</a:t>
-            </a:r>
-            <a:r>
-              <a:rPr lang="en-US" b="1" dirty="0" err="1"/>
-              <a:t>NameSeeder</a:t>
-            </a:r>
-            <a:r>
-              <a:rPr lang="en-US" b="1" dirty="0"/>
-              <a:t>::class);</a:t>
-            </a:r>
-            <a:endParaRPr lang="es-MX" b="1" dirty="0"/>
+              <a:rPr lang="es-MX" dirty="0" err="1"/>
+              <a:t>admin</a:t>
+            </a:r>
+            <a:r>
+              <a:rPr lang="es-MX" dirty="0"/>
+              <a:t>-&gt;email = ‘admin@example.com’;</a:t>
+            </a:r>
+            <a:br>
+              <a:rPr lang="es-MX" dirty="0"/>
+            </a:br>
+            <a:r>
+              <a:rPr lang="es-MX" dirty="0"/>
+              <a:t>$</a:t>
+            </a:r>
+            <a:r>
+              <a:rPr lang="es-MX" dirty="0" err="1"/>
+              <a:t>admin</a:t>
+            </a:r>
+            <a:r>
+              <a:rPr lang="es-MX" dirty="0"/>
+              <a:t>-&gt;</a:t>
+            </a:r>
+            <a:r>
+              <a:rPr lang="es-MX" dirty="0" err="1"/>
+              <a:t>password</a:t>
+            </a:r>
+            <a:r>
+              <a:rPr lang="es-MX" dirty="0"/>
+              <a:t> = </a:t>
+            </a:r>
+            <a:r>
+              <a:rPr lang="en-US" dirty="0"/>
+              <a:t>Hash::make</a:t>
+            </a:r>
+            <a:r>
+              <a:rPr lang="es-MX" dirty="0"/>
+              <a:t>(‘</a:t>
+            </a:r>
+            <a:r>
+              <a:rPr lang="es-MX" dirty="0" err="1"/>
+              <a:t>password</a:t>
+            </a:r>
+            <a:r>
+              <a:rPr lang="es-MX" dirty="0"/>
+              <a:t>’);</a:t>
+            </a:r>
+            <a:br>
+              <a:rPr lang="es-MX" dirty="0"/>
+            </a:br>
+            <a:r>
+              <a:rPr lang="es-MX" dirty="0"/>
+              <a:t>$</a:t>
+            </a:r>
+            <a:r>
+              <a:rPr lang="es-MX" dirty="0" err="1"/>
+              <a:t>admin</a:t>
+            </a:r>
+            <a:r>
+              <a:rPr lang="es-MX" dirty="0"/>
+              <a:t>-&gt;</a:t>
+            </a:r>
+            <a:r>
+              <a:rPr lang="es-MX" dirty="0" err="1"/>
+              <a:t>save</a:t>
+            </a:r>
+            <a:r>
+              <a:rPr lang="es-MX" dirty="0"/>
+              <a:t>();</a:t>
+            </a:r>
+            <a:br>
+              <a:rPr lang="es-MX" dirty="0"/>
+            </a:br>
+            <a:r>
+              <a:rPr lang="es-MX" dirty="0"/>
+              <a:t>$</a:t>
+            </a:r>
+            <a:r>
+              <a:rPr lang="es-MX" dirty="0" err="1"/>
+              <a:t>admin</a:t>
+            </a:r>
+            <a:r>
+              <a:rPr lang="es-MX" dirty="0"/>
+              <a:t>-&gt;roles()-&gt;</a:t>
+            </a:r>
+            <a:r>
+              <a:rPr lang="es-MX" dirty="0" err="1"/>
+              <a:t>attach</a:t>
+            </a:r>
+            <a:r>
+              <a:rPr lang="es-MX" dirty="0"/>
+              <a:t>($</a:t>
+            </a:r>
+            <a:r>
+              <a:rPr lang="es-MX" dirty="0" err="1"/>
+              <a:t>role_admin</a:t>
+            </a:r>
+            <a:r>
+              <a:rPr lang="es-MX" dirty="0"/>
+              <a:t>);</a:t>
+            </a:r>
           </a:p>
         </p:txBody>
       </p:sp>
     </p:spTree>
     <p:extLst>
       <p:ext uri="{BB962C8B-B14F-4D97-AF65-F5344CB8AC3E}">
-        <p14:creationId xmlns:p14="http://schemas.microsoft.com/office/powerpoint/2010/main" val="918714073"/>
+        <p14:creationId xmlns:p14="http://schemas.microsoft.com/office/powerpoint/2010/main" val="999093570"/>
       </p:ext>
     </p:extLst>
   </p:cSld>

</xml_diff>